<commit_message>
add genres API to structure diagram
</commit_message>
<xml_diff>
--- a/presentation-book-exchange.pptx
+++ b/presentation-book-exchange.pptx
@@ -268,7 +268,7 @@
           <a:p>
             <a:fld id="{1706A504-8EB3-452A-98D0-9F946B298832}" type="datetimeFigureOut">
               <a:rPr lang="zh-CN" altLang="en-US" smtClean="0"/>
-              <a:t>2022/4/20</a:t>
+              <a:t>2022/5/4</a:t>
             </a:fld>
             <a:endParaRPr lang="zh-CN" altLang="en-US"/>
           </a:p>
@@ -468,7 +468,7 @@
           <a:p>
             <a:fld id="{1706A504-8EB3-452A-98D0-9F946B298832}" type="datetimeFigureOut">
               <a:rPr lang="zh-CN" altLang="en-US" smtClean="0"/>
-              <a:t>2022/4/20</a:t>
+              <a:t>2022/5/4</a:t>
             </a:fld>
             <a:endParaRPr lang="zh-CN" altLang="en-US"/>
           </a:p>
@@ -678,7 +678,7 @@
           <a:p>
             <a:fld id="{1706A504-8EB3-452A-98D0-9F946B298832}" type="datetimeFigureOut">
               <a:rPr lang="zh-CN" altLang="en-US" smtClean="0"/>
-              <a:t>2022/4/20</a:t>
+              <a:t>2022/5/4</a:t>
             </a:fld>
             <a:endParaRPr lang="zh-CN" altLang="en-US"/>
           </a:p>
@@ -878,7 +878,7 @@
           <a:p>
             <a:fld id="{1706A504-8EB3-452A-98D0-9F946B298832}" type="datetimeFigureOut">
               <a:rPr lang="zh-CN" altLang="en-US" smtClean="0"/>
-              <a:t>2022/4/20</a:t>
+              <a:t>2022/5/4</a:t>
             </a:fld>
             <a:endParaRPr lang="zh-CN" altLang="en-US"/>
           </a:p>
@@ -1154,7 +1154,7 @@
           <a:p>
             <a:fld id="{1706A504-8EB3-452A-98D0-9F946B298832}" type="datetimeFigureOut">
               <a:rPr lang="zh-CN" altLang="en-US" smtClean="0"/>
-              <a:t>2022/4/20</a:t>
+              <a:t>2022/5/4</a:t>
             </a:fld>
             <a:endParaRPr lang="zh-CN" altLang="en-US"/>
           </a:p>
@@ -1422,7 +1422,7 @@
           <a:p>
             <a:fld id="{1706A504-8EB3-452A-98D0-9F946B298832}" type="datetimeFigureOut">
               <a:rPr lang="zh-CN" altLang="en-US" smtClean="0"/>
-              <a:t>2022/4/20</a:t>
+              <a:t>2022/5/4</a:t>
             </a:fld>
             <a:endParaRPr lang="zh-CN" altLang="en-US"/>
           </a:p>
@@ -1837,7 +1837,7 @@
           <a:p>
             <a:fld id="{1706A504-8EB3-452A-98D0-9F946B298832}" type="datetimeFigureOut">
               <a:rPr lang="zh-CN" altLang="en-US" smtClean="0"/>
-              <a:t>2022/4/20</a:t>
+              <a:t>2022/5/4</a:t>
             </a:fld>
             <a:endParaRPr lang="zh-CN" altLang="en-US"/>
           </a:p>
@@ -1979,7 +1979,7 @@
           <a:p>
             <a:fld id="{1706A504-8EB3-452A-98D0-9F946B298832}" type="datetimeFigureOut">
               <a:rPr lang="zh-CN" altLang="en-US" smtClean="0"/>
-              <a:t>2022/4/20</a:t>
+              <a:t>2022/5/4</a:t>
             </a:fld>
             <a:endParaRPr lang="zh-CN" altLang="en-US"/>
           </a:p>
@@ -2092,7 +2092,7 @@
           <a:p>
             <a:fld id="{1706A504-8EB3-452A-98D0-9F946B298832}" type="datetimeFigureOut">
               <a:rPr lang="zh-CN" altLang="en-US" smtClean="0"/>
-              <a:t>2022/4/20</a:t>
+              <a:t>2022/5/4</a:t>
             </a:fld>
             <a:endParaRPr lang="zh-CN" altLang="en-US"/>
           </a:p>
@@ -2405,7 +2405,7 @@
           <a:p>
             <a:fld id="{1706A504-8EB3-452A-98D0-9F946B298832}" type="datetimeFigureOut">
               <a:rPr lang="zh-CN" altLang="en-US" smtClean="0"/>
-              <a:t>2022/4/20</a:t>
+              <a:t>2022/5/4</a:t>
             </a:fld>
             <a:endParaRPr lang="zh-CN" altLang="en-US"/>
           </a:p>
@@ -2694,7 +2694,7 @@
           <a:p>
             <a:fld id="{1706A504-8EB3-452A-98D0-9F946B298832}" type="datetimeFigureOut">
               <a:rPr lang="zh-CN" altLang="en-US" smtClean="0"/>
-              <a:t>2022/4/20</a:t>
+              <a:t>2022/5/4</a:t>
             </a:fld>
             <a:endParaRPr lang="zh-CN" altLang="en-US"/>
           </a:p>
@@ -2937,7 +2937,7 @@
           <a:p>
             <a:fld id="{1706A504-8EB3-452A-98D0-9F946B298832}" type="datetimeFigureOut">
               <a:rPr lang="zh-CN" altLang="en-US" smtClean="0"/>
-              <a:t>2022/4/20</a:t>
+              <a:t>2022/5/4</a:t>
             </a:fld>
             <a:endParaRPr lang="zh-CN" altLang="en-US"/>
           </a:p>
@@ -3376,10 +3376,38 @@
           <a:lstStyle/>
           <a:p>
             <a:r>
-              <a:rPr lang="en-US" altLang="zh-CN" dirty="0"/>
-              <a:t>Book Exchange</a:t>
-            </a:r>
-            <a:endParaRPr lang="zh-CN" altLang="en-US" dirty="0"/>
+              <a:rPr lang="en-US" altLang="zh-CN" b="1" dirty="0">
+                <a:effectLst>
+                  <a:outerShdw blurRad="38100" dist="38100" dir="2700000" algn="tl">
+                    <a:srgbClr val="000000">
+                      <a:alpha val="43137"/>
+                    </a:srgbClr>
+                  </a:outerShdw>
+                </a:effectLst>
+              </a:rPr>
+              <a:t>Book </a:t>
+            </a:r>
+            <a:r>
+              <a:rPr lang="en-US" altLang="zh-CN" b="1" i="1" dirty="0">
+                <a:effectLst>
+                  <a:outerShdw blurRad="38100" dist="38100" dir="2700000" algn="tl">
+                    <a:srgbClr val="000000">
+                      <a:alpha val="43137"/>
+                    </a:srgbClr>
+                  </a:outerShdw>
+                </a:effectLst>
+              </a:rPr>
+              <a:t>Exchange</a:t>
+            </a:r>
+            <a:endParaRPr lang="zh-CN" altLang="en-US" b="1" i="1" dirty="0">
+              <a:effectLst>
+                <a:outerShdw blurRad="38100" dist="38100" dir="2700000" algn="tl">
+                  <a:srgbClr val="000000">
+                    <a:alpha val="43137"/>
+                  </a:srgbClr>
+                </a:outerShdw>
+              </a:effectLst>
+            </a:endParaRPr>
           </a:p>
         </p:txBody>
       </p:sp>
@@ -3466,15 +3494,15 @@
         </p:spPr>
         <p:txBody>
           <a:bodyPr>
-            <a:normAutofit fontScale="90000"/>
+            <a:noAutofit/>
           </a:bodyPr>
           <a:lstStyle/>
           <a:p>
             <a:r>
-              <a:rPr lang="en-US" altLang="zh-CN" dirty="0"/>
+              <a:rPr lang="en-US" altLang="zh-CN" sz="4000" dirty="0"/>
               <a:t>Structure Overview</a:t>
             </a:r>
-            <a:endParaRPr lang="zh-CN" altLang="en-US" dirty="0"/>
+            <a:endParaRPr lang="zh-CN" altLang="en-US" sz="4000" dirty="0"/>
           </a:p>
         </p:txBody>
       </p:sp>
@@ -3532,15 +3560,15 @@
         </p:spPr>
         <p:txBody>
           <a:bodyPr>
-            <a:normAutofit fontScale="90000"/>
+            <a:normAutofit/>
           </a:bodyPr>
           <a:lstStyle/>
           <a:p>
             <a:r>
-              <a:rPr lang="en-US" altLang="zh-CN" dirty="0"/>
+              <a:rPr lang="en-US" altLang="zh-CN" sz="4000" dirty="0"/>
               <a:t>Motivation &amp; Main Functions</a:t>
             </a:r>
-            <a:endParaRPr lang="zh-CN" altLang="en-US" dirty="0"/>
+            <a:endParaRPr lang="zh-CN" altLang="en-US" sz="4000" dirty="0"/>
           </a:p>
         </p:txBody>
       </p:sp>
@@ -3603,10 +3631,10 @@
           <a:lstStyle/>
           <a:p>
             <a:r>
-              <a:rPr lang="en-US" altLang="zh-CN" dirty="0"/>
+              <a:rPr lang="en-US" altLang="zh-CN" sz="4000" dirty="0"/>
               <a:t>Front-End</a:t>
             </a:r>
-            <a:endParaRPr lang="zh-CN" altLang="en-US" dirty="0"/>
+            <a:endParaRPr lang="zh-CN" altLang="en-US" sz="4000" dirty="0"/>
           </a:p>
         </p:txBody>
       </p:sp>
@@ -3642,37 +3670,265 @@
       </p:grpSpPr>
       <p:sp>
         <p:nvSpPr>
-          <p:cNvPr id="2" name="Title 1">
-            <a:extLst>
-              <a:ext uri="{FF2B5EF4-FFF2-40B4-BE49-F238E27FC236}">
-                <a16:creationId xmlns:a16="http://schemas.microsoft.com/office/drawing/2014/main" id="{290B4422-890A-4ACF-BA33-FE39F4EAEF58}"/>
-              </a:ext>
-            </a:extLst>
-          </p:cNvPr>
-          <p:cNvSpPr>
-            <a:spLocks noGrp="1"/>
-          </p:cNvSpPr>
-          <p:nvPr>
-            <p:ph type="ctrTitle"/>
-          </p:nvPr>
+          <p:cNvPr id="4" name="Rectangle: Rounded Corners 3">
+            <a:extLst>
+              <a:ext uri="{FF2B5EF4-FFF2-40B4-BE49-F238E27FC236}">
+                <a16:creationId xmlns:a16="http://schemas.microsoft.com/office/drawing/2014/main" id="{85FE837D-E5DB-5919-FE04-44BF5226CA28}"/>
+              </a:ext>
+            </a:extLst>
+          </p:cNvPr>
+          <p:cNvSpPr/>
+          <p:nvPr/>
         </p:nvSpPr>
         <p:spPr>
           <a:xfrm>
-            <a:off x="1524000" y="640523"/>
+            <a:off x="498266" y="947358"/>
+            <a:ext cx="5130496" cy="5650558"/>
+          </a:xfrm>
+          <a:prstGeom prst="roundRect">
+            <a:avLst/>
+          </a:prstGeom>
+          <a:solidFill>
+            <a:schemeClr val="accent1">
+              <a:lumMod val="75000"/>
+            </a:schemeClr>
+          </a:solidFill>
+          <a:ln>
+            <a:noFill/>
+          </a:ln>
+        </p:spPr>
+        <p:style>
+          <a:lnRef idx="2">
+            <a:schemeClr val="accent1">
+              <a:shade val="50000"/>
+            </a:schemeClr>
+          </a:lnRef>
+          <a:fillRef idx="1">
+            <a:schemeClr val="accent1"/>
+          </a:fillRef>
+          <a:effectRef idx="0">
+            <a:schemeClr val="accent1"/>
+          </a:effectRef>
+          <a:fontRef idx="minor">
+            <a:schemeClr val="lt1"/>
+          </a:fontRef>
+        </p:style>
+        <p:txBody>
+          <a:bodyPr rtlCol="0" anchor="ctr"/>
+          <a:lstStyle/>
+          <a:p>
+            <a:pPr algn="ctr"/>
+            <a:endParaRPr lang="zh-CN" altLang="en-US"/>
+          </a:p>
+        </p:txBody>
+      </p:sp>
+      <p:sp>
+        <p:nvSpPr>
+          <p:cNvPr id="2" name="Title 1">
+            <a:extLst>
+              <a:ext uri="{FF2B5EF4-FFF2-40B4-BE49-F238E27FC236}">
+                <a16:creationId xmlns:a16="http://schemas.microsoft.com/office/drawing/2014/main" id="{290B4422-890A-4ACF-BA33-FE39F4EAEF58}"/>
+              </a:ext>
+            </a:extLst>
+          </p:cNvPr>
+          <p:cNvSpPr>
+            <a:spLocks noGrp="1"/>
+          </p:cNvSpPr>
+          <p:nvPr>
+            <p:ph type="ctrTitle"/>
+          </p:nvPr>
+        </p:nvSpPr>
+        <p:spPr>
+          <a:xfrm>
+            <a:off x="1392589" y="0"/>
             <a:ext cx="9144000" cy="947357"/>
           </a:xfrm>
         </p:spPr>
         <p:txBody>
           <a:bodyPr>
-            <a:normAutofit fontScale="90000"/>
+            <a:normAutofit/>
           </a:bodyPr>
           <a:lstStyle/>
           <a:p>
             <a:r>
-              <a:rPr lang="en-US" altLang="zh-CN" dirty="0"/>
+              <a:rPr lang="en-US" altLang="zh-CN" sz="4000" dirty="0"/>
               <a:t>Donate &amp; Request a second-hand book</a:t>
             </a:r>
-            <a:endParaRPr lang="zh-CN" altLang="en-US" dirty="0"/>
+            <a:endParaRPr lang="zh-CN" altLang="en-US" sz="4000" dirty="0"/>
+          </a:p>
+        </p:txBody>
+      </p:sp>
+      <p:sp>
+        <p:nvSpPr>
+          <p:cNvPr id="3" name="TextBox 2">
+            <a:extLst>
+              <a:ext uri="{FF2B5EF4-FFF2-40B4-BE49-F238E27FC236}">
+                <a16:creationId xmlns:a16="http://schemas.microsoft.com/office/drawing/2014/main" id="{17463EC7-20E1-9D15-BD5D-054D0462CA79}"/>
+              </a:ext>
+            </a:extLst>
+          </p:cNvPr>
+          <p:cNvSpPr txBox="1"/>
+          <p:nvPr/>
+        </p:nvSpPr>
+        <p:spPr>
+          <a:xfrm>
+            <a:off x="665267" y="5161123"/>
+            <a:ext cx="4796494" cy="1200329"/>
+          </a:xfrm>
+          <a:prstGeom prst="rect">
+            <a:avLst/>
+          </a:prstGeom>
+          <a:noFill/>
+        </p:spPr>
+        <p:txBody>
+          <a:bodyPr wrap="square" rtlCol="0">
+            <a:spAutoFit/>
+          </a:bodyPr>
+          <a:lstStyle/>
+          <a:p>
+            <a:pPr marL="285750" indent="-285750">
+              <a:buFont typeface="Arial" panose="020B0604020202020204" pitchFamily="34" charset="0"/>
+              <a:buChar char="•"/>
+            </a:pPr>
+            <a:r>
+              <a:rPr lang="en-US" altLang="zh-CN" sz="1200" dirty="0">
+                <a:solidFill>
+                  <a:schemeClr val="bg1"/>
+                </a:solidFill>
+              </a:rPr>
+              <a:t>Using API Gateway to pass the photos directly to a S3 bucket</a:t>
+            </a:r>
+          </a:p>
+          <a:p>
+            <a:pPr marL="285750" indent="-285750">
+              <a:buFont typeface="Arial" panose="020B0604020202020204" pitchFamily="34" charset="0"/>
+              <a:buChar char="•"/>
+            </a:pPr>
+            <a:r>
+              <a:rPr lang="en-US" altLang="zh-CN" sz="1200" dirty="0">
+                <a:solidFill>
+                  <a:schemeClr val="bg1"/>
+                </a:solidFill>
+              </a:rPr>
+              <a:t>Using a Lambda Function to add the donation information to DynamoDB and OpenSearch.</a:t>
+            </a:r>
+          </a:p>
+          <a:p>
+            <a:pPr marL="285750" indent="-285750">
+              <a:buFont typeface="Arial" panose="020B0604020202020204" pitchFamily="34" charset="0"/>
+              <a:buChar char="•"/>
+            </a:pPr>
+            <a:r>
+              <a:rPr lang="en-US" altLang="zh-CN" sz="1200" dirty="0">
+                <a:solidFill>
+                  <a:schemeClr val="bg1"/>
+                </a:solidFill>
+              </a:rPr>
+              <a:t>The lambda function automatically generates the genre information for the donated book by using Open Library API. This can</a:t>
+            </a:r>
+            <a:r>
+              <a:rPr lang="zh-CN" altLang="en-US" sz="1200" dirty="0">
+                <a:solidFill>
+                  <a:schemeClr val="bg1"/>
+                </a:solidFill>
+              </a:rPr>
+              <a:t> </a:t>
+            </a:r>
+            <a:r>
+              <a:rPr lang="en-US" altLang="zh-CN" sz="1200" dirty="0">
+                <a:solidFill>
+                  <a:schemeClr val="bg1"/>
+                </a:solidFill>
+              </a:rPr>
+              <a:t>help other users find the book they want by genre.</a:t>
+            </a:r>
+            <a:endParaRPr lang="zh-CN" altLang="en-US" sz="1200" dirty="0">
+              <a:solidFill>
+                <a:schemeClr val="bg1"/>
+              </a:solidFill>
+            </a:endParaRPr>
+          </a:p>
+        </p:txBody>
+      </p:sp>
+      <p:pic>
+        <p:nvPicPr>
+          <p:cNvPr id="6" name="Picture 5">
+            <a:extLst>
+              <a:ext uri="{FF2B5EF4-FFF2-40B4-BE49-F238E27FC236}">
+                <a16:creationId xmlns:a16="http://schemas.microsoft.com/office/drawing/2014/main" id="{CBDFCF6D-DC62-DED4-F273-DB87B144859F}"/>
+              </a:ext>
+            </a:extLst>
+          </p:cNvPr>
+          <p:cNvPicPr>
+            <a:picLocks noChangeAspect="1"/>
+          </p:cNvPicPr>
+          <p:nvPr/>
+        </p:nvPicPr>
+        <p:blipFill>
+          <a:blip r:embed="rId2">
+            <a:extLst>
+              <a:ext uri="{28A0092B-C50C-407E-A947-70E740481C1C}">
+                <a14:useLocalDpi xmlns:a14="http://schemas.microsoft.com/office/drawing/2010/main" val="0"/>
+              </a:ext>
+            </a:extLst>
+          </a:blip>
+          <a:stretch>
+            <a:fillRect/>
+          </a:stretch>
+        </p:blipFill>
+        <p:spPr>
+          <a:xfrm>
+            <a:off x="1486222" y="1919401"/>
+            <a:ext cx="2968417" cy="3096309"/>
+          </a:xfrm>
+          <a:prstGeom prst="rect">
+            <a:avLst/>
+          </a:prstGeom>
+        </p:spPr>
+      </p:pic>
+      <p:sp>
+        <p:nvSpPr>
+          <p:cNvPr id="7" name="TextBox 6">
+            <a:extLst>
+              <a:ext uri="{FF2B5EF4-FFF2-40B4-BE49-F238E27FC236}">
+                <a16:creationId xmlns:a16="http://schemas.microsoft.com/office/drawing/2014/main" id="{A379F5CD-A9D7-C52E-B67E-BFF5FD9A84F1}"/>
+              </a:ext>
+            </a:extLst>
+          </p:cNvPr>
+          <p:cNvSpPr txBox="1"/>
+          <p:nvPr/>
+        </p:nvSpPr>
+        <p:spPr>
+          <a:xfrm>
+            <a:off x="2427449" y="1226423"/>
+            <a:ext cx="1394415" cy="461665"/>
+          </a:xfrm>
+          <a:prstGeom prst="rect">
+            <a:avLst/>
+          </a:prstGeom>
+          <a:noFill/>
+        </p:spPr>
+        <p:txBody>
+          <a:bodyPr wrap="square" rtlCol="0">
+            <a:spAutoFit/>
+          </a:bodyPr>
+          <a:lstStyle/>
+          <a:p>
+            <a:r>
+              <a:rPr lang="en-US" altLang="zh-CN" sz="2400" dirty="0">
+                <a:solidFill>
+                  <a:schemeClr val="bg1"/>
+                </a:solidFill>
+                <a:latin typeface="Arial Black" panose="020B0A04020102020204" pitchFamily="34" charset="0"/>
+              </a:rPr>
+              <a:t>Donate</a:t>
+            </a:r>
+            <a:endParaRPr lang="zh-CN" altLang="en-US" sz="2400" dirty="0">
+              <a:solidFill>
+                <a:schemeClr val="bg1"/>
+              </a:solidFill>
+              <a:latin typeface="Arial Black" panose="020B0A04020102020204" pitchFamily="34" charset="0"/>
+            </a:endParaRPr>
           </a:p>
         </p:txBody>
       </p:sp>
@@ -3735,10 +3991,10 @@
           <a:lstStyle/>
           <a:p>
             <a:r>
-              <a:rPr lang="en-US" altLang="zh-CN" dirty="0"/>
+              <a:rPr lang="en-US" altLang="zh-CN" sz="4000" dirty="0"/>
               <a:t>Search for a donated book</a:t>
             </a:r>
-            <a:endParaRPr lang="zh-CN" altLang="en-US" dirty="0"/>
+            <a:endParaRPr lang="zh-CN" altLang="en-US" sz="4000" dirty="0"/>
           </a:p>
         </p:txBody>
       </p:sp>
@@ -3801,10 +4057,10 @@
           <a:lstStyle/>
           <a:p>
             <a:r>
-              <a:rPr lang="en-US" altLang="zh-CN" dirty="0"/>
+              <a:rPr lang="en-US" altLang="zh-CN" sz="4000" dirty="0"/>
               <a:t>Show user information</a:t>
             </a:r>
-            <a:endParaRPr lang="zh-CN" altLang="en-US" dirty="0"/>
+            <a:endParaRPr lang="zh-CN" altLang="en-US" sz="4000" dirty="0"/>
           </a:p>
         </p:txBody>
       </p:sp>
@@ -3867,10 +4123,10 @@
           <a:lstStyle/>
           <a:p>
             <a:r>
-              <a:rPr lang="en-US" altLang="zh-CN" dirty="0"/>
+              <a:rPr lang="en-US" altLang="zh-CN" sz="4000" dirty="0"/>
               <a:t>Add a book to a favorite list</a:t>
             </a:r>
-            <a:endParaRPr lang="zh-CN" altLang="en-US" dirty="0"/>
+            <a:endParaRPr lang="zh-CN" altLang="en-US" sz="4000" dirty="0"/>
           </a:p>
         </p:txBody>
       </p:sp>

</xml_diff>

<commit_message>
link the front-end login panel to Cognito
</commit_message>
<xml_diff>
--- a/presentation-book-exchange.pptx
+++ b/presentation-book-exchange.pptx
@@ -3638,6 +3638,48 @@
           </a:p>
         </p:txBody>
       </p:sp>
+      <p:sp>
+        <p:nvSpPr>
+          <p:cNvPr id="3" name="TextBox 2">
+            <a:extLst>
+              <a:ext uri="{FF2B5EF4-FFF2-40B4-BE49-F238E27FC236}">
+                <a16:creationId xmlns:a16="http://schemas.microsoft.com/office/drawing/2014/main" id="{4D1C98AB-98A7-D877-475F-F0D2ACC1DE01}"/>
+              </a:ext>
+            </a:extLst>
+          </p:cNvPr>
+          <p:cNvSpPr txBox="1"/>
+          <p:nvPr/>
+        </p:nvSpPr>
+        <p:spPr>
+          <a:xfrm>
+            <a:off x="1242927" y="1259353"/>
+            <a:ext cx="9669643" cy="646331"/>
+          </a:xfrm>
+          <a:prstGeom prst="rect">
+            <a:avLst/>
+          </a:prstGeom>
+          <a:noFill/>
+        </p:spPr>
+        <p:txBody>
+          <a:bodyPr wrap="square" rtlCol="0">
+            <a:spAutoFit/>
+          </a:bodyPr>
+          <a:lstStyle/>
+          <a:p>
+            <a:r>
+              <a:rPr lang="en-US" altLang="zh-CN" dirty="0"/>
+              <a:t>Login/Registration Panel</a:t>
+            </a:r>
+          </a:p>
+          <a:p>
+            <a:r>
+              <a:rPr lang="en-US" altLang="zh-CN" dirty="0"/>
+              <a:t>Donation Panel: The user can only donate a book when they have logged in.</a:t>
+            </a:r>
+            <a:endParaRPr lang="zh-CN" altLang="en-US" dirty="0"/>
+          </a:p>
+        </p:txBody>
+      </p:sp>
     </p:spTree>
     <p:extLst>
       <p:ext uri="{BB962C8B-B14F-4D97-AF65-F5344CB8AC3E}">

</xml_diff>

<commit_message>
Update the search part of pptx
</commit_message>
<xml_diff>
--- a/presentation-book-exchange.pptx
+++ b/presentation-book-exchange.pptx
@@ -1,17 +1,17 @@
 
 <file path=ppt/presentation.xml><?xml version="1.0" encoding="utf-8"?>
-<p:presentation xmlns:a="http://schemas.openxmlformats.org/drawingml/2006/main" xmlns:r="http://schemas.openxmlformats.org/officeDocument/2006/relationships" xmlns:p="http://schemas.openxmlformats.org/presentationml/2006/main" saveSubsetFonts="1">
+<p:presentation xmlns:a="http://schemas.openxmlformats.org/drawingml/2006/main" xmlns:r="http://schemas.openxmlformats.org/officeDocument/2006/relationships" xmlns:p="http://schemas.openxmlformats.org/presentationml/2006/main">
   <p:sldMasterIdLst>
     <p:sldMasterId id="2147483648" r:id="rId1"/>
   </p:sldMasterIdLst>
   <p:sldIdLst>
-    <p:sldId id="256" r:id="rId2"/>
-    <p:sldId id="257" r:id="rId3"/>
-    <p:sldId id="262" r:id="rId4"/>
-    <p:sldId id="259" r:id="rId5"/>
-    <p:sldId id="260" r:id="rId6"/>
-    <p:sldId id="263" r:id="rId7"/>
-    <p:sldId id="264" r:id="rId8"/>
+    <p:sldId id="256" r:id="rId3"/>
+    <p:sldId id="257" r:id="rId4"/>
+    <p:sldId id="262" r:id="rId5"/>
+    <p:sldId id="259" r:id="rId6"/>
+    <p:sldId id="260" r:id="rId7"/>
+    <p:sldId id="263" r:id="rId8"/>
+    <p:sldId id="264" r:id="rId9"/>
   </p:sldIdLst>
   <p:sldSz cx="12192000" cy="6858000"/>
   <p:notesSz cx="6858000" cy="9144000"/>
@@ -110,11 +110,6 @@
       </a:defRPr>
     </a:lvl9pPr>
   </p:defaultTextStyle>
-  <p:extLst>
-    <p:ext uri="{EFAFB233-063F-42B5-8137-9DF3F51BA10A}">
-      <p15:sldGuideLst xmlns:p15="http://schemas.microsoft.com/office/powerpoint/2012/main"/>
-    </p:ext>
-  </p:extLst>
 </p:presentation>
 </file>
 
@@ -137,13 +132,7 @@
       </p:grpSpPr>
       <p:sp>
         <p:nvSpPr>
-          <p:cNvPr id="2" name="Title 1">
-            <a:extLst>
-              <a:ext uri="{FF2B5EF4-FFF2-40B4-BE49-F238E27FC236}">
-                <a16:creationId xmlns:a16="http://schemas.microsoft.com/office/drawing/2014/main" id="{F439C497-15A6-4C11-A3FF-6B35F9E95F1B}"/>
-              </a:ext>
-            </a:extLst>
-          </p:cNvPr>
+          <p:cNvPr id="2" name="Title 1"/>
           <p:cNvSpPr>
             <a:spLocks noGrp="1"/>
           </p:cNvSpPr>
@@ -175,13 +164,7 @@
       </p:sp>
       <p:sp>
         <p:nvSpPr>
-          <p:cNvPr id="3" name="Subtitle 2">
-            <a:extLst>
-              <a:ext uri="{FF2B5EF4-FFF2-40B4-BE49-F238E27FC236}">
-                <a16:creationId xmlns:a16="http://schemas.microsoft.com/office/drawing/2014/main" id="{E060F068-1DDE-4253-9B5A-6B60D1C903EA}"/>
-              </a:ext>
-            </a:extLst>
-          </p:cNvPr>
+          <p:cNvPr id="3" name="Subtitle 2"/>
           <p:cNvSpPr>
             <a:spLocks noGrp="1"/>
           </p:cNvSpPr>
@@ -246,13 +229,7 @@
       </p:sp>
       <p:sp>
         <p:nvSpPr>
-          <p:cNvPr id="4" name="Date Placeholder 3">
-            <a:extLst>
-              <a:ext uri="{FF2B5EF4-FFF2-40B4-BE49-F238E27FC236}">
-                <a16:creationId xmlns:a16="http://schemas.microsoft.com/office/drawing/2014/main" id="{868F537E-E623-40F2-B322-0E951934428A}"/>
-              </a:ext>
-            </a:extLst>
-          </p:cNvPr>
+          <p:cNvPr id="4" name="Date Placeholder 3"/>
           <p:cNvSpPr>
             <a:spLocks noGrp="1"/>
           </p:cNvSpPr>
@@ -267,7 +244,6 @@
           <a:p>
             <a:fld id="{1706A504-8EB3-452A-98D0-9F946B298832}" type="datetimeFigureOut">
               <a:rPr lang="zh-CN" altLang="en-US" smtClean="0"/>
-              <a:t>2022/5/9</a:t>
             </a:fld>
             <a:endParaRPr lang="zh-CN" altLang="en-US"/>
           </a:p>
@@ -275,13 +251,7 @@
       </p:sp>
       <p:sp>
         <p:nvSpPr>
-          <p:cNvPr id="5" name="Footer Placeholder 4">
-            <a:extLst>
-              <a:ext uri="{FF2B5EF4-FFF2-40B4-BE49-F238E27FC236}">
-                <a16:creationId xmlns:a16="http://schemas.microsoft.com/office/drawing/2014/main" id="{54541E8E-D28A-43CF-BB16-6105187C26D8}"/>
-              </a:ext>
-            </a:extLst>
-          </p:cNvPr>
+          <p:cNvPr id="5" name="Footer Placeholder 4"/>
           <p:cNvSpPr>
             <a:spLocks noGrp="1"/>
           </p:cNvSpPr>
@@ -300,13 +270,7 @@
       </p:sp>
       <p:sp>
         <p:nvSpPr>
-          <p:cNvPr id="6" name="Slide Number Placeholder 5">
-            <a:extLst>
-              <a:ext uri="{FF2B5EF4-FFF2-40B4-BE49-F238E27FC236}">
-                <a16:creationId xmlns:a16="http://schemas.microsoft.com/office/drawing/2014/main" id="{DD78D4F2-AAD3-444B-A928-063994C22B1A}"/>
-              </a:ext>
-            </a:extLst>
-          </p:cNvPr>
+          <p:cNvPr id="6" name="Slide Number Placeholder 5"/>
           <p:cNvSpPr>
             <a:spLocks noGrp="1"/>
           </p:cNvSpPr>
@@ -321,18 +285,12 @@
           <a:p>
             <a:fld id="{75EA26F6-AC47-4D2A-8C6F-B74EB619C868}" type="slidenum">
               <a:rPr lang="zh-CN" altLang="en-US" smtClean="0"/>
-              <a:t>‹#›</a:t>
             </a:fld>
             <a:endParaRPr lang="zh-CN" altLang="en-US"/>
           </a:p>
         </p:txBody>
       </p:sp>
     </p:spTree>
-    <p:extLst>
-      <p:ext uri="{BB962C8B-B14F-4D97-AF65-F5344CB8AC3E}">
-        <p14:creationId xmlns:p14="http://schemas.microsoft.com/office/powerpoint/2010/main" val="3647117552"/>
-      </p:ext>
-    </p:extLst>
   </p:cSld>
   <p:clrMapOvr>
     <a:masterClrMapping/>
@@ -359,13 +317,7 @@
       </p:grpSpPr>
       <p:sp>
         <p:nvSpPr>
-          <p:cNvPr id="2" name="Title 1">
-            <a:extLst>
-              <a:ext uri="{FF2B5EF4-FFF2-40B4-BE49-F238E27FC236}">
-                <a16:creationId xmlns:a16="http://schemas.microsoft.com/office/drawing/2014/main" id="{750CAD69-D201-4987-9613-2E4345427539}"/>
-              </a:ext>
-            </a:extLst>
-          </p:cNvPr>
+          <p:cNvPr id="2" name="Title 1"/>
           <p:cNvSpPr>
             <a:spLocks noGrp="1"/>
           </p:cNvSpPr>
@@ -388,13 +340,7 @@
       </p:sp>
       <p:sp>
         <p:nvSpPr>
-          <p:cNvPr id="3" name="Vertical Text Placeholder 2">
-            <a:extLst>
-              <a:ext uri="{FF2B5EF4-FFF2-40B4-BE49-F238E27FC236}">
-                <a16:creationId xmlns:a16="http://schemas.microsoft.com/office/drawing/2014/main" id="{DAAD4AB9-1DFF-4F70-AE55-E5D985556A6C}"/>
-              </a:ext>
-            </a:extLst>
-          </p:cNvPr>
+          <p:cNvPr id="3" name="Vertical Text Placeholder 2"/>
           <p:cNvSpPr>
             <a:spLocks noGrp="1"/>
           </p:cNvSpPr>
@@ -412,6 +358,7 @@
               <a:rPr lang="en-US" altLang="zh-CN"/>
               <a:t>Click to edit Master text styles</a:t>
             </a:r>
+            <a:endParaRPr lang="en-US" altLang="zh-CN"/>
           </a:p>
           <a:p>
             <a:pPr lvl="1"/>
@@ -419,6 +366,7 @@
               <a:rPr lang="en-US" altLang="zh-CN"/>
               <a:t>Second level</a:t>
             </a:r>
+            <a:endParaRPr lang="en-US" altLang="zh-CN"/>
           </a:p>
           <a:p>
             <a:pPr lvl="2"/>
@@ -426,6 +374,7 @@
               <a:rPr lang="en-US" altLang="zh-CN"/>
               <a:t>Third level</a:t>
             </a:r>
+            <a:endParaRPr lang="en-US" altLang="zh-CN"/>
           </a:p>
           <a:p>
             <a:pPr lvl="3"/>
@@ -433,6 +382,7 @@
               <a:rPr lang="en-US" altLang="zh-CN"/>
               <a:t>Fourth level</a:t>
             </a:r>
+            <a:endParaRPr lang="en-US" altLang="zh-CN"/>
           </a:p>
           <a:p>
             <a:pPr lvl="4"/>
@@ -446,13 +396,7 @@
       </p:sp>
       <p:sp>
         <p:nvSpPr>
-          <p:cNvPr id="4" name="Date Placeholder 3">
-            <a:extLst>
-              <a:ext uri="{FF2B5EF4-FFF2-40B4-BE49-F238E27FC236}">
-                <a16:creationId xmlns:a16="http://schemas.microsoft.com/office/drawing/2014/main" id="{1A98A9A7-94B4-435D-9118-F51C6715BF4D}"/>
-              </a:ext>
-            </a:extLst>
-          </p:cNvPr>
+          <p:cNvPr id="4" name="Date Placeholder 3"/>
           <p:cNvSpPr>
             <a:spLocks noGrp="1"/>
           </p:cNvSpPr>
@@ -467,7 +411,6 @@
           <a:p>
             <a:fld id="{1706A504-8EB3-452A-98D0-9F946B298832}" type="datetimeFigureOut">
               <a:rPr lang="zh-CN" altLang="en-US" smtClean="0"/>
-              <a:t>2022/5/9</a:t>
             </a:fld>
             <a:endParaRPr lang="zh-CN" altLang="en-US"/>
           </a:p>
@@ -475,13 +418,7 @@
       </p:sp>
       <p:sp>
         <p:nvSpPr>
-          <p:cNvPr id="5" name="Footer Placeholder 4">
-            <a:extLst>
-              <a:ext uri="{FF2B5EF4-FFF2-40B4-BE49-F238E27FC236}">
-                <a16:creationId xmlns:a16="http://schemas.microsoft.com/office/drawing/2014/main" id="{FA2FDFBA-6C07-443F-8BD0-33B724981179}"/>
-              </a:ext>
-            </a:extLst>
-          </p:cNvPr>
+          <p:cNvPr id="5" name="Footer Placeholder 4"/>
           <p:cNvSpPr>
             <a:spLocks noGrp="1"/>
           </p:cNvSpPr>
@@ -500,13 +437,7 @@
       </p:sp>
       <p:sp>
         <p:nvSpPr>
-          <p:cNvPr id="6" name="Slide Number Placeholder 5">
-            <a:extLst>
-              <a:ext uri="{FF2B5EF4-FFF2-40B4-BE49-F238E27FC236}">
-                <a16:creationId xmlns:a16="http://schemas.microsoft.com/office/drawing/2014/main" id="{01591114-8000-4AA7-8E88-917E70212C07}"/>
-              </a:ext>
-            </a:extLst>
-          </p:cNvPr>
+          <p:cNvPr id="6" name="Slide Number Placeholder 5"/>
           <p:cNvSpPr>
             <a:spLocks noGrp="1"/>
           </p:cNvSpPr>
@@ -521,18 +452,12 @@
           <a:p>
             <a:fld id="{75EA26F6-AC47-4D2A-8C6F-B74EB619C868}" type="slidenum">
               <a:rPr lang="zh-CN" altLang="en-US" smtClean="0"/>
-              <a:t>‹#›</a:t>
             </a:fld>
             <a:endParaRPr lang="zh-CN" altLang="en-US"/>
           </a:p>
         </p:txBody>
       </p:sp>
     </p:spTree>
-    <p:extLst>
-      <p:ext uri="{BB962C8B-B14F-4D97-AF65-F5344CB8AC3E}">
-        <p14:creationId xmlns:p14="http://schemas.microsoft.com/office/powerpoint/2010/main" val="2879947702"/>
-      </p:ext>
-    </p:extLst>
   </p:cSld>
   <p:clrMapOvr>
     <a:masterClrMapping/>
@@ -559,13 +484,7 @@
       </p:grpSpPr>
       <p:sp>
         <p:nvSpPr>
-          <p:cNvPr id="2" name="Vertical Title 1">
-            <a:extLst>
-              <a:ext uri="{FF2B5EF4-FFF2-40B4-BE49-F238E27FC236}">
-                <a16:creationId xmlns:a16="http://schemas.microsoft.com/office/drawing/2014/main" id="{4C9F1D16-2A88-4465-BF4B-424686712A2F}"/>
-              </a:ext>
-            </a:extLst>
-          </p:cNvPr>
+          <p:cNvPr id="2" name="Vertical Title 1"/>
           <p:cNvSpPr>
             <a:spLocks noGrp="1"/>
           </p:cNvSpPr>
@@ -593,13 +512,7 @@
       </p:sp>
       <p:sp>
         <p:nvSpPr>
-          <p:cNvPr id="3" name="Vertical Text Placeholder 2">
-            <a:extLst>
-              <a:ext uri="{FF2B5EF4-FFF2-40B4-BE49-F238E27FC236}">
-                <a16:creationId xmlns:a16="http://schemas.microsoft.com/office/drawing/2014/main" id="{FFC5738F-F00B-468D-B389-6108FC9A8421}"/>
-              </a:ext>
-            </a:extLst>
-          </p:cNvPr>
+          <p:cNvPr id="3" name="Vertical Text Placeholder 2"/>
           <p:cNvSpPr>
             <a:spLocks noGrp="1"/>
           </p:cNvSpPr>
@@ -622,6 +535,7 @@
               <a:rPr lang="en-US" altLang="zh-CN"/>
               <a:t>Click to edit Master text styles</a:t>
             </a:r>
+            <a:endParaRPr lang="en-US" altLang="zh-CN"/>
           </a:p>
           <a:p>
             <a:pPr lvl="1"/>
@@ -629,6 +543,7 @@
               <a:rPr lang="en-US" altLang="zh-CN"/>
               <a:t>Second level</a:t>
             </a:r>
+            <a:endParaRPr lang="en-US" altLang="zh-CN"/>
           </a:p>
           <a:p>
             <a:pPr lvl="2"/>
@@ -636,6 +551,7 @@
               <a:rPr lang="en-US" altLang="zh-CN"/>
               <a:t>Third level</a:t>
             </a:r>
+            <a:endParaRPr lang="en-US" altLang="zh-CN"/>
           </a:p>
           <a:p>
             <a:pPr lvl="3"/>
@@ -643,6 +559,7 @@
               <a:rPr lang="en-US" altLang="zh-CN"/>
               <a:t>Fourth level</a:t>
             </a:r>
+            <a:endParaRPr lang="en-US" altLang="zh-CN"/>
           </a:p>
           <a:p>
             <a:pPr lvl="4"/>
@@ -656,13 +573,7 @@
       </p:sp>
       <p:sp>
         <p:nvSpPr>
-          <p:cNvPr id="4" name="Date Placeholder 3">
-            <a:extLst>
-              <a:ext uri="{FF2B5EF4-FFF2-40B4-BE49-F238E27FC236}">
-                <a16:creationId xmlns:a16="http://schemas.microsoft.com/office/drawing/2014/main" id="{7132C6C1-A378-403E-A267-B4737F2991EA}"/>
-              </a:ext>
-            </a:extLst>
-          </p:cNvPr>
+          <p:cNvPr id="4" name="Date Placeholder 3"/>
           <p:cNvSpPr>
             <a:spLocks noGrp="1"/>
           </p:cNvSpPr>
@@ -677,7 +588,6 @@
           <a:p>
             <a:fld id="{1706A504-8EB3-452A-98D0-9F946B298832}" type="datetimeFigureOut">
               <a:rPr lang="zh-CN" altLang="en-US" smtClean="0"/>
-              <a:t>2022/5/9</a:t>
             </a:fld>
             <a:endParaRPr lang="zh-CN" altLang="en-US"/>
           </a:p>
@@ -685,13 +595,7 @@
       </p:sp>
       <p:sp>
         <p:nvSpPr>
-          <p:cNvPr id="5" name="Footer Placeholder 4">
-            <a:extLst>
-              <a:ext uri="{FF2B5EF4-FFF2-40B4-BE49-F238E27FC236}">
-                <a16:creationId xmlns:a16="http://schemas.microsoft.com/office/drawing/2014/main" id="{FF42A026-2E6A-49E7-AC9E-1477E1B44329}"/>
-              </a:ext>
-            </a:extLst>
-          </p:cNvPr>
+          <p:cNvPr id="5" name="Footer Placeholder 4"/>
           <p:cNvSpPr>
             <a:spLocks noGrp="1"/>
           </p:cNvSpPr>
@@ -710,13 +614,7 @@
       </p:sp>
       <p:sp>
         <p:nvSpPr>
-          <p:cNvPr id="6" name="Slide Number Placeholder 5">
-            <a:extLst>
-              <a:ext uri="{FF2B5EF4-FFF2-40B4-BE49-F238E27FC236}">
-                <a16:creationId xmlns:a16="http://schemas.microsoft.com/office/drawing/2014/main" id="{891B91C1-3720-4192-97C2-FD4CE6D1F563}"/>
-              </a:ext>
-            </a:extLst>
-          </p:cNvPr>
+          <p:cNvPr id="6" name="Slide Number Placeholder 5"/>
           <p:cNvSpPr>
             <a:spLocks noGrp="1"/>
           </p:cNvSpPr>
@@ -731,18 +629,12 @@
           <a:p>
             <a:fld id="{75EA26F6-AC47-4D2A-8C6F-B74EB619C868}" type="slidenum">
               <a:rPr lang="zh-CN" altLang="en-US" smtClean="0"/>
-              <a:t>‹#›</a:t>
             </a:fld>
             <a:endParaRPr lang="zh-CN" altLang="en-US"/>
           </a:p>
         </p:txBody>
       </p:sp>
     </p:spTree>
-    <p:extLst>
-      <p:ext uri="{BB962C8B-B14F-4D97-AF65-F5344CB8AC3E}">
-        <p14:creationId xmlns:p14="http://schemas.microsoft.com/office/powerpoint/2010/main" val="2548202340"/>
-      </p:ext>
-    </p:extLst>
   </p:cSld>
   <p:clrMapOvr>
     <a:masterClrMapping/>
@@ -769,13 +661,7 @@
       </p:grpSpPr>
       <p:sp>
         <p:nvSpPr>
-          <p:cNvPr id="2" name="Title 1">
-            <a:extLst>
-              <a:ext uri="{FF2B5EF4-FFF2-40B4-BE49-F238E27FC236}">
-                <a16:creationId xmlns:a16="http://schemas.microsoft.com/office/drawing/2014/main" id="{A3238AA9-FE9F-4A0C-8DA1-526A624E0686}"/>
-              </a:ext>
-            </a:extLst>
-          </p:cNvPr>
+          <p:cNvPr id="2" name="Title 1"/>
           <p:cNvSpPr>
             <a:spLocks noGrp="1"/>
           </p:cNvSpPr>
@@ -798,13 +684,7 @@
       </p:sp>
       <p:sp>
         <p:nvSpPr>
-          <p:cNvPr id="3" name="Content Placeholder 2">
-            <a:extLst>
-              <a:ext uri="{FF2B5EF4-FFF2-40B4-BE49-F238E27FC236}">
-                <a16:creationId xmlns:a16="http://schemas.microsoft.com/office/drawing/2014/main" id="{0F38C7C2-5D4E-4228-BB9A-54D403C19329}"/>
-              </a:ext>
-            </a:extLst>
-          </p:cNvPr>
+          <p:cNvPr id="3" name="Content Placeholder 2"/>
           <p:cNvSpPr>
             <a:spLocks noGrp="1"/>
           </p:cNvSpPr>
@@ -822,6 +702,7 @@
               <a:rPr lang="en-US" altLang="zh-CN"/>
               <a:t>Click to edit Master text styles</a:t>
             </a:r>
+            <a:endParaRPr lang="en-US" altLang="zh-CN"/>
           </a:p>
           <a:p>
             <a:pPr lvl="1"/>
@@ -829,6 +710,7 @@
               <a:rPr lang="en-US" altLang="zh-CN"/>
               <a:t>Second level</a:t>
             </a:r>
+            <a:endParaRPr lang="en-US" altLang="zh-CN"/>
           </a:p>
           <a:p>
             <a:pPr lvl="2"/>
@@ -836,6 +718,7 @@
               <a:rPr lang="en-US" altLang="zh-CN"/>
               <a:t>Third level</a:t>
             </a:r>
+            <a:endParaRPr lang="en-US" altLang="zh-CN"/>
           </a:p>
           <a:p>
             <a:pPr lvl="3"/>
@@ -843,6 +726,7 @@
               <a:rPr lang="en-US" altLang="zh-CN"/>
               <a:t>Fourth level</a:t>
             </a:r>
+            <a:endParaRPr lang="en-US" altLang="zh-CN"/>
           </a:p>
           <a:p>
             <a:pPr lvl="4"/>
@@ -856,13 +740,7 @@
       </p:sp>
       <p:sp>
         <p:nvSpPr>
-          <p:cNvPr id="4" name="Date Placeholder 3">
-            <a:extLst>
-              <a:ext uri="{FF2B5EF4-FFF2-40B4-BE49-F238E27FC236}">
-                <a16:creationId xmlns:a16="http://schemas.microsoft.com/office/drawing/2014/main" id="{D3426518-68AB-43AB-96E2-8C2160E37362}"/>
-              </a:ext>
-            </a:extLst>
-          </p:cNvPr>
+          <p:cNvPr id="4" name="Date Placeholder 3"/>
           <p:cNvSpPr>
             <a:spLocks noGrp="1"/>
           </p:cNvSpPr>
@@ -877,7 +755,6 @@
           <a:p>
             <a:fld id="{1706A504-8EB3-452A-98D0-9F946B298832}" type="datetimeFigureOut">
               <a:rPr lang="zh-CN" altLang="en-US" smtClean="0"/>
-              <a:t>2022/5/9</a:t>
             </a:fld>
             <a:endParaRPr lang="zh-CN" altLang="en-US"/>
           </a:p>
@@ -885,13 +762,7 @@
       </p:sp>
       <p:sp>
         <p:nvSpPr>
-          <p:cNvPr id="5" name="Footer Placeholder 4">
-            <a:extLst>
-              <a:ext uri="{FF2B5EF4-FFF2-40B4-BE49-F238E27FC236}">
-                <a16:creationId xmlns:a16="http://schemas.microsoft.com/office/drawing/2014/main" id="{9DD63419-5856-40E2-AEA0-A0EE74D0A947}"/>
-              </a:ext>
-            </a:extLst>
-          </p:cNvPr>
+          <p:cNvPr id="5" name="Footer Placeholder 4"/>
           <p:cNvSpPr>
             <a:spLocks noGrp="1"/>
           </p:cNvSpPr>
@@ -910,13 +781,7 @@
       </p:sp>
       <p:sp>
         <p:nvSpPr>
-          <p:cNvPr id="6" name="Slide Number Placeholder 5">
-            <a:extLst>
-              <a:ext uri="{FF2B5EF4-FFF2-40B4-BE49-F238E27FC236}">
-                <a16:creationId xmlns:a16="http://schemas.microsoft.com/office/drawing/2014/main" id="{95BAC5FF-D5A1-4C60-9703-CA945F36B95B}"/>
-              </a:ext>
-            </a:extLst>
-          </p:cNvPr>
+          <p:cNvPr id="6" name="Slide Number Placeholder 5"/>
           <p:cNvSpPr>
             <a:spLocks noGrp="1"/>
           </p:cNvSpPr>
@@ -931,18 +796,12 @@
           <a:p>
             <a:fld id="{75EA26F6-AC47-4D2A-8C6F-B74EB619C868}" type="slidenum">
               <a:rPr lang="zh-CN" altLang="en-US" smtClean="0"/>
-              <a:t>‹#›</a:t>
             </a:fld>
             <a:endParaRPr lang="zh-CN" altLang="en-US"/>
           </a:p>
         </p:txBody>
       </p:sp>
     </p:spTree>
-    <p:extLst>
-      <p:ext uri="{BB962C8B-B14F-4D97-AF65-F5344CB8AC3E}">
-        <p14:creationId xmlns:p14="http://schemas.microsoft.com/office/powerpoint/2010/main" val="540002074"/>
-      </p:ext>
-    </p:extLst>
   </p:cSld>
   <p:clrMapOvr>
     <a:masterClrMapping/>
@@ -969,13 +828,7 @@
       </p:grpSpPr>
       <p:sp>
         <p:nvSpPr>
-          <p:cNvPr id="2" name="Title 1">
-            <a:extLst>
-              <a:ext uri="{FF2B5EF4-FFF2-40B4-BE49-F238E27FC236}">
-                <a16:creationId xmlns:a16="http://schemas.microsoft.com/office/drawing/2014/main" id="{D9D95A50-2DB6-4DC7-9BA6-6A1D21C8F6CD}"/>
-              </a:ext>
-            </a:extLst>
-          </p:cNvPr>
+          <p:cNvPr id="2" name="Title 1"/>
           <p:cNvSpPr>
             <a:spLocks noGrp="1"/>
           </p:cNvSpPr>
@@ -1007,13 +860,7 @@
       </p:sp>
       <p:sp>
         <p:nvSpPr>
-          <p:cNvPr id="3" name="Text Placeholder 2">
-            <a:extLst>
-              <a:ext uri="{FF2B5EF4-FFF2-40B4-BE49-F238E27FC236}">
-                <a16:creationId xmlns:a16="http://schemas.microsoft.com/office/drawing/2014/main" id="{78EDACE6-55C8-409C-9F15-A223B078997F}"/>
-              </a:ext>
-            </a:extLst>
-          </p:cNvPr>
+          <p:cNvPr id="3" name="Text Placeholder 2"/>
           <p:cNvSpPr>
             <a:spLocks noGrp="1"/>
           </p:cNvSpPr>
@@ -1127,18 +974,13 @@
               <a:rPr lang="en-US" altLang="zh-CN"/>
               <a:t>Click to edit Master text styles</a:t>
             </a:r>
-          </a:p>
-        </p:txBody>
-      </p:sp>
-      <p:sp>
-        <p:nvSpPr>
-          <p:cNvPr id="4" name="Date Placeholder 3">
-            <a:extLst>
-              <a:ext uri="{FF2B5EF4-FFF2-40B4-BE49-F238E27FC236}">
-                <a16:creationId xmlns:a16="http://schemas.microsoft.com/office/drawing/2014/main" id="{D7834FBA-02B0-4CCB-ADE2-40DE32808CA4}"/>
-              </a:ext>
-            </a:extLst>
-          </p:cNvPr>
+            <a:endParaRPr lang="en-US" altLang="zh-CN"/>
+          </a:p>
+        </p:txBody>
+      </p:sp>
+      <p:sp>
+        <p:nvSpPr>
+          <p:cNvPr id="4" name="Date Placeholder 3"/>
           <p:cNvSpPr>
             <a:spLocks noGrp="1"/>
           </p:cNvSpPr>
@@ -1153,7 +995,6 @@
           <a:p>
             <a:fld id="{1706A504-8EB3-452A-98D0-9F946B298832}" type="datetimeFigureOut">
               <a:rPr lang="zh-CN" altLang="en-US" smtClean="0"/>
-              <a:t>2022/5/9</a:t>
             </a:fld>
             <a:endParaRPr lang="zh-CN" altLang="en-US"/>
           </a:p>
@@ -1161,13 +1002,7 @@
       </p:sp>
       <p:sp>
         <p:nvSpPr>
-          <p:cNvPr id="5" name="Footer Placeholder 4">
-            <a:extLst>
-              <a:ext uri="{FF2B5EF4-FFF2-40B4-BE49-F238E27FC236}">
-                <a16:creationId xmlns:a16="http://schemas.microsoft.com/office/drawing/2014/main" id="{81700C30-09D2-4402-BBEC-6A136DDEABEC}"/>
-              </a:ext>
-            </a:extLst>
-          </p:cNvPr>
+          <p:cNvPr id="5" name="Footer Placeholder 4"/>
           <p:cNvSpPr>
             <a:spLocks noGrp="1"/>
           </p:cNvSpPr>
@@ -1186,13 +1021,7 @@
       </p:sp>
       <p:sp>
         <p:nvSpPr>
-          <p:cNvPr id="6" name="Slide Number Placeholder 5">
-            <a:extLst>
-              <a:ext uri="{FF2B5EF4-FFF2-40B4-BE49-F238E27FC236}">
-                <a16:creationId xmlns:a16="http://schemas.microsoft.com/office/drawing/2014/main" id="{38777910-1931-410A-8977-5CA89489D994}"/>
-              </a:ext>
-            </a:extLst>
-          </p:cNvPr>
+          <p:cNvPr id="6" name="Slide Number Placeholder 5"/>
           <p:cNvSpPr>
             <a:spLocks noGrp="1"/>
           </p:cNvSpPr>
@@ -1207,18 +1036,12 @@
           <a:p>
             <a:fld id="{75EA26F6-AC47-4D2A-8C6F-B74EB619C868}" type="slidenum">
               <a:rPr lang="zh-CN" altLang="en-US" smtClean="0"/>
-              <a:t>‹#›</a:t>
             </a:fld>
             <a:endParaRPr lang="zh-CN" altLang="en-US"/>
           </a:p>
         </p:txBody>
       </p:sp>
     </p:spTree>
-    <p:extLst>
-      <p:ext uri="{BB962C8B-B14F-4D97-AF65-F5344CB8AC3E}">
-        <p14:creationId xmlns:p14="http://schemas.microsoft.com/office/powerpoint/2010/main" val="4028483816"/>
-      </p:ext>
-    </p:extLst>
   </p:cSld>
   <p:clrMapOvr>
     <a:masterClrMapping/>
@@ -1245,13 +1068,7 @@
       </p:grpSpPr>
       <p:sp>
         <p:nvSpPr>
-          <p:cNvPr id="2" name="Title 1">
-            <a:extLst>
-              <a:ext uri="{FF2B5EF4-FFF2-40B4-BE49-F238E27FC236}">
-                <a16:creationId xmlns:a16="http://schemas.microsoft.com/office/drawing/2014/main" id="{6A7B9572-3ABA-4043-B78B-6ACA9108A5C8}"/>
-              </a:ext>
-            </a:extLst>
-          </p:cNvPr>
+          <p:cNvPr id="2" name="Title 1"/>
           <p:cNvSpPr>
             <a:spLocks noGrp="1"/>
           </p:cNvSpPr>
@@ -1274,13 +1091,7 @@
       </p:sp>
       <p:sp>
         <p:nvSpPr>
-          <p:cNvPr id="3" name="Content Placeholder 2">
-            <a:extLst>
-              <a:ext uri="{FF2B5EF4-FFF2-40B4-BE49-F238E27FC236}">
-                <a16:creationId xmlns:a16="http://schemas.microsoft.com/office/drawing/2014/main" id="{8F9BBEB2-F60F-402E-83A8-A085CFCBE80E}"/>
-              </a:ext>
-            </a:extLst>
-          </p:cNvPr>
+          <p:cNvPr id="3" name="Content Placeholder 2"/>
           <p:cNvSpPr>
             <a:spLocks noGrp="1"/>
           </p:cNvSpPr>
@@ -1303,6 +1114,7 @@
               <a:rPr lang="en-US" altLang="zh-CN"/>
               <a:t>Click to edit Master text styles</a:t>
             </a:r>
+            <a:endParaRPr lang="en-US" altLang="zh-CN"/>
           </a:p>
           <a:p>
             <a:pPr lvl="1"/>
@@ -1310,6 +1122,7 @@
               <a:rPr lang="en-US" altLang="zh-CN"/>
               <a:t>Second level</a:t>
             </a:r>
+            <a:endParaRPr lang="en-US" altLang="zh-CN"/>
           </a:p>
           <a:p>
             <a:pPr lvl="2"/>
@@ -1317,6 +1130,7 @@
               <a:rPr lang="en-US" altLang="zh-CN"/>
               <a:t>Third level</a:t>
             </a:r>
+            <a:endParaRPr lang="en-US" altLang="zh-CN"/>
           </a:p>
           <a:p>
             <a:pPr lvl="3"/>
@@ -1324,6 +1138,7 @@
               <a:rPr lang="en-US" altLang="zh-CN"/>
               <a:t>Fourth level</a:t>
             </a:r>
+            <a:endParaRPr lang="en-US" altLang="zh-CN"/>
           </a:p>
           <a:p>
             <a:pPr lvl="4"/>
@@ -1337,13 +1152,7 @@
       </p:sp>
       <p:sp>
         <p:nvSpPr>
-          <p:cNvPr id="4" name="Content Placeholder 3">
-            <a:extLst>
-              <a:ext uri="{FF2B5EF4-FFF2-40B4-BE49-F238E27FC236}">
-                <a16:creationId xmlns:a16="http://schemas.microsoft.com/office/drawing/2014/main" id="{F6A994DB-B2D5-495E-9248-081B64DB9A63}"/>
-              </a:ext>
-            </a:extLst>
-          </p:cNvPr>
+          <p:cNvPr id="4" name="Content Placeholder 3"/>
           <p:cNvSpPr>
             <a:spLocks noGrp="1"/>
           </p:cNvSpPr>
@@ -1366,6 +1175,7 @@
               <a:rPr lang="en-US" altLang="zh-CN"/>
               <a:t>Click to edit Master text styles</a:t>
             </a:r>
+            <a:endParaRPr lang="en-US" altLang="zh-CN"/>
           </a:p>
           <a:p>
             <a:pPr lvl="1"/>
@@ -1373,6 +1183,7 @@
               <a:rPr lang="en-US" altLang="zh-CN"/>
               <a:t>Second level</a:t>
             </a:r>
+            <a:endParaRPr lang="en-US" altLang="zh-CN"/>
           </a:p>
           <a:p>
             <a:pPr lvl="2"/>
@@ -1380,6 +1191,7 @@
               <a:rPr lang="en-US" altLang="zh-CN"/>
               <a:t>Third level</a:t>
             </a:r>
+            <a:endParaRPr lang="en-US" altLang="zh-CN"/>
           </a:p>
           <a:p>
             <a:pPr lvl="3"/>
@@ -1387,6 +1199,7 @@
               <a:rPr lang="en-US" altLang="zh-CN"/>
               <a:t>Fourth level</a:t>
             </a:r>
+            <a:endParaRPr lang="en-US" altLang="zh-CN"/>
           </a:p>
           <a:p>
             <a:pPr lvl="4"/>
@@ -1400,13 +1213,7 @@
       </p:sp>
       <p:sp>
         <p:nvSpPr>
-          <p:cNvPr id="5" name="Date Placeholder 4">
-            <a:extLst>
-              <a:ext uri="{FF2B5EF4-FFF2-40B4-BE49-F238E27FC236}">
-                <a16:creationId xmlns:a16="http://schemas.microsoft.com/office/drawing/2014/main" id="{2FCC3D0A-0A45-442D-B4E8-95CF25B7C797}"/>
-              </a:ext>
-            </a:extLst>
-          </p:cNvPr>
+          <p:cNvPr id="5" name="Date Placeholder 4"/>
           <p:cNvSpPr>
             <a:spLocks noGrp="1"/>
           </p:cNvSpPr>
@@ -1421,7 +1228,6 @@
           <a:p>
             <a:fld id="{1706A504-8EB3-452A-98D0-9F946B298832}" type="datetimeFigureOut">
               <a:rPr lang="zh-CN" altLang="en-US" smtClean="0"/>
-              <a:t>2022/5/9</a:t>
             </a:fld>
             <a:endParaRPr lang="zh-CN" altLang="en-US"/>
           </a:p>
@@ -1429,13 +1235,7 @@
       </p:sp>
       <p:sp>
         <p:nvSpPr>
-          <p:cNvPr id="6" name="Footer Placeholder 5">
-            <a:extLst>
-              <a:ext uri="{FF2B5EF4-FFF2-40B4-BE49-F238E27FC236}">
-                <a16:creationId xmlns:a16="http://schemas.microsoft.com/office/drawing/2014/main" id="{F64760AC-62B2-4F48-8D34-07C15AC941F0}"/>
-              </a:ext>
-            </a:extLst>
-          </p:cNvPr>
+          <p:cNvPr id="6" name="Footer Placeholder 5"/>
           <p:cNvSpPr>
             <a:spLocks noGrp="1"/>
           </p:cNvSpPr>
@@ -1454,13 +1254,7 @@
       </p:sp>
       <p:sp>
         <p:nvSpPr>
-          <p:cNvPr id="7" name="Slide Number Placeholder 6">
-            <a:extLst>
-              <a:ext uri="{FF2B5EF4-FFF2-40B4-BE49-F238E27FC236}">
-                <a16:creationId xmlns:a16="http://schemas.microsoft.com/office/drawing/2014/main" id="{0B72FA07-70AF-4740-8AB6-C28EABAD98DE}"/>
-              </a:ext>
-            </a:extLst>
-          </p:cNvPr>
+          <p:cNvPr id="7" name="Slide Number Placeholder 6"/>
           <p:cNvSpPr>
             <a:spLocks noGrp="1"/>
           </p:cNvSpPr>
@@ -1475,18 +1269,12 @@
           <a:p>
             <a:fld id="{75EA26F6-AC47-4D2A-8C6F-B74EB619C868}" type="slidenum">
               <a:rPr lang="zh-CN" altLang="en-US" smtClean="0"/>
-              <a:t>‹#›</a:t>
             </a:fld>
             <a:endParaRPr lang="zh-CN" altLang="en-US"/>
           </a:p>
         </p:txBody>
       </p:sp>
     </p:spTree>
-    <p:extLst>
-      <p:ext uri="{BB962C8B-B14F-4D97-AF65-F5344CB8AC3E}">
-        <p14:creationId xmlns:p14="http://schemas.microsoft.com/office/powerpoint/2010/main" val="2040627744"/>
-      </p:ext>
-    </p:extLst>
   </p:cSld>
   <p:clrMapOvr>
     <a:masterClrMapping/>
@@ -1513,13 +1301,7 @@
       </p:grpSpPr>
       <p:sp>
         <p:nvSpPr>
-          <p:cNvPr id="2" name="Title 1">
-            <a:extLst>
-              <a:ext uri="{FF2B5EF4-FFF2-40B4-BE49-F238E27FC236}">
-                <a16:creationId xmlns:a16="http://schemas.microsoft.com/office/drawing/2014/main" id="{5E048620-AA2C-4185-A6BE-C0D189F49D1E}"/>
-              </a:ext>
-            </a:extLst>
-          </p:cNvPr>
+          <p:cNvPr id="2" name="Title 1"/>
           <p:cNvSpPr>
             <a:spLocks noGrp="1"/>
           </p:cNvSpPr>
@@ -1547,13 +1329,7 @@
       </p:sp>
       <p:sp>
         <p:nvSpPr>
-          <p:cNvPr id="3" name="Text Placeholder 2">
-            <a:extLst>
-              <a:ext uri="{FF2B5EF4-FFF2-40B4-BE49-F238E27FC236}">
-                <a16:creationId xmlns:a16="http://schemas.microsoft.com/office/drawing/2014/main" id="{AD5A1567-0B41-4B55-9476-91FD75A8AE05}"/>
-              </a:ext>
-            </a:extLst>
-          </p:cNvPr>
+          <p:cNvPr id="3" name="Text Placeholder 2"/>
           <p:cNvSpPr>
             <a:spLocks noGrp="1"/>
           </p:cNvSpPr>
@@ -1613,18 +1389,13 @@
               <a:rPr lang="en-US" altLang="zh-CN"/>
               <a:t>Click to edit Master text styles</a:t>
             </a:r>
-          </a:p>
-        </p:txBody>
-      </p:sp>
-      <p:sp>
-        <p:nvSpPr>
-          <p:cNvPr id="4" name="Content Placeholder 3">
-            <a:extLst>
-              <a:ext uri="{FF2B5EF4-FFF2-40B4-BE49-F238E27FC236}">
-                <a16:creationId xmlns:a16="http://schemas.microsoft.com/office/drawing/2014/main" id="{74CE9D3C-660E-4128-B816-63FF485180EF}"/>
-              </a:ext>
-            </a:extLst>
-          </p:cNvPr>
+            <a:endParaRPr lang="en-US" altLang="zh-CN"/>
+          </a:p>
+        </p:txBody>
+      </p:sp>
+      <p:sp>
+        <p:nvSpPr>
+          <p:cNvPr id="4" name="Content Placeholder 3"/>
           <p:cNvSpPr>
             <a:spLocks noGrp="1"/>
           </p:cNvSpPr>
@@ -1647,6 +1418,7 @@
               <a:rPr lang="en-US" altLang="zh-CN"/>
               <a:t>Click to edit Master text styles</a:t>
             </a:r>
+            <a:endParaRPr lang="en-US" altLang="zh-CN"/>
           </a:p>
           <a:p>
             <a:pPr lvl="1"/>
@@ -1654,6 +1426,7 @@
               <a:rPr lang="en-US" altLang="zh-CN"/>
               <a:t>Second level</a:t>
             </a:r>
+            <a:endParaRPr lang="en-US" altLang="zh-CN"/>
           </a:p>
           <a:p>
             <a:pPr lvl="2"/>
@@ -1661,6 +1434,7 @@
               <a:rPr lang="en-US" altLang="zh-CN"/>
               <a:t>Third level</a:t>
             </a:r>
+            <a:endParaRPr lang="en-US" altLang="zh-CN"/>
           </a:p>
           <a:p>
             <a:pPr lvl="3"/>
@@ -1668,6 +1442,7 @@
               <a:rPr lang="en-US" altLang="zh-CN"/>
               <a:t>Fourth level</a:t>
             </a:r>
+            <a:endParaRPr lang="en-US" altLang="zh-CN"/>
           </a:p>
           <a:p>
             <a:pPr lvl="4"/>
@@ -1681,13 +1456,7 @@
       </p:sp>
       <p:sp>
         <p:nvSpPr>
-          <p:cNvPr id="5" name="Text Placeholder 4">
-            <a:extLst>
-              <a:ext uri="{FF2B5EF4-FFF2-40B4-BE49-F238E27FC236}">
-                <a16:creationId xmlns:a16="http://schemas.microsoft.com/office/drawing/2014/main" id="{2D97A1AA-DF34-4995-AD0A-68B8D323F65B}"/>
-              </a:ext>
-            </a:extLst>
-          </p:cNvPr>
+          <p:cNvPr id="5" name="Text Placeholder 4"/>
           <p:cNvSpPr>
             <a:spLocks noGrp="1"/>
           </p:cNvSpPr>
@@ -1747,18 +1516,13 @@
               <a:rPr lang="en-US" altLang="zh-CN"/>
               <a:t>Click to edit Master text styles</a:t>
             </a:r>
-          </a:p>
-        </p:txBody>
-      </p:sp>
-      <p:sp>
-        <p:nvSpPr>
-          <p:cNvPr id="6" name="Content Placeholder 5">
-            <a:extLst>
-              <a:ext uri="{FF2B5EF4-FFF2-40B4-BE49-F238E27FC236}">
-                <a16:creationId xmlns:a16="http://schemas.microsoft.com/office/drawing/2014/main" id="{DDA26CAB-DF4B-4E0D-93E6-66F14D5DD32A}"/>
-              </a:ext>
-            </a:extLst>
-          </p:cNvPr>
+            <a:endParaRPr lang="en-US" altLang="zh-CN"/>
+          </a:p>
+        </p:txBody>
+      </p:sp>
+      <p:sp>
+        <p:nvSpPr>
+          <p:cNvPr id="6" name="Content Placeholder 5"/>
           <p:cNvSpPr>
             <a:spLocks noGrp="1"/>
           </p:cNvSpPr>
@@ -1781,6 +1545,7 @@
               <a:rPr lang="en-US" altLang="zh-CN"/>
               <a:t>Click to edit Master text styles</a:t>
             </a:r>
+            <a:endParaRPr lang="en-US" altLang="zh-CN"/>
           </a:p>
           <a:p>
             <a:pPr lvl="1"/>
@@ -1788,6 +1553,7 @@
               <a:rPr lang="en-US" altLang="zh-CN"/>
               <a:t>Second level</a:t>
             </a:r>
+            <a:endParaRPr lang="en-US" altLang="zh-CN"/>
           </a:p>
           <a:p>
             <a:pPr lvl="2"/>
@@ -1795,6 +1561,7 @@
               <a:rPr lang="en-US" altLang="zh-CN"/>
               <a:t>Third level</a:t>
             </a:r>
+            <a:endParaRPr lang="en-US" altLang="zh-CN"/>
           </a:p>
           <a:p>
             <a:pPr lvl="3"/>
@@ -1802,6 +1569,7 @@
               <a:rPr lang="en-US" altLang="zh-CN"/>
               <a:t>Fourth level</a:t>
             </a:r>
+            <a:endParaRPr lang="en-US" altLang="zh-CN"/>
           </a:p>
           <a:p>
             <a:pPr lvl="4"/>
@@ -1815,13 +1583,7 @@
       </p:sp>
       <p:sp>
         <p:nvSpPr>
-          <p:cNvPr id="7" name="Date Placeholder 6">
-            <a:extLst>
-              <a:ext uri="{FF2B5EF4-FFF2-40B4-BE49-F238E27FC236}">
-                <a16:creationId xmlns:a16="http://schemas.microsoft.com/office/drawing/2014/main" id="{61AA75E3-97AC-4417-A915-74888DC02F2E}"/>
-              </a:ext>
-            </a:extLst>
-          </p:cNvPr>
+          <p:cNvPr id="7" name="Date Placeholder 6"/>
           <p:cNvSpPr>
             <a:spLocks noGrp="1"/>
           </p:cNvSpPr>
@@ -1836,7 +1598,6 @@
           <a:p>
             <a:fld id="{1706A504-8EB3-452A-98D0-9F946B298832}" type="datetimeFigureOut">
               <a:rPr lang="zh-CN" altLang="en-US" smtClean="0"/>
-              <a:t>2022/5/9</a:t>
             </a:fld>
             <a:endParaRPr lang="zh-CN" altLang="en-US"/>
           </a:p>
@@ -1844,13 +1605,7 @@
       </p:sp>
       <p:sp>
         <p:nvSpPr>
-          <p:cNvPr id="8" name="Footer Placeholder 7">
-            <a:extLst>
-              <a:ext uri="{FF2B5EF4-FFF2-40B4-BE49-F238E27FC236}">
-                <a16:creationId xmlns:a16="http://schemas.microsoft.com/office/drawing/2014/main" id="{2F98AC7F-9C36-4EA8-9DDB-F6401841CCF6}"/>
-              </a:ext>
-            </a:extLst>
-          </p:cNvPr>
+          <p:cNvPr id="8" name="Footer Placeholder 7"/>
           <p:cNvSpPr>
             <a:spLocks noGrp="1"/>
           </p:cNvSpPr>
@@ -1869,13 +1624,7 @@
       </p:sp>
       <p:sp>
         <p:nvSpPr>
-          <p:cNvPr id="9" name="Slide Number Placeholder 8">
-            <a:extLst>
-              <a:ext uri="{FF2B5EF4-FFF2-40B4-BE49-F238E27FC236}">
-                <a16:creationId xmlns:a16="http://schemas.microsoft.com/office/drawing/2014/main" id="{8018D2D3-AD9D-4025-BCFC-086202107B48}"/>
-              </a:ext>
-            </a:extLst>
-          </p:cNvPr>
+          <p:cNvPr id="9" name="Slide Number Placeholder 8"/>
           <p:cNvSpPr>
             <a:spLocks noGrp="1"/>
           </p:cNvSpPr>
@@ -1890,18 +1639,12 @@
           <a:p>
             <a:fld id="{75EA26F6-AC47-4D2A-8C6F-B74EB619C868}" type="slidenum">
               <a:rPr lang="zh-CN" altLang="en-US" smtClean="0"/>
-              <a:t>‹#›</a:t>
             </a:fld>
             <a:endParaRPr lang="zh-CN" altLang="en-US"/>
           </a:p>
         </p:txBody>
       </p:sp>
     </p:spTree>
-    <p:extLst>
-      <p:ext uri="{BB962C8B-B14F-4D97-AF65-F5344CB8AC3E}">
-        <p14:creationId xmlns:p14="http://schemas.microsoft.com/office/powerpoint/2010/main" val="2377817711"/>
-      </p:ext>
-    </p:extLst>
   </p:cSld>
   <p:clrMapOvr>
     <a:masterClrMapping/>
@@ -1928,13 +1671,7 @@
       </p:grpSpPr>
       <p:sp>
         <p:nvSpPr>
-          <p:cNvPr id="2" name="Title 1">
-            <a:extLst>
-              <a:ext uri="{FF2B5EF4-FFF2-40B4-BE49-F238E27FC236}">
-                <a16:creationId xmlns:a16="http://schemas.microsoft.com/office/drawing/2014/main" id="{4D110954-3FA6-47D3-9AB1-7CE63AB1C822}"/>
-              </a:ext>
-            </a:extLst>
-          </p:cNvPr>
+          <p:cNvPr id="2" name="Title 1"/>
           <p:cNvSpPr>
             <a:spLocks noGrp="1"/>
           </p:cNvSpPr>
@@ -1957,13 +1694,7 @@
       </p:sp>
       <p:sp>
         <p:nvSpPr>
-          <p:cNvPr id="3" name="Date Placeholder 2">
-            <a:extLst>
-              <a:ext uri="{FF2B5EF4-FFF2-40B4-BE49-F238E27FC236}">
-                <a16:creationId xmlns:a16="http://schemas.microsoft.com/office/drawing/2014/main" id="{81146694-132C-4C97-9256-E602BA5F800A}"/>
-              </a:ext>
-            </a:extLst>
-          </p:cNvPr>
+          <p:cNvPr id="3" name="Date Placeholder 2"/>
           <p:cNvSpPr>
             <a:spLocks noGrp="1"/>
           </p:cNvSpPr>
@@ -1978,7 +1709,6 @@
           <a:p>
             <a:fld id="{1706A504-8EB3-452A-98D0-9F946B298832}" type="datetimeFigureOut">
               <a:rPr lang="zh-CN" altLang="en-US" smtClean="0"/>
-              <a:t>2022/5/9</a:t>
             </a:fld>
             <a:endParaRPr lang="zh-CN" altLang="en-US"/>
           </a:p>
@@ -1986,13 +1716,7 @@
       </p:sp>
       <p:sp>
         <p:nvSpPr>
-          <p:cNvPr id="4" name="Footer Placeholder 3">
-            <a:extLst>
-              <a:ext uri="{FF2B5EF4-FFF2-40B4-BE49-F238E27FC236}">
-                <a16:creationId xmlns:a16="http://schemas.microsoft.com/office/drawing/2014/main" id="{B77259C2-F33F-4EC7-BFA5-8A4F232B8563}"/>
-              </a:ext>
-            </a:extLst>
-          </p:cNvPr>
+          <p:cNvPr id="4" name="Footer Placeholder 3"/>
           <p:cNvSpPr>
             <a:spLocks noGrp="1"/>
           </p:cNvSpPr>
@@ -2011,13 +1735,7 @@
       </p:sp>
       <p:sp>
         <p:nvSpPr>
-          <p:cNvPr id="5" name="Slide Number Placeholder 4">
-            <a:extLst>
-              <a:ext uri="{FF2B5EF4-FFF2-40B4-BE49-F238E27FC236}">
-                <a16:creationId xmlns:a16="http://schemas.microsoft.com/office/drawing/2014/main" id="{E47BEC87-D149-4439-B834-1357F5DAADE2}"/>
-              </a:ext>
-            </a:extLst>
-          </p:cNvPr>
+          <p:cNvPr id="5" name="Slide Number Placeholder 4"/>
           <p:cNvSpPr>
             <a:spLocks noGrp="1"/>
           </p:cNvSpPr>
@@ -2032,18 +1750,12 @@
           <a:p>
             <a:fld id="{75EA26F6-AC47-4D2A-8C6F-B74EB619C868}" type="slidenum">
               <a:rPr lang="zh-CN" altLang="en-US" smtClean="0"/>
-              <a:t>‹#›</a:t>
             </a:fld>
             <a:endParaRPr lang="zh-CN" altLang="en-US"/>
           </a:p>
         </p:txBody>
       </p:sp>
     </p:spTree>
-    <p:extLst>
-      <p:ext uri="{BB962C8B-B14F-4D97-AF65-F5344CB8AC3E}">
-        <p14:creationId xmlns:p14="http://schemas.microsoft.com/office/powerpoint/2010/main" val="2257442514"/>
-      </p:ext>
-    </p:extLst>
   </p:cSld>
   <p:clrMapOvr>
     <a:masterClrMapping/>
@@ -2070,13 +1782,7 @@
       </p:grpSpPr>
       <p:sp>
         <p:nvSpPr>
-          <p:cNvPr id="2" name="Date Placeholder 1">
-            <a:extLst>
-              <a:ext uri="{FF2B5EF4-FFF2-40B4-BE49-F238E27FC236}">
-                <a16:creationId xmlns:a16="http://schemas.microsoft.com/office/drawing/2014/main" id="{A6F1404A-C02E-4AAC-8B2F-5DA8D0EF9479}"/>
-              </a:ext>
-            </a:extLst>
-          </p:cNvPr>
+          <p:cNvPr id="2" name="Date Placeholder 1"/>
           <p:cNvSpPr>
             <a:spLocks noGrp="1"/>
           </p:cNvSpPr>
@@ -2091,7 +1797,6 @@
           <a:p>
             <a:fld id="{1706A504-8EB3-452A-98D0-9F946B298832}" type="datetimeFigureOut">
               <a:rPr lang="zh-CN" altLang="en-US" smtClean="0"/>
-              <a:t>2022/5/9</a:t>
             </a:fld>
             <a:endParaRPr lang="zh-CN" altLang="en-US"/>
           </a:p>
@@ -2099,13 +1804,7 @@
       </p:sp>
       <p:sp>
         <p:nvSpPr>
-          <p:cNvPr id="3" name="Footer Placeholder 2">
-            <a:extLst>
-              <a:ext uri="{FF2B5EF4-FFF2-40B4-BE49-F238E27FC236}">
-                <a16:creationId xmlns:a16="http://schemas.microsoft.com/office/drawing/2014/main" id="{FEBCC798-47BA-4B3A-BD14-C60541EF35D4}"/>
-              </a:ext>
-            </a:extLst>
-          </p:cNvPr>
+          <p:cNvPr id="3" name="Footer Placeholder 2"/>
           <p:cNvSpPr>
             <a:spLocks noGrp="1"/>
           </p:cNvSpPr>
@@ -2124,13 +1823,7 @@
       </p:sp>
       <p:sp>
         <p:nvSpPr>
-          <p:cNvPr id="4" name="Slide Number Placeholder 3">
-            <a:extLst>
-              <a:ext uri="{FF2B5EF4-FFF2-40B4-BE49-F238E27FC236}">
-                <a16:creationId xmlns:a16="http://schemas.microsoft.com/office/drawing/2014/main" id="{64C0D6BA-A977-40E5-9BB3-1F30C13E1716}"/>
-              </a:ext>
-            </a:extLst>
-          </p:cNvPr>
+          <p:cNvPr id="4" name="Slide Number Placeholder 3"/>
           <p:cNvSpPr>
             <a:spLocks noGrp="1"/>
           </p:cNvSpPr>
@@ -2145,18 +1838,12 @@
           <a:p>
             <a:fld id="{75EA26F6-AC47-4D2A-8C6F-B74EB619C868}" type="slidenum">
               <a:rPr lang="zh-CN" altLang="en-US" smtClean="0"/>
-              <a:t>‹#›</a:t>
             </a:fld>
             <a:endParaRPr lang="zh-CN" altLang="en-US"/>
           </a:p>
         </p:txBody>
       </p:sp>
     </p:spTree>
-    <p:extLst>
-      <p:ext uri="{BB962C8B-B14F-4D97-AF65-F5344CB8AC3E}">
-        <p14:creationId xmlns:p14="http://schemas.microsoft.com/office/powerpoint/2010/main" val="2659889124"/>
-      </p:ext>
-    </p:extLst>
   </p:cSld>
   <p:clrMapOvr>
     <a:masterClrMapping/>
@@ -2183,13 +1870,7 @@
       </p:grpSpPr>
       <p:sp>
         <p:nvSpPr>
-          <p:cNvPr id="2" name="Title 1">
-            <a:extLst>
-              <a:ext uri="{FF2B5EF4-FFF2-40B4-BE49-F238E27FC236}">
-                <a16:creationId xmlns:a16="http://schemas.microsoft.com/office/drawing/2014/main" id="{389822D3-009B-4FF4-A649-A55093C12F01}"/>
-              </a:ext>
-            </a:extLst>
-          </p:cNvPr>
+          <p:cNvPr id="2" name="Title 1"/>
           <p:cNvSpPr>
             <a:spLocks noGrp="1"/>
           </p:cNvSpPr>
@@ -2221,13 +1902,7 @@
       </p:sp>
       <p:sp>
         <p:nvSpPr>
-          <p:cNvPr id="3" name="Content Placeholder 2">
-            <a:extLst>
-              <a:ext uri="{FF2B5EF4-FFF2-40B4-BE49-F238E27FC236}">
-                <a16:creationId xmlns:a16="http://schemas.microsoft.com/office/drawing/2014/main" id="{ED8AD2E2-0B85-4B4C-A0D1-8B0DF50CF69F}"/>
-              </a:ext>
-            </a:extLst>
-          </p:cNvPr>
+          <p:cNvPr id="3" name="Content Placeholder 2"/>
           <p:cNvSpPr>
             <a:spLocks noGrp="1"/>
           </p:cNvSpPr>
@@ -2278,6 +1953,7 @@
               <a:rPr lang="en-US" altLang="zh-CN"/>
               <a:t>Click to edit Master text styles</a:t>
             </a:r>
+            <a:endParaRPr lang="en-US" altLang="zh-CN"/>
           </a:p>
           <a:p>
             <a:pPr lvl="1"/>
@@ -2285,6 +1961,7 @@
               <a:rPr lang="en-US" altLang="zh-CN"/>
               <a:t>Second level</a:t>
             </a:r>
+            <a:endParaRPr lang="en-US" altLang="zh-CN"/>
           </a:p>
           <a:p>
             <a:pPr lvl="2"/>
@@ -2292,6 +1969,7 @@
               <a:rPr lang="en-US" altLang="zh-CN"/>
               <a:t>Third level</a:t>
             </a:r>
+            <a:endParaRPr lang="en-US" altLang="zh-CN"/>
           </a:p>
           <a:p>
             <a:pPr lvl="3"/>
@@ -2299,6 +1977,7 @@
               <a:rPr lang="en-US" altLang="zh-CN"/>
               <a:t>Fourth level</a:t>
             </a:r>
+            <a:endParaRPr lang="en-US" altLang="zh-CN"/>
           </a:p>
           <a:p>
             <a:pPr lvl="4"/>
@@ -2312,13 +1991,7 @@
       </p:sp>
       <p:sp>
         <p:nvSpPr>
-          <p:cNvPr id="4" name="Text Placeholder 3">
-            <a:extLst>
-              <a:ext uri="{FF2B5EF4-FFF2-40B4-BE49-F238E27FC236}">
-                <a16:creationId xmlns:a16="http://schemas.microsoft.com/office/drawing/2014/main" id="{3FC56236-4B04-431B-9E3B-A003FF5DA92C}"/>
-              </a:ext>
-            </a:extLst>
-          </p:cNvPr>
+          <p:cNvPr id="4" name="Text Placeholder 3"/>
           <p:cNvSpPr>
             <a:spLocks noGrp="1"/>
           </p:cNvSpPr>
@@ -2378,18 +2051,13 @@
               <a:rPr lang="en-US" altLang="zh-CN"/>
               <a:t>Click to edit Master text styles</a:t>
             </a:r>
-          </a:p>
-        </p:txBody>
-      </p:sp>
-      <p:sp>
-        <p:nvSpPr>
-          <p:cNvPr id="5" name="Date Placeholder 4">
-            <a:extLst>
-              <a:ext uri="{FF2B5EF4-FFF2-40B4-BE49-F238E27FC236}">
-                <a16:creationId xmlns:a16="http://schemas.microsoft.com/office/drawing/2014/main" id="{CF5FCA9B-C623-4DBF-A99E-E01C5A1EFCE7}"/>
-              </a:ext>
-            </a:extLst>
-          </p:cNvPr>
+            <a:endParaRPr lang="en-US" altLang="zh-CN"/>
+          </a:p>
+        </p:txBody>
+      </p:sp>
+      <p:sp>
+        <p:nvSpPr>
+          <p:cNvPr id="5" name="Date Placeholder 4"/>
           <p:cNvSpPr>
             <a:spLocks noGrp="1"/>
           </p:cNvSpPr>
@@ -2404,7 +2072,6 @@
           <a:p>
             <a:fld id="{1706A504-8EB3-452A-98D0-9F946B298832}" type="datetimeFigureOut">
               <a:rPr lang="zh-CN" altLang="en-US" smtClean="0"/>
-              <a:t>2022/5/9</a:t>
             </a:fld>
             <a:endParaRPr lang="zh-CN" altLang="en-US"/>
           </a:p>
@@ -2412,13 +2079,7 @@
       </p:sp>
       <p:sp>
         <p:nvSpPr>
-          <p:cNvPr id="6" name="Footer Placeholder 5">
-            <a:extLst>
-              <a:ext uri="{FF2B5EF4-FFF2-40B4-BE49-F238E27FC236}">
-                <a16:creationId xmlns:a16="http://schemas.microsoft.com/office/drawing/2014/main" id="{18B89C00-739D-4910-8A23-443CCEAA32E7}"/>
-              </a:ext>
-            </a:extLst>
-          </p:cNvPr>
+          <p:cNvPr id="6" name="Footer Placeholder 5"/>
           <p:cNvSpPr>
             <a:spLocks noGrp="1"/>
           </p:cNvSpPr>
@@ -2437,13 +2098,7 @@
       </p:sp>
       <p:sp>
         <p:nvSpPr>
-          <p:cNvPr id="7" name="Slide Number Placeholder 6">
-            <a:extLst>
-              <a:ext uri="{FF2B5EF4-FFF2-40B4-BE49-F238E27FC236}">
-                <a16:creationId xmlns:a16="http://schemas.microsoft.com/office/drawing/2014/main" id="{00D85984-82B5-4082-A5D9-F0DC6B627587}"/>
-              </a:ext>
-            </a:extLst>
-          </p:cNvPr>
+          <p:cNvPr id="7" name="Slide Number Placeholder 6"/>
           <p:cNvSpPr>
             <a:spLocks noGrp="1"/>
           </p:cNvSpPr>
@@ -2458,18 +2113,12 @@
           <a:p>
             <a:fld id="{75EA26F6-AC47-4D2A-8C6F-B74EB619C868}" type="slidenum">
               <a:rPr lang="zh-CN" altLang="en-US" smtClean="0"/>
-              <a:t>‹#›</a:t>
             </a:fld>
             <a:endParaRPr lang="zh-CN" altLang="en-US"/>
           </a:p>
         </p:txBody>
       </p:sp>
     </p:spTree>
-    <p:extLst>
-      <p:ext uri="{BB962C8B-B14F-4D97-AF65-F5344CB8AC3E}">
-        <p14:creationId xmlns:p14="http://schemas.microsoft.com/office/powerpoint/2010/main" val="945412638"/>
-      </p:ext>
-    </p:extLst>
   </p:cSld>
   <p:clrMapOvr>
     <a:masterClrMapping/>
@@ -2496,13 +2145,7 @@
       </p:grpSpPr>
       <p:sp>
         <p:nvSpPr>
-          <p:cNvPr id="2" name="Title 1">
-            <a:extLst>
-              <a:ext uri="{FF2B5EF4-FFF2-40B4-BE49-F238E27FC236}">
-                <a16:creationId xmlns:a16="http://schemas.microsoft.com/office/drawing/2014/main" id="{9251469C-5595-47AF-861C-AABD316E42EC}"/>
-              </a:ext>
-            </a:extLst>
-          </p:cNvPr>
+          <p:cNvPr id="2" name="Title 1"/>
           <p:cNvSpPr>
             <a:spLocks noGrp="1"/>
           </p:cNvSpPr>
@@ -2534,13 +2177,7 @@
       </p:sp>
       <p:sp>
         <p:nvSpPr>
-          <p:cNvPr id="3" name="Picture Placeholder 2">
-            <a:extLst>
-              <a:ext uri="{FF2B5EF4-FFF2-40B4-BE49-F238E27FC236}">
-                <a16:creationId xmlns:a16="http://schemas.microsoft.com/office/drawing/2014/main" id="{47FFEA6A-4366-4C95-831F-C7373BD7DA01}"/>
-              </a:ext>
-            </a:extLst>
-          </p:cNvPr>
+          <p:cNvPr id="3" name="Picture Placeholder 2"/>
           <p:cNvSpPr>
             <a:spLocks noGrp="1"/>
           </p:cNvSpPr>
@@ -2601,13 +2238,7 @@
       </p:sp>
       <p:sp>
         <p:nvSpPr>
-          <p:cNvPr id="4" name="Text Placeholder 3">
-            <a:extLst>
-              <a:ext uri="{FF2B5EF4-FFF2-40B4-BE49-F238E27FC236}">
-                <a16:creationId xmlns:a16="http://schemas.microsoft.com/office/drawing/2014/main" id="{41E344FB-0F54-4A93-B6C1-E84BAC1C2C69}"/>
-              </a:ext>
-            </a:extLst>
-          </p:cNvPr>
+          <p:cNvPr id="4" name="Text Placeholder 3"/>
           <p:cNvSpPr>
             <a:spLocks noGrp="1"/>
           </p:cNvSpPr>
@@ -2667,18 +2298,13 @@
               <a:rPr lang="en-US" altLang="zh-CN"/>
               <a:t>Click to edit Master text styles</a:t>
             </a:r>
-          </a:p>
-        </p:txBody>
-      </p:sp>
-      <p:sp>
-        <p:nvSpPr>
-          <p:cNvPr id="5" name="Date Placeholder 4">
-            <a:extLst>
-              <a:ext uri="{FF2B5EF4-FFF2-40B4-BE49-F238E27FC236}">
-                <a16:creationId xmlns:a16="http://schemas.microsoft.com/office/drawing/2014/main" id="{2EC3A9CD-75C7-4280-9180-5BC406121268}"/>
-              </a:ext>
-            </a:extLst>
-          </p:cNvPr>
+            <a:endParaRPr lang="en-US" altLang="zh-CN"/>
+          </a:p>
+        </p:txBody>
+      </p:sp>
+      <p:sp>
+        <p:nvSpPr>
+          <p:cNvPr id="5" name="Date Placeholder 4"/>
           <p:cNvSpPr>
             <a:spLocks noGrp="1"/>
           </p:cNvSpPr>
@@ -2693,7 +2319,6 @@
           <a:p>
             <a:fld id="{1706A504-8EB3-452A-98D0-9F946B298832}" type="datetimeFigureOut">
               <a:rPr lang="zh-CN" altLang="en-US" smtClean="0"/>
-              <a:t>2022/5/9</a:t>
             </a:fld>
             <a:endParaRPr lang="zh-CN" altLang="en-US"/>
           </a:p>
@@ -2701,13 +2326,7 @@
       </p:sp>
       <p:sp>
         <p:nvSpPr>
-          <p:cNvPr id="6" name="Footer Placeholder 5">
-            <a:extLst>
-              <a:ext uri="{FF2B5EF4-FFF2-40B4-BE49-F238E27FC236}">
-                <a16:creationId xmlns:a16="http://schemas.microsoft.com/office/drawing/2014/main" id="{5FE334E7-E3DC-403A-99E0-DCF1AF01BDAE}"/>
-              </a:ext>
-            </a:extLst>
-          </p:cNvPr>
+          <p:cNvPr id="6" name="Footer Placeholder 5"/>
           <p:cNvSpPr>
             <a:spLocks noGrp="1"/>
           </p:cNvSpPr>
@@ -2726,13 +2345,7 @@
       </p:sp>
       <p:sp>
         <p:nvSpPr>
-          <p:cNvPr id="7" name="Slide Number Placeholder 6">
-            <a:extLst>
-              <a:ext uri="{FF2B5EF4-FFF2-40B4-BE49-F238E27FC236}">
-                <a16:creationId xmlns:a16="http://schemas.microsoft.com/office/drawing/2014/main" id="{72B42696-0A2C-432F-B861-3B25200B54EF}"/>
-              </a:ext>
-            </a:extLst>
-          </p:cNvPr>
+          <p:cNvPr id="7" name="Slide Number Placeholder 6"/>
           <p:cNvSpPr>
             <a:spLocks noGrp="1"/>
           </p:cNvSpPr>
@@ -2747,18 +2360,12 @@
           <a:p>
             <a:fld id="{75EA26F6-AC47-4D2A-8C6F-B74EB619C868}" type="slidenum">
               <a:rPr lang="zh-CN" altLang="en-US" smtClean="0"/>
-              <a:t>‹#›</a:t>
             </a:fld>
             <a:endParaRPr lang="zh-CN" altLang="en-US"/>
           </a:p>
         </p:txBody>
       </p:sp>
     </p:spTree>
-    <p:extLst>
-      <p:ext uri="{BB962C8B-B14F-4D97-AF65-F5344CB8AC3E}">
-        <p14:creationId xmlns:p14="http://schemas.microsoft.com/office/powerpoint/2010/main" val="1926004023"/>
-      </p:ext>
-    </p:extLst>
   </p:cSld>
   <p:clrMapOvr>
     <a:masterClrMapping/>
@@ -2790,13 +2397,7 @@
       </p:grpSpPr>
       <p:sp>
         <p:nvSpPr>
-          <p:cNvPr id="2" name="Title Placeholder 1">
-            <a:extLst>
-              <a:ext uri="{FF2B5EF4-FFF2-40B4-BE49-F238E27FC236}">
-                <a16:creationId xmlns:a16="http://schemas.microsoft.com/office/drawing/2014/main" id="{1C0ADC11-F33B-48B9-976A-3420F02D90DA}"/>
-              </a:ext>
-            </a:extLst>
-          </p:cNvPr>
+          <p:cNvPr id="2" name="Title Placeholder 1"/>
           <p:cNvSpPr>
             <a:spLocks noGrp="1"/>
           </p:cNvSpPr>
@@ -2829,13 +2430,7 @@
       </p:sp>
       <p:sp>
         <p:nvSpPr>
-          <p:cNvPr id="3" name="Text Placeholder 2">
-            <a:extLst>
-              <a:ext uri="{FF2B5EF4-FFF2-40B4-BE49-F238E27FC236}">
-                <a16:creationId xmlns:a16="http://schemas.microsoft.com/office/drawing/2014/main" id="{A1E18F6B-4F08-41CA-8AF5-D3DE9889C67F}"/>
-              </a:ext>
-            </a:extLst>
-          </p:cNvPr>
+          <p:cNvPr id="3" name="Text Placeholder 2"/>
           <p:cNvSpPr>
             <a:spLocks noGrp="1"/>
           </p:cNvSpPr>
@@ -2863,6 +2458,7 @@
               <a:rPr lang="en-US" altLang="zh-CN"/>
               <a:t>Click to edit Master text styles</a:t>
             </a:r>
+            <a:endParaRPr lang="en-US" altLang="zh-CN"/>
           </a:p>
           <a:p>
             <a:pPr lvl="1"/>
@@ -2870,6 +2466,7 @@
               <a:rPr lang="en-US" altLang="zh-CN"/>
               <a:t>Second level</a:t>
             </a:r>
+            <a:endParaRPr lang="en-US" altLang="zh-CN"/>
           </a:p>
           <a:p>
             <a:pPr lvl="2"/>
@@ -2877,6 +2474,7 @@
               <a:rPr lang="en-US" altLang="zh-CN"/>
               <a:t>Third level</a:t>
             </a:r>
+            <a:endParaRPr lang="en-US" altLang="zh-CN"/>
           </a:p>
           <a:p>
             <a:pPr lvl="3"/>
@@ -2884,6 +2482,7 @@
               <a:rPr lang="en-US" altLang="zh-CN"/>
               <a:t>Fourth level</a:t>
             </a:r>
+            <a:endParaRPr lang="en-US" altLang="zh-CN"/>
           </a:p>
           <a:p>
             <a:pPr lvl="4"/>
@@ -2897,13 +2496,7 @@
       </p:sp>
       <p:sp>
         <p:nvSpPr>
-          <p:cNvPr id="4" name="Date Placeholder 3">
-            <a:extLst>
-              <a:ext uri="{FF2B5EF4-FFF2-40B4-BE49-F238E27FC236}">
-                <a16:creationId xmlns:a16="http://schemas.microsoft.com/office/drawing/2014/main" id="{E6748B31-A5F5-4360-8B18-D98EE62EF0F0}"/>
-              </a:ext>
-            </a:extLst>
-          </p:cNvPr>
+          <p:cNvPr id="4" name="Date Placeholder 3"/>
           <p:cNvSpPr>
             <a:spLocks noGrp="1"/>
           </p:cNvSpPr>
@@ -2936,7 +2529,6 @@
           <a:p>
             <a:fld id="{1706A504-8EB3-452A-98D0-9F946B298832}" type="datetimeFigureOut">
               <a:rPr lang="zh-CN" altLang="en-US" smtClean="0"/>
-              <a:t>2022/5/9</a:t>
             </a:fld>
             <a:endParaRPr lang="zh-CN" altLang="en-US"/>
           </a:p>
@@ -2944,13 +2536,7 @@
       </p:sp>
       <p:sp>
         <p:nvSpPr>
-          <p:cNvPr id="5" name="Footer Placeholder 4">
-            <a:extLst>
-              <a:ext uri="{FF2B5EF4-FFF2-40B4-BE49-F238E27FC236}">
-                <a16:creationId xmlns:a16="http://schemas.microsoft.com/office/drawing/2014/main" id="{96DF1717-7514-4F81-9DDC-F6A3F036CF7A}"/>
-              </a:ext>
-            </a:extLst>
-          </p:cNvPr>
+          <p:cNvPr id="5" name="Footer Placeholder 4"/>
           <p:cNvSpPr>
             <a:spLocks noGrp="1"/>
           </p:cNvSpPr>
@@ -2987,13 +2573,7 @@
       </p:sp>
       <p:sp>
         <p:nvSpPr>
-          <p:cNvPr id="6" name="Slide Number Placeholder 5">
-            <a:extLst>
-              <a:ext uri="{FF2B5EF4-FFF2-40B4-BE49-F238E27FC236}">
-                <a16:creationId xmlns:a16="http://schemas.microsoft.com/office/drawing/2014/main" id="{0C032189-CC88-45FE-AE2F-AAF8C8A0BBD6}"/>
-              </a:ext>
-            </a:extLst>
-          </p:cNvPr>
+          <p:cNvPr id="6" name="Slide Number Placeholder 5"/>
           <p:cNvSpPr>
             <a:spLocks noGrp="1"/>
           </p:cNvSpPr>
@@ -3026,18 +2606,12 @@
           <a:p>
             <a:fld id="{75EA26F6-AC47-4D2A-8C6F-B74EB619C868}" type="slidenum">
               <a:rPr lang="zh-CN" altLang="en-US" smtClean="0"/>
-              <a:t>‹#›</a:t>
             </a:fld>
             <a:endParaRPr lang="zh-CN" altLang="en-US"/>
           </a:p>
         </p:txBody>
       </p:sp>
     </p:spTree>
-    <p:extLst>
-      <p:ext uri="{BB962C8B-B14F-4D97-AF65-F5344CB8AC3E}">
-        <p14:creationId xmlns:p14="http://schemas.microsoft.com/office/powerpoint/2010/main" val="1483753537"/>
-      </p:ext>
-    </p:extLst>
   </p:cSld>
   <p:clrMap bg1="lt1" tx1="dk1" bg2="lt2" tx2="dk2" accent1="accent1" accent2="accent2" accent3="accent3" accent4="accent4" accent5="accent5" accent6="accent6" hlink="hlink" folHlink="folHlink"/>
   <p:sldLayoutIdLst>
@@ -3081,7 +2655,7 @@
         <a:spcBef>
           <a:spcPts val="1000"/>
         </a:spcBef>
-        <a:buFont typeface="Arial" panose="020B0604020202020204" pitchFamily="34" charset="0"/>
+        <a:buFont typeface="Arial" panose="020B0604020202090204" pitchFamily="34" charset="0"/>
         <a:buChar char="•"/>
         <a:defRPr sz="2800" kern="1200">
           <a:solidFill>
@@ -3099,7 +2673,7 @@
         <a:spcBef>
           <a:spcPts val="500"/>
         </a:spcBef>
-        <a:buFont typeface="Arial" panose="020B0604020202020204" pitchFamily="34" charset="0"/>
+        <a:buFont typeface="Arial" panose="020B0604020202090204" pitchFamily="34" charset="0"/>
         <a:buChar char="•"/>
         <a:defRPr sz="2400" kern="1200">
           <a:solidFill>
@@ -3117,7 +2691,7 @@
         <a:spcBef>
           <a:spcPts val="500"/>
         </a:spcBef>
-        <a:buFont typeface="Arial" panose="020B0604020202020204" pitchFamily="34" charset="0"/>
+        <a:buFont typeface="Arial" panose="020B0604020202090204" pitchFamily="34" charset="0"/>
         <a:buChar char="•"/>
         <a:defRPr sz="2000" kern="1200">
           <a:solidFill>
@@ -3135,7 +2709,7 @@
         <a:spcBef>
           <a:spcPts val="500"/>
         </a:spcBef>
-        <a:buFont typeface="Arial" panose="020B0604020202020204" pitchFamily="34" charset="0"/>
+        <a:buFont typeface="Arial" panose="020B0604020202090204" pitchFamily="34" charset="0"/>
         <a:buChar char="•"/>
         <a:defRPr sz="1800" kern="1200">
           <a:solidFill>
@@ -3153,7 +2727,7 @@
         <a:spcBef>
           <a:spcPts val="500"/>
         </a:spcBef>
-        <a:buFont typeface="Arial" panose="020B0604020202020204" pitchFamily="34" charset="0"/>
+        <a:buFont typeface="Arial" panose="020B0604020202090204" pitchFamily="34" charset="0"/>
         <a:buChar char="•"/>
         <a:defRPr sz="1800" kern="1200">
           <a:solidFill>
@@ -3171,7 +2745,7 @@
         <a:spcBef>
           <a:spcPts val="500"/>
         </a:spcBef>
-        <a:buFont typeface="Arial" panose="020B0604020202020204" pitchFamily="34" charset="0"/>
+        <a:buFont typeface="Arial" panose="020B0604020202090204" pitchFamily="34" charset="0"/>
         <a:buChar char="•"/>
         <a:defRPr sz="1800" kern="1200">
           <a:solidFill>
@@ -3189,7 +2763,7 @@
         <a:spcBef>
           <a:spcPts val="500"/>
         </a:spcBef>
-        <a:buFont typeface="Arial" panose="020B0604020202020204" pitchFamily="34" charset="0"/>
+        <a:buFont typeface="Arial" panose="020B0604020202090204" pitchFamily="34" charset="0"/>
         <a:buChar char="•"/>
         <a:defRPr sz="1800" kern="1200">
           <a:solidFill>
@@ -3207,7 +2781,7 @@
         <a:spcBef>
           <a:spcPts val="500"/>
         </a:spcBef>
-        <a:buFont typeface="Arial" panose="020B0604020202020204" pitchFamily="34" charset="0"/>
+        <a:buFont typeface="Arial" panose="020B0604020202090204" pitchFamily="34" charset="0"/>
         <a:buChar char="•"/>
         <a:defRPr sz="1800" kern="1200">
           <a:solidFill>
@@ -3225,7 +2799,7 @@
         <a:spcBef>
           <a:spcPts val="500"/>
         </a:spcBef>
-        <a:buFont typeface="Arial" panose="020B0604020202020204" pitchFamily="34" charset="0"/>
+        <a:buFont typeface="Arial" panose="020B0604020202090204" pitchFamily="34" charset="0"/>
         <a:buChar char="•"/>
         <a:defRPr sz="1800" kern="1200">
           <a:solidFill>
@@ -3355,13 +2929,7 @@
       </p:grpSpPr>
       <p:sp>
         <p:nvSpPr>
-          <p:cNvPr id="2" name="Title 1">
-            <a:extLst>
-              <a:ext uri="{FF2B5EF4-FFF2-40B4-BE49-F238E27FC236}">
-                <a16:creationId xmlns:a16="http://schemas.microsoft.com/office/drawing/2014/main" id="{290B4422-890A-4ACF-BA33-FE39F4EAEF58}"/>
-              </a:ext>
-            </a:extLst>
-          </p:cNvPr>
+          <p:cNvPr id="2" name="Title 1"/>
           <p:cNvSpPr>
             <a:spLocks noGrp="1"/>
           </p:cNvSpPr>
@@ -3419,13 +2987,7 @@
       </p:sp>
       <p:sp>
         <p:nvSpPr>
-          <p:cNvPr id="3" name="Subtitle 2">
-            <a:extLst>
-              <a:ext uri="{FF2B5EF4-FFF2-40B4-BE49-F238E27FC236}">
-                <a16:creationId xmlns:a16="http://schemas.microsoft.com/office/drawing/2014/main" id="{5DB38CF5-4725-45FC-A0AA-1F66AC61ED14}"/>
-              </a:ext>
-            </a:extLst>
-          </p:cNvPr>
+          <p:cNvPr id="3" name="Subtitle 2"/>
           <p:cNvSpPr>
             <a:spLocks noGrp="1"/>
           </p:cNvSpPr>
@@ -3453,13 +3015,7 @@
       </p:sp>
       <p:sp>
         <p:nvSpPr>
-          <p:cNvPr id="5" name="TextBox 4">
-            <a:extLst>
-              <a:ext uri="{FF2B5EF4-FFF2-40B4-BE49-F238E27FC236}">
-                <a16:creationId xmlns:a16="http://schemas.microsoft.com/office/drawing/2014/main" id="{8364F89D-F8DC-6482-FF7B-CB2E0773A04F}"/>
-              </a:ext>
-            </a:extLst>
-          </p:cNvPr>
+          <p:cNvPr id="5" name="TextBox 4"/>
           <p:cNvSpPr txBox="1"/>
           <p:nvPr/>
         </p:nvSpPr>
@@ -3488,11 +3044,6 @@
         </p:txBody>
       </p:sp>
     </p:spTree>
-    <p:extLst>
-      <p:ext uri="{BB962C8B-B14F-4D97-AF65-F5344CB8AC3E}">
-        <p14:creationId xmlns:p14="http://schemas.microsoft.com/office/powerpoint/2010/main" val="1870670271"/>
-      </p:ext>
-    </p:extLst>
   </p:cSld>
   <p:clrMapOvr>
     <a:masterClrMapping/>
@@ -3519,13 +3070,7 @@
       </p:grpSpPr>
       <p:sp>
         <p:nvSpPr>
-          <p:cNvPr id="2" name="Title 1">
-            <a:extLst>
-              <a:ext uri="{FF2B5EF4-FFF2-40B4-BE49-F238E27FC236}">
-                <a16:creationId xmlns:a16="http://schemas.microsoft.com/office/drawing/2014/main" id="{290B4422-890A-4ACF-BA33-FE39F4EAEF58}"/>
-              </a:ext>
-            </a:extLst>
-          </p:cNvPr>
+          <p:cNvPr id="2" name="Title 1"/>
           <p:cNvSpPr>
             <a:spLocks noGrp="1"/>
           </p:cNvSpPr>
@@ -3558,11 +3103,6 @@
         </p:txBody>
       </p:sp>
     </p:spTree>
-    <p:extLst>
-      <p:ext uri="{BB962C8B-B14F-4D97-AF65-F5344CB8AC3E}">
-        <p14:creationId xmlns:p14="http://schemas.microsoft.com/office/powerpoint/2010/main" val="1146267088"/>
-      </p:ext>
-    </p:extLst>
   </p:cSld>
   <p:clrMapOvr>
     <a:masterClrMapping/>
@@ -3589,13 +3129,7 @@
       </p:grpSpPr>
       <p:sp>
         <p:nvSpPr>
-          <p:cNvPr id="2" name="Title 1">
-            <a:extLst>
-              <a:ext uri="{FF2B5EF4-FFF2-40B4-BE49-F238E27FC236}">
-                <a16:creationId xmlns:a16="http://schemas.microsoft.com/office/drawing/2014/main" id="{290B4422-890A-4ACF-BA33-FE39F4EAEF58}"/>
-              </a:ext>
-            </a:extLst>
-          </p:cNvPr>
+          <p:cNvPr id="2" name="Title 1"/>
           <p:cNvSpPr>
             <a:spLocks noGrp="1"/>
           </p:cNvSpPr>
@@ -3629,13 +3163,7 @@
       </p:sp>
       <p:sp>
         <p:nvSpPr>
-          <p:cNvPr id="3" name="TextBox 2">
-            <a:extLst>
-              <a:ext uri="{FF2B5EF4-FFF2-40B4-BE49-F238E27FC236}">
-                <a16:creationId xmlns:a16="http://schemas.microsoft.com/office/drawing/2014/main" id="{4D1C98AB-98A7-D877-475F-F0D2ACC1DE01}"/>
-              </a:ext>
-            </a:extLst>
-          </p:cNvPr>
+          <p:cNvPr id="3" name="TextBox 2"/>
           <p:cNvSpPr txBox="1"/>
           <p:nvPr/>
         </p:nvSpPr>
@@ -3659,6 +3187,7 @@
               <a:rPr lang="en-US" altLang="zh-CN" dirty="0"/>
               <a:t>Login/Registration Panel</a:t>
             </a:r>
+            <a:endParaRPr lang="en-US" altLang="zh-CN" dirty="0"/>
           </a:p>
           <a:p>
             <a:r>
@@ -3670,11 +3199,6 @@
         </p:txBody>
       </p:sp>
     </p:spTree>
-    <p:extLst>
-      <p:ext uri="{BB962C8B-B14F-4D97-AF65-F5344CB8AC3E}">
-        <p14:creationId xmlns:p14="http://schemas.microsoft.com/office/powerpoint/2010/main" val="367874768"/>
-      </p:ext>
-    </p:extLst>
   </p:cSld>
   <p:clrMapOvr>
     <a:masterClrMapping/>
@@ -3701,19 +3225,13 @@
       </p:grpSpPr>
       <p:sp>
         <p:nvSpPr>
-          <p:cNvPr id="4" name="Rectangle: Rounded Corners 3">
-            <a:extLst>
-              <a:ext uri="{FF2B5EF4-FFF2-40B4-BE49-F238E27FC236}">
-                <a16:creationId xmlns:a16="http://schemas.microsoft.com/office/drawing/2014/main" id="{85FE837D-E5DB-5919-FE04-44BF5226CA28}"/>
-              </a:ext>
-            </a:extLst>
-          </p:cNvPr>
+          <p:cNvPr id="4" name="Rectangle: Rounded Corners 3"/>
           <p:cNvSpPr/>
           <p:nvPr/>
         </p:nvSpPr>
         <p:spPr>
           <a:xfrm>
-            <a:off x="498266" y="947358"/>
+            <a:off x="840531" y="947358"/>
             <a:ext cx="5130496" cy="5650558"/>
           </a:xfrm>
           <a:prstGeom prst="roundRect">
@@ -3755,13 +3273,7 @@
       </p:sp>
       <p:sp>
         <p:nvSpPr>
-          <p:cNvPr id="2" name="Title 1">
-            <a:extLst>
-              <a:ext uri="{FF2B5EF4-FFF2-40B4-BE49-F238E27FC236}">
-                <a16:creationId xmlns:a16="http://schemas.microsoft.com/office/drawing/2014/main" id="{290B4422-890A-4ACF-BA33-FE39F4EAEF58}"/>
-              </a:ext>
-            </a:extLst>
-          </p:cNvPr>
+          <p:cNvPr id="2" name="Title 1"/>
           <p:cNvSpPr>
             <a:spLocks noGrp="1"/>
           </p:cNvSpPr>
@@ -3771,8 +3283,8 @@
         </p:nvSpPr>
         <p:spPr>
           <a:xfrm>
-            <a:off x="1392589" y="0"/>
-            <a:ext cx="9144000" cy="947357"/>
+            <a:off x="1158875" y="0"/>
+            <a:ext cx="9874885" cy="947420"/>
           </a:xfrm>
         </p:spPr>
         <p:txBody>
@@ -3791,19 +3303,13 @@
       </p:sp>
       <p:sp>
         <p:nvSpPr>
-          <p:cNvPr id="3" name="TextBox 2">
-            <a:extLst>
-              <a:ext uri="{FF2B5EF4-FFF2-40B4-BE49-F238E27FC236}">
-                <a16:creationId xmlns:a16="http://schemas.microsoft.com/office/drawing/2014/main" id="{17463EC7-20E1-9D15-BD5D-054D0462CA79}"/>
-              </a:ext>
-            </a:extLst>
-          </p:cNvPr>
+          <p:cNvPr id="3" name="TextBox 2"/>
           <p:cNvSpPr txBox="1"/>
           <p:nvPr/>
         </p:nvSpPr>
         <p:spPr>
           <a:xfrm>
-            <a:off x="665267" y="5161123"/>
+            <a:off x="1007532" y="5161123"/>
             <a:ext cx="4796494" cy="1200329"/>
           </a:xfrm>
           <a:prstGeom prst="rect">
@@ -3818,7 +3324,7 @@
           <a:lstStyle/>
           <a:p>
             <a:pPr marL="285750" indent="-285750">
-              <a:buFont typeface="Arial" panose="020B0604020202020204" pitchFamily="34" charset="0"/>
+              <a:buFont typeface="Arial" panose="020B0604020202090204" pitchFamily="34" charset="0"/>
               <a:buChar char="•"/>
             </a:pPr>
             <a:r>
@@ -3829,10 +3335,15 @@
               </a:rPr>
               <a:t>Using API Gateway to pass the photos directly to a S3 bucket</a:t>
             </a:r>
+            <a:endParaRPr lang="en-US" altLang="zh-CN" sz="1200" dirty="0">
+              <a:solidFill>
+                <a:schemeClr val="bg1"/>
+              </a:solidFill>
+            </a:endParaRPr>
           </a:p>
           <a:p>
             <a:pPr marL="285750" indent="-285750">
-              <a:buFont typeface="Arial" panose="020B0604020202020204" pitchFamily="34" charset="0"/>
+              <a:buFont typeface="Arial" panose="020B0604020202090204" pitchFamily="34" charset="0"/>
               <a:buChar char="•"/>
             </a:pPr>
             <a:r>
@@ -3843,10 +3354,15 @@
               </a:rPr>
               <a:t>Using a Lambda Function to add the donation information to DynamoDB and OpenSearch.</a:t>
             </a:r>
+            <a:endParaRPr lang="en-US" altLang="zh-CN" sz="1200" dirty="0">
+              <a:solidFill>
+                <a:schemeClr val="bg1"/>
+              </a:solidFill>
+            </a:endParaRPr>
           </a:p>
           <a:p>
             <a:pPr marL="285750" indent="-285750">
-              <a:buFont typeface="Arial" panose="020B0604020202020204" pitchFamily="34" charset="0"/>
+              <a:buFont typeface="Arial" panose="020B0604020202090204" pitchFamily="34" charset="0"/>
               <a:buChar char="•"/>
             </a:pPr>
             <a:r>
@@ -3883,20 +3399,14 @@
       </p:sp>
       <p:pic>
         <p:nvPicPr>
-          <p:cNvPr id="6" name="Picture 5">
-            <a:extLst>
-              <a:ext uri="{FF2B5EF4-FFF2-40B4-BE49-F238E27FC236}">
-                <a16:creationId xmlns:a16="http://schemas.microsoft.com/office/drawing/2014/main" id="{CBDFCF6D-DC62-DED4-F273-DB87B144859F}"/>
-              </a:ext>
-            </a:extLst>
-          </p:cNvPr>
+          <p:cNvPr id="6" name="Picture 5"/>
           <p:cNvPicPr>
             <a:picLocks noChangeAspect="1"/>
           </p:cNvPicPr>
           <p:nvPr/>
         </p:nvPicPr>
         <p:blipFill>
-          <a:blip r:embed="rId2">
+          <a:blip r:embed="rId1">
             <a:extLst>
               <a:ext uri="{28A0092B-C50C-407E-A947-70E740481C1C}">
                 <a14:useLocalDpi xmlns:a14="http://schemas.microsoft.com/office/drawing/2010/main" val="0"/>
@@ -3909,7 +3419,7 @@
         </p:blipFill>
         <p:spPr>
           <a:xfrm>
-            <a:off x="1486222" y="1919401"/>
+            <a:off x="1734507" y="1918131"/>
             <a:ext cx="2968417" cy="3096309"/>
           </a:xfrm>
           <a:prstGeom prst="rect">
@@ -3919,19 +3429,13 @@
       </p:pic>
       <p:sp>
         <p:nvSpPr>
-          <p:cNvPr id="7" name="TextBox 6">
-            <a:extLst>
-              <a:ext uri="{FF2B5EF4-FFF2-40B4-BE49-F238E27FC236}">
-                <a16:creationId xmlns:a16="http://schemas.microsoft.com/office/drawing/2014/main" id="{A379F5CD-A9D7-C52E-B67E-BFF5FD9A84F1}"/>
-              </a:ext>
-            </a:extLst>
-          </p:cNvPr>
+          <p:cNvPr id="7" name="TextBox 6"/>
           <p:cNvSpPr txBox="1"/>
           <p:nvPr/>
         </p:nvSpPr>
         <p:spPr>
           <a:xfrm>
-            <a:off x="2427449" y="1226423"/>
+            <a:off x="2281399" y="1087358"/>
             <a:ext cx="2248585" cy="830997"/>
           </a:xfrm>
           <a:prstGeom prst="rect">
@@ -3974,19 +3478,13 @@
       </p:sp>
       <p:sp>
         <p:nvSpPr>
-          <p:cNvPr id="8" name="Rectangle: Rounded Corners 7">
-            <a:extLst>
-              <a:ext uri="{FF2B5EF4-FFF2-40B4-BE49-F238E27FC236}">
-                <a16:creationId xmlns:a16="http://schemas.microsoft.com/office/drawing/2014/main" id="{CFC3787D-EC5F-B46B-D4C4-67B2E2632532}"/>
-              </a:ext>
-            </a:extLst>
-          </p:cNvPr>
+          <p:cNvPr id="8" name="Rectangle: Rounded Corners 7"/>
           <p:cNvSpPr/>
           <p:nvPr/>
         </p:nvSpPr>
         <p:spPr>
           <a:xfrm>
-            <a:off x="5964589" y="947358"/>
+            <a:off x="6306854" y="947358"/>
             <a:ext cx="5130496" cy="5650558"/>
           </a:xfrm>
           <a:prstGeom prst="roundRect">
@@ -4028,19 +3526,13 @@
       </p:sp>
       <p:sp>
         <p:nvSpPr>
-          <p:cNvPr id="9" name="TextBox 8">
-            <a:extLst>
-              <a:ext uri="{FF2B5EF4-FFF2-40B4-BE49-F238E27FC236}">
-                <a16:creationId xmlns:a16="http://schemas.microsoft.com/office/drawing/2014/main" id="{FB81A955-D5FD-E977-60EE-1C648DE151B6}"/>
-              </a:ext>
-            </a:extLst>
-          </p:cNvPr>
+          <p:cNvPr id="9" name="TextBox 8"/>
           <p:cNvSpPr txBox="1"/>
           <p:nvPr/>
         </p:nvSpPr>
         <p:spPr>
           <a:xfrm>
-            <a:off x="7622738" y="1274790"/>
+            <a:off x="7965003" y="1274790"/>
             <a:ext cx="1822412" cy="830997"/>
           </a:xfrm>
           <a:prstGeom prst="rect">
@@ -4073,11 +3565,6 @@
         </p:txBody>
       </p:sp>
     </p:spTree>
-    <p:extLst>
-      <p:ext uri="{BB962C8B-B14F-4D97-AF65-F5344CB8AC3E}">
-        <p14:creationId xmlns:p14="http://schemas.microsoft.com/office/powerpoint/2010/main" val="17305869"/>
-      </p:ext>
-    </p:extLst>
   </p:cSld>
   <p:clrMapOvr>
     <a:masterClrMapping/>
@@ -4104,13 +3591,7 @@
       </p:grpSpPr>
       <p:sp>
         <p:nvSpPr>
-          <p:cNvPr id="2" name="Title 1">
-            <a:extLst>
-              <a:ext uri="{FF2B5EF4-FFF2-40B4-BE49-F238E27FC236}">
-                <a16:creationId xmlns:a16="http://schemas.microsoft.com/office/drawing/2014/main" id="{290B4422-890A-4ACF-BA33-FE39F4EAEF58}"/>
-              </a:ext>
-            </a:extLst>
-          </p:cNvPr>
+          <p:cNvPr id="2" name="Title 1"/>
           <p:cNvSpPr>
             <a:spLocks noGrp="1"/>
           </p:cNvSpPr>
@@ -4142,12 +3623,304 @@
           </a:p>
         </p:txBody>
       </p:sp>
+      <p:sp>
+        <p:nvSpPr>
+          <p:cNvPr id="8" name="Rectangle: Rounded Corners 7"/>
+          <p:cNvSpPr/>
+          <p:nvPr/>
+        </p:nvSpPr>
+        <p:spPr>
+          <a:xfrm>
+            <a:off x="1172879" y="947358"/>
+            <a:ext cx="5130496" cy="5650558"/>
+          </a:xfrm>
+          <a:prstGeom prst="roundRect">
+            <a:avLst/>
+          </a:prstGeom>
+          <a:solidFill>
+            <a:schemeClr val="accent1">
+              <a:lumMod val="75000"/>
+            </a:schemeClr>
+          </a:solidFill>
+          <a:ln>
+            <a:noFill/>
+          </a:ln>
+        </p:spPr>
+        <p:style>
+          <a:lnRef idx="2">
+            <a:schemeClr val="accent1">
+              <a:shade val="50000"/>
+            </a:schemeClr>
+          </a:lnRef>
+          <a:fillRef idx="1">
+            <a:schemeClr val="accent1"/>
+          </a:fillRef>
+          <a:effectRef idx="0">
+            <a:schemeClr val="accent1"/>
+          </a:effectRef>
+          <a:fontRef idx="minor">
+            <a:schemeClr val="lt1"/>
+          </a:fontRef>
+        </p:style>
+        <p:txBody>
+          <a:bodyPr rtlCol="0" anchor="ctr"/>
+          <a:p>
+            <a:pPr algn="ctr"/>
+            <a:endParaRPr lang="zh-CN" altLang="en-US"/>
+          </a:p>
+        </p:txBody>
+      </p:sp>
+      <p:sp>
+        <p:nvSpPr>
+          <p:cNvPr id="9" name="TextBox 8"/>
+          <p:cNvSpPr txBox="1"/>
+          <p:nvPr/>
+        </p:nvSpPr>
+        <p:spPr>
+          <a:xfrm>
+            <a:off x="2827218" y="1095720"/>
+            <a:ext cx="1822412" cy="829945"/>
+          </a:xfrm>
+          <a:prstGeom prst="rect">
+            <a:avLst/>
+          </a:prstGeom>
+          <a:noFill/>
+        </p:spPr>
+        <p:txBody>
+          <a:bodyPr wrap="square" rtlCol="0">
+            <a:spAutoFit/>
+          </a:bodyPr>
+          <a:p>
+            <a:r>
+              <a:rPr lang="en-US" altLang="zh-CN" sz="2400" dirty="0">
+                <a:solidFill>
+                  <a:schemeClr val="bg1"/>
+                </a:solidFill>
+                <a:latin typeface="Arial Black" panose="020B0A04020102020204" pitchFamily="34" charset="0"/>
+              </a:rPr>
+              <a:t>Search-Zhenrui</a:t>
+            </a:r>
+            <a:endParaRPr lang="zh-CN" altLang="en-US" sz="2400" dirty="0">
+              <a:solidFill>
+                <a:schemeClr val="bg1"/>
+              </a:solidFill>
+              <a:latin typeface="Arial Black" panose="020B0A04020102020204" pitchFamily="34" charset="0"/>
+            </a:endParaRPr>
+          </a:p>
+        </p:txBody>
+      </p:sp>
+      <p:sp>
+        <p:nvSpPr>
+          <p:cNvPr id="3" name="Text Box 2"/>
+          <p:cNvSpPr txBox="1"/>
+          <p:nvPr/>
+        </p:nvSpPr>
+        <p:spPr>
+          <a:xfrm>
+            <a:off x="3890645" y="1998345"/>
+            <a:ext cx="2199640" cy="3969385"/>
+          </a:xfrm>
+          <a:prstGeom prst="rect">
+            <a:avLst/>
+          </a:prstGeom>
+          <a:noFill/>
+        </p:spPr>
+        <p:txBody>
+          <a:bodyPr wrap="square" rtlCol="0" anchor="t">
+            <a:spAutoFit/>
+          </a:bodyPr>
+          <a:p>
+            <a:pPr marL="285750" indent="-285750">
+              <a:buFont typeface="Arial" panose="020B0604020202090204" pitchFamily="34" charset="0"/>
+              <a:buChar char="•"/>
+            </a:pPr>
+            <a:r>
+              <a:rPr lang="en-US" altLang="zh-CN" sz="1200" dirty="0">
+                <a:solidFill>
+                  <a:schemeClr val="bg1"/>
+                </a:solidFill>
+                <a:sym typeface="+mn-ea"/>
+              </a:rPr>
+              <a:t>Using API Gateway to pass the query infomation from frontend input to lambda function</a:t>
+            </a:r>
+            <a:endParaRPr lang="en-US" altLang="zh-CN" sz="1200" dirty="0">
+              <a:solidFill>
+                <a:schemeClr val="bg1"/>
+              </a:solidFill>
+              <a:sym typeface="+mn-ea"/>
+            </a:endParaRPr>
+          </a:p>
+          <a:p>
+            <a:pPr marL="285750" indent="-285750">
+              <a:buFont typeface="Arial" panose="020B0604020202090204" pitchFamily="34" charset="0"/>
+              <a:buChar char="•"/>
+            </a:pPr>
+            <a:endParaRPr lang="en-US" altLang="zh-CN" sz="1200" dirty="0">
+              <a:solidFill>
+                <a:schemeClr val="bg1"/>
+              </a:solidFill>
+              <a:sym typeface="+mn-ea"/>
+            </a:endParaRPr>
+          </a:p>
+          <a:p>
+            <a:pPr marL="285750" indent="-285750">
+              <a:buFont typeface="Arial" panose="020B0604020202090204" pitchFamily="34" charset="0"/>
+              <a:buChar char="•"/>
+            </a:pPr>
+            <a:r>
+              <a:rPr lang="en-US" altLang="zh-CN" sz="1200" dirty="0">
+                <a:solidFill>
+                  <a:schemeClr val="bg1"/>
+                </a:solidFill>
+                <a:sym typeface="+mn-ea"/>
+              </a:rPr>
+              <a:t>Using a lambda function to query corrsponding available donation books ftom DynamoDB through OpenSearch.</a:t>
+            </a:r>
+            <a:endParaRPr lang="en-US" altLang="zh-CN" sz="1200" dirty="0">
+              <a:solidFill>
+                <a:schemeClr val="bg1"/>
+              </a:solidFill>
+              <a:sym typeface="+mn-ea"/>
+            </a:endParaRPr>
+          </a:p>
+          <a:p>
+            <a:pPr marL="285750" indent="-285750">
+              <a:buFont typeface="Arial" panose="020B0604020202090204" pitchFamily="34" charset="0"/>
+              <a:buChar char="•"/>
+            </a:pPr>
+            <a:endParaRPr lang="en-US" altLang="zh-CN" sz="1200" dirty="0">
+              <a:solidFill>
+                <a:schemeClr val="bg1"/>
+              </a:solidFill>
+              <a:sym typeface="+mn-ea"/>
+            </a:endParaRPr>
+          </a:p>
+          <a:p>
+            <a:pPr marL="285750" indent="-285750">
+              <a:buFont typeface="Arial" panose="020B0604020202090204" pitchFamily="34" charset="0"/>
+              <a:buChar char="•"/>
+            </a:pPr>
+            <a:r>
+              <a:rPr lang="en-US" altLang="zh-CN" sz="1200" dirty="0">
+                <a:solidFill>
+                  <a:schemeClr val="bg1"/>
+                </a:solidFill>
+                <a:sym typeface="+mn-ea"/>
+              </a:rPr>
+              <a:t>The lambda function also automatically get the book cover by using Open Library API</a:t>
+            </a:r>
+            <a:endParaRPr lang="en-US" altLang="zh-CN" sz="1200" dirty="0">
+              <a:solidFill>
+                <a:schemeClr val="bg1"/>
+              </a:solidFill>
+              <a:sym typeface="+mn-ea"/>
+            </a:endParaRPr>
+          </a:p>
+          <a:p>
+            <a:pPr marL="285750" indent="-285750">
+              <a:buFont typeface="Arial" panose="020B0604020202090204" pitchFamily="34" charset="0"/>
+              <a:buChar char="•"/>
+            </a:pPr>
+            <a:endParaRPr lang="en-US" sz="1200">
+              <a:solidFill>
+                <a:schemeClr val="bg1"/>
+              </a:solidFill>
+            </a:endParaRPr>
+          </a:p>
+          <a:p>
+            <a:pPr marL="285750" indent="-285750">
+              <a:buFont typeface="Arial" panose="020B0604020202090204" pitchFamily="34" charset="0"/>
+              <a:buChar char="•"/>
+            </a:pPr>
+            <a:r>
+              <a:rPr lang="en-US" sz="1200">
+                <a:solidFill>
+                  <a:schemeClr val="bg1"/>
+                </a:solidFill>
+              </a:rPr>
+              <a:t>Frontend get the response from the image and display it under the search bar</a:t>
+            </a:r>
+            <a:endParaRPr lang="en-US" sz="1200">
+              <a:solidFill>
+                <a:schemeClr val="bg1"/>
+              </a:solidFill>
+            </a:endParaRPr>
+          </a:p>
+        </p:txBody>
+      </p:sp>
+      <p:pic>
+        <p:nvPicPr>
+          <p:cNvPr id="4" name="Picture 3" descr="SearchService.drawio"/>
+          <p:cNvPicPr>
+            <a:picLocks noChangeAspect="1"/>
+          </p:cNvPicPr>
+          <p:nvPr/>
+        </p:nvPicPr>
+        <p:blipFill>
+          <a:blip r:embed="rId1"/>
+          <a:stretch>
+            <a:fillRect/>
+          </a:stretch>
+        </p:blipFill>
+        <p:spPr>
+          <a:xfrm>
+            <a:off x="1422400" y="1925955"/>
+            <a:ext cx="2468245" cy="4332605"/>
+          </a:xfrm>
+          <a:prstGeom prst="rect">
+            <a:avLst/>
+          </a:prstGeom>
+        </p:spPr>
+      </p:pic>
+      <p:pic>
+        <p:nvPicPr>
+          <p:cNvPr id="5" name="Picture 4"/>
+          <p:cNvPicPr>
+            <a:picLocks noChangeAspect="1"/>
+          </p:cNvPicPr>
+          <p:nvPr/>
+        </p:nvPicPr>
+        <p:blipFill>
+          <a:blip r:embed="rId2"/>
+          <a:stretch>
+            <a:fillRect/>
+          </a:stretch>
+        </p:blipFill>
+        <p:spPr>
+          <a:xfrm>
+            <a:off x="6726555" y="1096010"/>
+            <a:ext cx="4578350" cy="1983740"/>
+          </a:xfrm>
+          <a:prstGeom prst="rect">
+            <a:avLst/>
+          </a:prstGeom>
+        </p:spPr>
+      </p:pic>
+      <p:pic>
+        <p:nvPicPr>
+          <p:cNvPr id="6" name="Picture 5"/>
+          <p:cNvPicPr>
+            <a:picLocks noChangeAspect="1"/>
+          </p:cNvPicPr>
+          <p:nvPr/>
+        </p:nvPicPr>
+        <p:blipFill>
+          <a:blip r:embed="rId3"/>
+          <a:stretch>
+            <a:fillRect/>
+          </a:stretch>
+        </p:blipFill>
+        <p:spPr>
+          <a:xfrm>
+            <a:off x="6726555" y="3719195"/>
+            <a:ext cx="4576445" cy="2248535"/>
+          </a:xfrm>
+          <a:prstGeom prst="rect">
+            <a:avLst/>
+          </a:prstGeom>
+        </p:spPr>
+      </p:pic>
     </p:spTree>
-    <p:extLst>
-      <p:ext uri="{BB962C8B-B14F-4D97-AF65-F5344CB8AC3E}">
-        <p14:creationId xmlns:p14="http://schemas.microsoft.com/office/powerpoint/2010/main" val="3465263031"/>
-      </p:ext>
-    </p:extLst>
   </p:cSld>
   <p:clrMapOvr>
     <a:masterClrMapping/>
@@ -4174,13 +3947,7 @@
       </p:grpSpPr>
       <p:sp>
         <p:nvSpPr>
-          <p:cNvPr id="2" name="Title 1">
-            <a:extLst>
-              <a:ext uri="{FF2B5EF4-FFF2-40B4-BE49-F238E27FC236}">
-                <a16:creationId xmlns:a16="http://schemas.microsoft.com/office/drawing/2014/main" id="{290B4422-890A-4ACF-BA33-FE39F4EAEF58}"/>
-              </a:ext>
-            </a:extLst>
-          </p:cNvPr>
+          <p:cNvPr id="2" name="Title 1"/>
           <p:cNvSpPr>
             <a:spLocks noGrp="1"/>
           </p:cNvSpPr>
@@ -4217,11 +3984,6 @@
         </p:txBody>
       </p:sp>
     </p:spTree>
-    <p:extLst>
-      <p:ext uri="{BB962C8B-B14F-4D97-AF65-F5344CB8AC3E}">
-        <p14:creationId xmlns:p14="http://schemas.microsoft.com/office/powerpoint/2010/main" val="4123721389"/>
-      </p:ext>
-    </p:extLst>
   </p:cSld>
   <p:clrMapOvr>
     <a:masterClrMapping/>
@@ -4248,13 +4010,7 @@
       </p:grpSpPr>
       <p:sp>
         <p:nvSpPr>
-          <p:cNvPr id="2" name="Title 1">
-            <a:extLst>
-              <a:ext uri="{FF2B5EF4-FFF2-40B4-BE49-F238E27FC236}">
-                <a16:creationId xmlns:a16="http://schemas.microsoft.com/office/drawing/2014/main" id="{290B4422-890A-4ACF-BA33-FE39F4EAEF58}"/>
-              </a:ext>
-            </a:extLst>
-          </p:cNvPr>
+          <p:cNvPr id="2" name="Title 1"/>
           <p:cNvSpPr>
             <a:spLocks noGrp="1"/>
           </p:cNvSpPr>
@@ -4288,13 +4044,7 @@
       </p:sp>
       <p:sp>
         <p:nvSpPr>
-          <p:cNvPr id="3" name="TextBox 2">
-            <a:extLst>
-              <a:ext uri="{FF2B5EF4-FFF2-40B4-BE49-F238E27FC236}">
-                <a16:creationId xmlns:a16="http://schemas.microsoft.com/office/drawing/2014/main" id="{4FDAB2DD-1894-2C1D-36C0-D6CBC2D59FFE}"/>
-              </a:ext>
-            </a:extLst>
-          </p:cNvPr>
+          <p:cNvPr id="3" name="TextBox 2"/>
           <p:cNvSpPr txBox="1"/>
           <p:nvPr/>
         </p:nvSpPr>
@@ -4318,12 +4068,14 @@
               <a:rPr lang="en-US" altLang="zh-CN" dirty="0"/>
               <a:t>Although we can link user’s account and their information directly in Cognito (which is convenient and good for keeping user’s information secure!), we decided to use DynamoDB to store the users’ non-sensitive information, rather than storing them in Cognito.</a:t>
             </a:r>
+            <a:endParaRPr lang="en-US" altLang="zh-CN" dirty="0"/>
           </a:p>
           <a:p>
             <a:r>
               <a:rPr lang="en-US" altLang="zh-CN" sz="1400" dirty="0"/>
               <a:t>-   The attributes stored in Cognito has to be key-value(string) pair, not good for complicated data structures.</a:t>
             </a:r>
+            <a:endParaRPr lang="en-US" altLang="zh-CN" sz="1400" dirty="0"/>
           </a:p>
           <a:p>
             <a:pPr marL="285750" indent="-285750">
@@ -4334,6 +4086,7 @@
               <a:rPr lang="en-US" altLang="zh-CN" sz="1400" dirty="0"/>
               <a:t>We need to store many users’ requested/donate books, this list could be large and Cognito is not scalable as the DynamoDB.</a:t>
             </a:r>
+            <a:endParaRPr lang="en-US" altLang="zh-CN" sz="1400" dirty="0"/>
           </a:p>
           <a:p>
             <a:pPr marL="285750" indent="-285750">
@@ -4344,6 +4097,7 @@
               <a:rPr lang="en-US" altLang="zh-CN" sz="1400" dirty="0"/>
               <a:t>The DynamoDB can handle query much more efficient than Cognito</a:t>
             </a:r>
+            <a:endParaRPr lang="en-US" altLang="zh-CN" sz="1400" dirty="0"/>
           </a:p>
           <a:p>
             <a:pPr marL="285750" indent="-285750">
@@ -4354,15 +4108,11 @@
               <a:rPr lang="en-US" altLang="zh-CN" sz="1400" dirty="0"/>
               <a:t>We realized this is the pattern often done in the industry after searching the online information</a:t>
             </a:r>
+            <a:endParaRPr lang="en-US" altLang="zh-CN" sz="1400" dirty="0"/>
           </a:p>
         </p:txBody>
       </p:sp>
     </p:spTree>
-    <p:extLst>
-      <p:ext uri="{BB962C8B-B14F-4D97-AF65-F5344CB8AC3E}">
-        <p14:creationId xmlns:p14="http://schemas.microsoft.com/office/powerpoint/2010/main" val="601453579"/>
-      </p:ext>
-    </p:extLst>
   </p:cSld>
   <p:clrMapOvr>
     <a:masterClrMapping/>
@@ -4413,7 +4163,7 @@
     </a:clrScheme>
     <a:fontScheme name="Office">
       <a:majorFont>
-        <a:latin typeface="等线 Light" panose="020F0302020204030204"/>
+        <a:latin typeface="等线 Light"/>
         <a:ea typeface=""/>
         <a:cs typeface=""/>
         <a:font script="Jpan" typeface="游ゴシック Light"/>
@@ -4446,26 +4196,9 @@
         <a:font script="Viet" typeface="Times New Roman"/>
         <a:font script="Uigh" typeface="Microsoft Uighur"/>
         <a:font script="Geor" typeface="Sylfaen"/>
-        <a:font script="Armn" typeface="Arial"/>
-        <a:font script="Bugi" typeface="Leelawadee UI"/>
-        <a:font script="Bopo" typeface="Microsoft JhengHei"/>
-        <a:font script="Java" typeface="Javanese Text"/>
-        <a:font script="Lisu" typeface="Segoe UI"/>
-        <a:font script="Mymr" typeface="Myanmar Text"/>
-        <a:font script="Nkoo" typeface="Ebrima"/>
-        <a:font script="Olck" typeface="Nirmala UI"/>
-        <a:font script="Osma" typeface="Ebrima"/>
-        <a:font script="Phag" typeface="Phagspa"/>
-        <a:font script="Syrn" typeface="Estrangelo Edessa"/>
-        <a:font script="Syrj" typeface="Estrangelo Edessa"/>
-        <a:font script="Syre" typeface="Estrangelo Edessa"/>
-        <a:font script="Sora" typeface="Nirmala UI"/>
-        <a:font script="Tale" typeface="Microsoft Tai Le"/>
-        <a:font script="Talu" typeface="Microsoft New Tai Lue"/>
-        <a:font script="Tfng" typeface="Ebrima"/>
       </a:majorFont>
       <a:minorFont>
-        <a:latin typeface="等线" panose="020F0502020204030204"/>
+        <a:latin typeface="等线"/>
         <a:ea typeface=""/>
         <a:cs typeface=""/>
         <a:font script="Jpan" typeface="游ゴシック"/>
@@ -4498,23 +4231,6 @@
         <a:font script="Viet" typeface="Arial"/>
         <a:font script="Uigh" typeface="Microsoft Uighur"/>
         <a:font script="Geor" typeface="Sylfaen"/>
-        <a:font script="Armn" typeface="Arial"/>
-        <a:font script="Bugi" typeface="Leelawadee UI"/>
-        <a:font script="Bopo" typeface="Microsoft JhengHei"/>
-        <a:font script="Java" typeface="Javanese Text"/>
-        <a:font script="Lisu" typeface="Segoe UI"/>
-        <a:font script="Mymr" typeface="Myanmar Text"/>
-        <a:font script="Nkoo" typeface="Ebrima"/>
-        <a:font script="Olck" typeface="Nirmala UI"/>
-        <a:font script="Osma" typeface="Ebrima"/>
-        <a:font script="Phag" typeface="Phagspa"/>
-        <a:font script="Syrn" typeface="Estrangelo Edessa"/>
-        <a:font script="Syrj" typeface="Estrangelo Edessa"/>
-        <a:font script="Syre" typeface="Estrangelo Edessa"/>
-        <a:font script="Sora" typeface="Nirmala UI"/>
-        <a:font script="Tale" typeface="Microsoft Tai Le"/>
-        <a:font script="Talu" typeface="Microsoft New Tai Lue"/>
-        <a:font script="Tfng" typeface="Ebrima"/>
       </a:minorFont>
     </a:fontScheme>
     <a:fmtScheme name="Office">
@@ -4655,8 +4371,6 @@
       </a:bgFillStyleLst>
     </a:fmtScheme>
   </a:themeElements>
-  <a:objectDefaults/>
-  <a:extraClrSchemeLst/>
   <a:extLst>
     <a:ext uri="{05A4C25C-085E-4340-85A3-A5531E510DB2}">
       <thm15:themeFamily xmlns:thm15="http://schemas.microsoft.com/office/thememl/2012/main" name="Office Theme" id="{62F939B6-93AF-4DB8-9C6B-D6C7DFDC589F}" vid="{4A3C46E8-61CC-4603-A589-7422A47A8E4A}"/>

</xml_diff>

<commit_message>
Update structure image and .drawio dile of search part
</commit_message>
<xml_diff>
--- a/presentation-book-exchange.pptx
+++ b/presentation-book-exchange.pptx
@@ -2655,7 +2655,7 @@
         <a:spcBef>
           <a:spcPts val="1000"/>
         </a:spcBef>
-        <a:buFont typeface="Arial" panose="020B0604020202090204" pitchFamily="34" charset="0"/>
+        <a:buFont typeface="Arial" panose="020B0604020202020204" pitchFamily="34" charset="0"/>
         <a:buChar char="•"/>
         <a:defRPr sz="2800" kern="1200">
           <a:solidFill>
@@ -2673,7 +2673,7 @@
         <a:spcBef>
           <a:spcPts val="500"/>
         </a:spcBef>
-        <a:buFont typeface="Arial" panose="020B0604020202090204" pitchFamily="34" charset="0"/>
+        <a:buFont typeface="Arial" panose="020B0604020202020204" pitchFamily="34" charset="0"/>
         <a:buChar char="•"/>
         <a:defRPr sz="2400" kern="1200">
           <a:solidFill>
@@ -2691,7 +2691,7 @@
         <a:spcBef>
           <a:spcPts val="500"/>
         </a:spcBef>
-        <a:buFont typeface="Arial" panose="020B0604020202090204" pitchFamily="34" charset="0"/>
+        <a:buFont typeface="Arial" panose="020B0604020202020204" pitchFamily="34" charset="0"/>
         <a:buChar char="•"/>
         <a:defRPr sz="2000" kern="1200">
           <a:solidFill>
@@ -2709,7 +2709,7 @@
         <a:spcBef>
           <a:spcPts val="500"/>
         </a:spcBef>
-        <a:buFont typeface="Arial" panose="020B0604020202090204" pitchFamily="34" charset="0"/>
+        <a:buFont typeface="Arial" panose="020B0604020202020204" pitchFamily="34" charset="0"/>
         <a:buChar char="•"/>
         <a:defRPr sz="1800" kern="1200">
           <a:solidFill>
@@ -2727,7 +2727,7 @@
         <a:spcBef>
           <a:spcPts val="500"/>
         </a:spcBef>
-        <a:buFont typeface="Arial" panose="020B0604020202090204" pitchFamily="34" charset="0"/>
+        <a:buFont typeface="Arial" panose="020B0604020202020204" pitchFamily="34" charset="0"/>
         <a:buChar char="•"/>
         <a:defRPr sz="1800" kern="1200">
           <a:solidFill>
@@ -2745,7 +2745,7 @@
         <a:spcBef>
           <a:spcPts val="500"/>
         </a:spcBef>
-        <a:buFont typeface="Arial" panose="020B0604020202090204" pitchFamily="34" charset="0"/>
+        <a:buFont typeface="Arial" panose="020B0604020202020204" pitchFamily="34" charset="0"/>
         <a:buChar char="•"/>
         <a:defRPr sz="1800" kern="1200">
           <a:solidFill>
@@ -2763,7 +2763,7 @@
         <a:spcBef>
           <a:spcPts val="500"/>
         </a:spcBef>
-        <a:buFont typeface="Arial" panose="020B0604020202090204" pitchFamily="34" charset="0"/>
+        <a:buFont typeface="Arial" panose="020B0604020202020204" pitchFamily="34" charset="0"/>
         <a:buChar char="•"/>
         <a:defRPr sz="1800" kern="1200">
           <a:solidFill>
@@ -2781,7 +2781,7 @@
         <a:spcBef>
           <a:spcPts val="500"/>
         </a:spcBef>
-        <a:buFont typeface="Arial" panose="020B0604020202090204" pitchFamily="34" charset="0"/>
+        <a:buFont typeface="Arial" panose="020B0604020202020204" pitchFamily="34" charset="0"/>
         <a:buChar char="•"/>
         <a:defRPr sz="1800" kern="1200">
           <a:solidFill>
@@ -2799,7 +2799,7 @@
         <a:spcBef>
           <a:spcPts val="500"/>
         </a:spcBef>
-        <a:buFont typeface="Arial" panose="020B0604020202090204" pitchFamily="34" charset="0"/>
+        <a:buFont typeface="Arial" panose="020B0604020202020204" pitchFamily="34" charset="0"/>
         <a:buChar char="•"/>
         <a:defRPr sz="1800" kern="1200">
           <a:solidFill>
@@ -3324,7 +3324,7 @@
           <a:lstStyle/>
           <a:p>
             <a:pPr marL="285750" indent="-285750">
-              <a:buFont typeface="Arial" panose="020B0604020202090204" pitchFamily="34" charset="0"/>
+              <a:buFont typeface="Arial" panose="020B0604020202020204" pitchFamily="34" charset="0"/>
               <a:buChar char="•"/>
             </a:pPr>
             <a:r>
@@ -3343,7 +3343,7 @@
           </a:p>
           <a:p>
             <a:pPr marL="285750" indent="-285750">
-              <a:buFont typeface="Arial" panose="020B0604020202090204" pitchFamily="34" charset="0"/>
+              <a:buFont typeface="Arial" panose="020B0604020202020204" pitchFamily="34" charset="0"/>
               <a:buChar char="•"/>
             </a:pPr>
             <a:r>
@@ -3362,7 +3362,7 @@
           </a:p>
           <a:p>
             <a:pPr marL="285750" indent="-285750">
-              <a:buFont typeface="Arial" panose="020B0604020202090204" pitchFamily="34" charset="0"/>
+              <a:buFont typeface="Arial" panose="020B0604020202020204" pitchFamily="34" charset="0"/>
               <a:buChar char="•"/>
             </a:pPr>
             <a:r>
@@ -3731,7 +3731,7 @@
           </a:bodyPr>
           <a:p>
             <a:pPr marL="285750" indent="-285750">
-              <a:buFont typeface="Arial" panose="020B0604020202090204" pitchFamily="34" charset="0"/>
+              <a:buFont typeface="Arial" panose="020B0604020202020204" pitchFamily="34" charset="0"/>
               <a:buChar char="•"/>
             </a:pPr>
             <a:r>
@@ -3752,7 +3752,7 @@
           </a:p>
           <a:p>
             <a:pPr marL="285750" indent="-285750">
-              <a:buFont typeface="Arial" panose="020B0604020202090204" pitchFamily="34" charset="0"/>
+              <a:buFont typeface="Arial" panose="020B0604020202020204" pitchFamily="34" charset="0"/>
               <a:buChar char="•"/>
             </a:pPr>
             <a:endParaRPr lang="en-US" altLang="zh-CN" sz="1200" dirty="0">
@@ -3764,7 +3764,7 @@
           </a:p>
           <a:p>
             <a:pPr marL="285750" indent="-285750">
-              <a:buFont typeface="Arial" panose="020B0604020202090204" pitchFamily="34" charset="0"/>
+              <a:buFont typeface="Arial" panose="020B0604020202020204" pitchFamily="34" charset="0"/>
               <a:buChar char="•"/>
             </a:pPr>
             <a:r>
@@ -3785,7 +3785,7 @@
           </a:p>
           <a:p>
             <a:pPr marL="285750" indent="-285750">
-              <a:buFont typeface="Arial" panose="020B0604020202090204" pitchFamily="34" charset="0"/>
+              <a:buFont typeface="Arial" panose="020B0604020202020204" pitchFamily="34" charset="0"/>
               <a:buChar char="•"/>
             </a:pPr>
             <a:endParaRPr lang="en-US" altLang="zh-CN" sz="1200" dirty="0">
@@ -3797,7 +3797,7 @@
           </a:p>
           <a:p>
             <a:pPr marL="285750" indent="-285750">
-              <a:buFont typeface="Arial" panose="020B0604020202090204" pitchFamily="34" charset="0"/>
+              <a:buFont typeface="Arial" panose="020B0604020202020204" pitchFamily="34" charset="0"/>
               <a:buChar char="•"/>
             </a:pPr>
             <a:r>
@@ -3807,7 +3807,7 @@
                 </a:solidFill>
                 <a:sym typeface="+mn-ea"/>
               </a:rPr>
-              <a:t>The lambda function also automatically get the book cover by using Open Library API</a:t>
+              <a:t>The lambda function also automatically get the book cover by using Open Library API and upload pic from S3</a:t>
             </a:r>
             <a:endParaRPr lang="en-US" altLang="zh-CN" sz="1200" dirty="0">
               <a:solidFill>
@@ -3818,7 +3818,7 @@
           </a:p>
           <a:p>
             <a:pPr marL="285750" indent="-285750">
-              <a:buFont typeface="Arial" panose="020B0604020202090204" pitchFamily="34" charset="0"/>
+              <a:buFont typeface="Arial" panose="020B0604020202020204" pitchFamily="34" charset="0"/>
               <a:buChar char="•"/>
             </a:pPr>
             <a:endParaRPr lang="en-US" sz="1200">
@@ -3829,7 +3829,7 @@
           </a:p>
           <a:p>
             <a:pPr marL="285750" indent="-285750">
-              <a:buFont typeface="Arial" panose="020B0604020202090204" pitchFamily="34" charset="0"/>
+              <a:buFont typeface="Arial" panose="020B0604020202020204" pitchFamily="34" charset="0"/>
               <a:buChar char="•"/>
             </a:pPr>
             <a:r>
@@ -3850,7 +3850,7 @@
       </p:sp>
       <p:pic>
         <p:nvPicPr>
-          <p:cNvPr id="4" name="Picture 3" descr="SearchService.drawio"/>
+          <p:cNvPr id="5" name="Picture 4"/>
           <p:cNvPicPr>
             <a:picLocks noChangeAspect="1"/>
           </p:cNvPicPr>
@@ -3864,8 +3864,8 @@
         </p:blipFill>
         <p:spPr>
           <a:xfrm>
-            <a:off x="1422400" y="1925955"/>
-            <a:ext cx="2468245" cy="4332605"/>
+            <a:off x="6726555" y="1096010"/>
+            <a:ext cx="4578350" cy="1983740"/>
           </a:xfrm>
           <a:prstGeom prst="rect">
             <a:avLst/>
@@ -3874,7 +3874,7 @@
       </p:pic>
       <p:pic>
         <p:nvPicPr>
-          <p:cNvPr id="5" name="Picture 4"/>
+          <p:cNvPr id="6" name="Picture 5"/>
           <p:cNvPicPr>
             <a:picLocks noChangeAspect="1"/>
           </p:cNvPicPr>
@@ -3888,8 +3888,8 @@
         </p:blipFill>
         <p:spPr>
           <a:xfrm>
-            <a:off x="6726555" y="1096010"/>
-            <a:ext cx="4578350" cy="1983740"/>
+            <a:off x="6726555" y="3719195"/>
+            <a:ext cx="4576445" cy="2248535"/>
           </a:xfrm>
           <a:prstGeom prst="rect">
             <a:avLst/>
@@ -3898,7 +3898,7 @@
       </p:pic>
       <p:pic>
         <p:nvPicPr>
-          <p:cNvPr id="6" name="Picture 5"/>
+          <p:cNvPr id="11" name="Picture 10" descr="SearchService.drawio"/>
           <p:cNvPicPr>
             <a:picLocks noChangeAspect="1"/>
           </p:cNvPicPr>
@@ -3912,8 +3912,8 @@
         </p:blipFill>
         <p:spPr>
           <a:xfrm>
-            <a:off x="6726555" y="3719195"/>
-            <a:ext cx="4576445" cy="2248535"/>
+            <a:off x="1492885" y="2074545"/>
+            <a:ext cx="2397760" cy="3758565"/>
           </a:xfrm>
           <a:prstGeom prst="rect">
             <a:avLst/>

</xml_diff>

<commit_message>
update add-to-fav and front-end part
</commit_message>
<xml_diff>
--- a/presentation-book-exchange.pptx
+++ b/presentation-book-exchange.pptx
@@ -5,24 +5,24 @@
     <p:sldMasterId id="2147483648" r:id="rId1"/>
   </p:sldMasterIdLst>
   <p:notesMasterIdLst>
-    <p:notesMasterId r:id="rId4"/>
+    <p:notesMasterId r:id="rId10"/>
   </p:notesMasterIdLst>
   <p:sldIdLst>
-    <p:sldId id="256" r:id="rId3"/>
-    <p:sldId id="261" r:id="rId5"/>
-    <p:sldId id="262" r:id="rId6"/>
-    <p:sldId id="263" r:id="rId7"/>
-    <p:sldId id="264" r:id="rId8"/>
-    <p:sldId id="265" r:id="rId9"/>
-    <p:sldId id="267" r:id="rId10"/>
+    <p:sldId id="256" r:id="rId2"/>
+    <p:sldId id="261" r:id="rId3"/>
+    <p:sldId id="262" r:id="rId4"/>
+    <p:sldId id="263" r:id="rId5"/>
+    <p:sldId id="268" r:id="rId6"/>
+    <p:sldId id="264" r:id="rId7"/>
+    <p:sldId id="265" r:id="rId8"/>
+    <p:sldId id="267" r:id="rId9"/>
   </p:sldIdLst>
-  <p:sldSz cx="9144000" cy="6858000"/>
+  <p:sldSz cx="9144000" cy="6858000" type="screen4x3"/>
   <p:notesSz cx="7010400" cy="9296400"/>
   <p:embeddedFontLst>
     <p:embeddedFont>
-      <p:font typeface="SimSun" panose="02010600030101010101" pitchFamily="2" charset="-122"/>
-      <p:regular r:id="rId14"/>
-      <p:bold r:id="rId15"/>
+      <p:font typeface="Arial Black" panose="020B0A04020102020204" pitchFamily="34" charset="0"/>
+      <p:bold r:id="rId11"/>
     </p:embeddedFont>
   </p:embeddedFontLst>
   <p:defaultTextStyle>
@@ -270,7 +270,7 @@
     </p:bg>
     <p:spTree>
       <p:nvGrpSpPr>
-        <p:cNvPr id="2" name="Shape 2"/>
+        <p:cNvPr id="1" name="Shape 2"/>
         <p:cNvGrpSpPr/>
         <p:nvPr/>
       </p:nvGrpSpPr>
@@ -285,7 +285,9 @@
       <p:sp>
         <p:nvSpPr>
           <p:cNvPr id="3" name="Google Shape;3;n"/>
-          <p:cNvSpPr txBox="1"/>
+          <p:cNvSpPr txBox="1">
+            <a:spLocks noGrp="1"/>
+          </p:cNvSpPr>
           <p:nvPr>
             <p:ph type="hdr" idx="2"/>
           </p:nvPr>
@@ -507,13 +509,17 @@
               </a:defRPr>
             </a:lvl9pPr>
           </a:lstStyle>
-          <a:p/>
+          <a:p>
+            <a:endParaRPr/>
+          </a:p>
         </p:txBody>
       </p:sp>
       <p:sp>
         <p:nvSpPr>
           <p:cNvPr id="4" name="Google Shape;4;n"/>
-          <p:cNvSpPr txBox="1"/>
+          <p:cNvSpPr txBox="1">
+            <a:spLocks noGrp="1"/>
+          </p:cNvSpPr>
           <p:nvPr>
             <p:ph type="dt" idx="10"/>
           </p:nvPr>
@@ -735,13 +741,17 @@
               </a:defRPr>
             </a:lvl9pPr>
           </a:lstStyle>
-          <a:p/>
+          <a:p>
+            <a:endParaRPr/>
+          </a:p>
         </p:txBody>
       </p:sp>
       <p:sp>
         <p:nvSpPr>
           <p:cNvPr id="5" name="Google Shape;5;n"/>
-          <p:cNvSpPr/>
+          <p:cNvSpPr>
+            <a:spLocks noGrp="1" noRot="1" noChangeAspect="1"/>
+          </p:cNvSpPr>
           <p:nvPr>
             <p:ph type="sldImg" idx="3"/>
           </p:nvPr>
@@ -790,7 +800,9 @@
       <p:sp>
         <p:nvSpPr>
           <p:cNvPr id="6" name="Google Shape;6;n"/>
-          <p:cNvSpPr txBox="1"/>
+          <p:cNvSpPr txBox="1">
+            <a:spLocks noGrp="1"/>
+          </p:cNvSpPr>
           <p:nvPr>
             <p:ph type="body" idx="1"/>
           </p:nvPr>
@@ -913,13 +925,17 @@
               <a:defRPr sz="1800" b="0" i="0" u="none" strike="noStrike" cap="none"/>
             </a:lvl9pPr>
           </a:lstStyle>
-          <a:p/>
+          <a:p>
+            <a:endParaRPr/>
+          </a:p>
         </p:txBody>
       </p:sp>
       <p:sp>
         <p:nvSpPr>
           <p:cNvPr id="7" name="Google Shape;7;n"/>
-          <p:cNvSpPr txBox="1"/>
+          <p:cNvSpPr txBox="1">
+            <a:spLocks noGrp="1"/>
+          </p:cNvSpPr>
           <p:nvPr>
             <p:ph type="ftr" idx="11"/>
           </p:nvPr>
@@ -1141,13 +1157,17 @@
               </a:defRPr>
             </a:lvl9pPr>
           </a:lstStyle>
-          <a:p/>
+          <a:p>
+            <a:endParaRPr/>
+          </a:p>
         </p:txBody>
       </p:sp>
       <p:sp>
         <p:nvSpPr>
           <p:cNvPr id="8" name="Google Shape;8;n"/>
-          <p:cNvSpPr txBox="1"/>
+          <p:cNvSpPr txBox="1">
+            <a:spLocks noGrp="1"/>
+          </p:cNvSpPr>
           <p:nvPr>
             <p:ph type="sldNum" idx="12"/>
           </p:nvPr>
@@ -1197,6 +1217,7 @@
                 <a:cs typeface="Arial" panose="020B0604020202090204"/>
                 <a:sym typeface="Arial" panose="020B0604020202090204"/>
               </a:rPr>
+              <a:t>‹#›</a:t>
             </a:fld>
             <a:endParaRPr lang="en-US" sz="1200" b="0" i="0" u="none" strike="noStrike" cap="none">
               <a:solidFill>
@@ -1446,11 +1467,11 @@
 </file>
 
 <file path=ppt/notesSlides/notesSlide1.xml><?xml version="1.0" encoding="utf-8"?>
-<p:notes xmlns:a="http://schemas.openxmlformats.org/drawingml/2006/main" xmlns:r="http://schemas.openxmlformats.org/officeDocument/2006/relationships" xmlns:p="http://schemas.openxmlformats.org/presentationml/2006/main" showMasterPhAnim="0" showMasterSp="0">
+<p:notes xmlns:a="http://schemas.openxmlformats.org/drawingml/2006/main" xmlns:r="http://schemas.openxmlformats.org/officeDocument/2006/relationships" xmlns:p="http://schemas.openxmlformats.org/presentationml/2006/main" showMasterSp="0" showMasterPhAnim="0">
   <p:cSld>
     <p:spTree>
       <p:nvGrpSpPr>
-        <p:cNvPr id="62" name="Shape 62"/>
+        <p:cNvPr id="1" name="Shape 62"/>
         <p:cNvGrpSpPr/>
         <p:nvPr/>
       </p:nvGrpSpPr>
@@ -1465,7 +1486,9 @@
       <p:sp>
         <p:nvSpPr>
           <p:cNvPr id="63" name="Google Shape;63;g1279abe8913_0_16:notes"/>
-          <p:cNvSpPr/>
+          <p:cNvSpPr>
+            <a:spLocks noGrp="1" noRot="1" noChangeAspect="1"/>
+          </p:cNvSpPr>
           <p:nvPr>
             <p:ph type="sldImg" idx="2"/>
           </p:nvPr>
@@ -1504,7 +1527,9 @@
       <p:sp>
         <p:nvSpPr>
           <p:cNvPr id="64" name="Google Shape;64;g1279abe8913_0_16:notes"/>
-          <p:cNvSpPr txBox="1"/>
+          <p:cNvSpPr txBox="1">
+            <a:spLocks noGrp="1"/>
+          </p:cNvSpPr>
           <p:nvPr>
             <p:ph type="body" idx="1"/>
           </p:nvPr>
@@ -1533,13 +1558,16 @@
               </a:spcAft>
               <a:buNone/>
             </a:pPr>
+            <a:endParaRPr/>
           </a:p>
         </p:txBody>
       </p:sp>
       <p:sp>
         <p:nvSpPr>
           <p:cNvPr id="65" name="Google Shape;65;g1279abe8913_0_16:notes"/>
-          <p:cNvSpPr txBox="1"/>
+          <p:cNvSpPr txBox="1">
+            <a:spLocks noGrp="1"/>
+          </p:cNvSpPr>
           <p:nvPr>
             <p:ph type="sldNum" idx="12"/>
           </p:nvPr>
@@ -1574,6 +1602,7 @@
             </a:pPr>
             <a:fld id="{00000000-1234-1234-1234-123412341234}" type="slidenum">
               <a:rPr lang="en-US"/>
+              <a:t>1</a:t>
             </a:fld>
             <a:endParaRPr sz="1400"/>
           </a:p>
@@ -1588,11 +1617,11 @@
 </file>
 
 <file path=ppt/slideLayouts/slideLayout1.xml><?xml version="1.0" encoding="utf-8"?>
-<p:sldLayout xmlns:a="http://schemas.openxmlformats.org/drawingml/2006/main" xmlns:r="http://schemas.openxmlformats.org/officeDocument/2006/relationships" xmlns:p="http://schemas.openxmlformats.org/presentationml/2006/main" type="objOnly" matchingName="Content">
+<p:sldLayout xmlns:a="http://schemas.openxmlformats.org/drawingml/2006/main" xmlns:r="http://schemas.openxmlformats.org/officeDocument/2006/relationships" xmlns:p="http://schemas.openxmlformats.org/presentationml/2006/main" matchingName="Content" type="objOnly">
   <p:cSld name="OBJECT_ONLY">
     <p:spTree>
       <p:nvGrpSpPr>
-        <p:cNvPr id="12" name="Shape 12"/>
+        <p:cNvPr id="1" name="Shape 12"/>
         <p:cNvGrpSpPr/>
         <p:nvPr/>
       </p:nvGrpSpPr>
@@ -1607,7 +1636,9 @@
       <p:sp>
         <p:nvSpPr>
           <p:cNvPr id="13" name="Google Shape;13;p2"/>
-          <p:cNvSpPr txBox="1"/>
+          <p:cNvSpPr txBox="1">
+            <a:spLocks noGrp="1"/>
+          </p:cNvSpPr>
           <p:nvPr>
             <p:ph type="body" idx="1"/>
           </p:nvPr>
@@ -1838,7 +1869,9 @@
               </a:defRPr>
             </a:lvl9pPr>
           </a:lstStyle>
-          <a:p/>
+          <a:p>
+            <a:endParaRPr/>
+          </a:p>
         </p:txBody>
       </p:sp>
     </p:spTree>
@@ -1850,11 +1883,11 @@
 </file>
 
 <file path=ppt/slideLayouts/slideLayout10.xml><?xml version="1.0" encoding="utf-8"?>
-<p:sldLayout xmlns:a="http://schemas.openxmlformats.org/drawingml/2006/main" xmlns:r="http://schemas.openxmlformats.org/officeDocument/2006/relationships" xmlns:p="http://schemas.openxmlformats.org/presentationml/2006/main" type="titleOnly" matchingName="Title Only">
+<p:sldLayout xmlns:a="http://schemas.openxmlformats.org/drawingml/2006/main" xmlns:r="http://schemas.openxmlformats.org/officeDocument/2006/relationships" xmlns:p="http://schemas.openxmlformats.org/presentationml/2006/main" matchingName="Title Only" type="titleOnly">
   <p:cSld name="TITLE_ONLY">
     <p:spTree>
       <p:nvGrpSpPr>
-        <p:cNvPr id="41" name="Shape 41"/>
+        <p:cNvPr id="1" name="Shape 41"/>
         <p:cNvGrpSpPr/>
         <p:nvPr/>
       </p:nvGrpSpPr>
@@ -1869,7 +1902,9 @@
       <p:sp>
         <p:nvSpPr>
           <p:cNvPr id="42" name="Google Shape;42;p11"/>
-          <p:cNvSpPr txBox="1"/>
+          <p:cNvSpPr txBox="1">
+            <a:spLocks noGrp="1"/>
+          </p:cNvSpPr>
           <p:nvPr>
             <p:ph type="title"/>
           </p:nvPr>
@@ -2064,7 +2099,9 @@
               </a:defRPr>
             </a:lvl9pPr>
           </a:lstStyle>
-          <a:p/>
+          <a:p>
+            <a:endParaRPr/>
+          </a:p>
         </p:txBody>
       </p:sp>
     </p:spTree>
@@ -2076,11 +2113,11 @@
 </file>
 
 <file path=ppt/slideLayouts/slideLayout11.xml><?xml version="1.0" encoding="utf-8"?>
-<p:sldLayout xmlns:a="http://schemas.openxmlformats.org/drawingml/2006/main" xmlns:r="http://schemas.openxmlformats.org/officeDocument/2006/relationships" xmlns:p="http://schemas.openxmlformats.org/presentationml/2006/main" type="twoTxTwoObj" matchingName="Comparison">
+<p:sldLayout xmlns:a="http://schemas.openxmlformats.org/drawingml/2006/main" xmlns:r="http://schemas.openxmlformats.org/officeDocument/2006/relationships" xmlns:p="http://schemas.openxmlformats.org/presentationml/2006/main" matchingName="Comparison" type="twoTxTwoObj">
   <p:cSld name="TWO_OBJECTS_WITH_TEXT">
     <p:spTree>
       <p:nvGrpSpPr>
-        <p:cNvPr id="43" name="Shape 43"/>
+        <p:cNvPr id="1" name="Shape 43"/>
         <p:cNvGrpSpPr/>
         <p:nvPr/>
       </p:nvGrpSpPr>
@@ -2095,7 +2132,9 @@
       <p:sp>
         <p:nvSpPr>
           <p:cNvPr id="44" name="Google Shape;44;p12"/>
-          <p:cNvSpPr txBox="1"/>
+          <p:cNvSpPr txBox="1">
+            <a:spLocks noGrp="1"/>
+          </p:cNvSpPr>
           <p:nvPr>
             <p:ph type="title"/>
           </p:nvPr>
@@ -2290,13 +2329,17 @@
               </a:defRPr>
             </a:lvl9pPr>
           </a:lstStyle>
-          <a:p/>
+          <a:p>
+            <a:endParaRPr/>
+          </a:p>
         </p:txBody>
       </p:sp>
       <p:sp>
         <p:nvSpPr>
           <p:cNvPr id="45" name="Google Shape;45;p12"/>
-          <p:cNvSpPr txBox="1"/>
+          <p:cNvSpPr txBox="1">
+            <a:spLocks noGrp="1"/>
+          </p:cNvSpPr>
           <p:nvPr>
             <p:ph type="body" idx="1"/>
           </p:nvPr>
@@ -2527,13 +2570,17 @@
               </a:defRPr>
             </a:lvl9pPr>
           </a:lstStyle>
-          <a:p/>
+          <a:p>
+            <a:endParaRPr/>
+          </a:p>
         </p:txBody>
       </p:sp>
       <p:sp>
         <p:nvSpPr>
           <p:cNvPr id="46" name="Google Shape;46;p12"/>
-          <p:cNvSpPr txBox="1"/>
+          <p:cNvSpPr txBox="1">
+            <a:spLocks noGrp="1"/>
+          </p:cNvSpPr>
           <p:nvPr>
             <p:ph type="body" idx="2"/>
           </p:nvPr>
@@ -2764,13 +2811,17 @@
               </a:defRPr>
             </a:lvl9pPr>
           </a:lstStyle>
-          <a:p/>
+          <a:p>
+            <a:endParaRPr/>
+          </a:p>
         </p:txBody>
       </p:sp>
       <p:sp>
         <p:nvSpPr>
           <p:cNvPr id="47" name="Google Shape;47;p12"/>
-          <p:cNvSpPr txBox="1"/>
+          <p:cNvSpPr txBox="1">
+            <a:spLocks noGrp="1"/>
+          </p:cNvSpPr>
           <p:nvPr>
             <p:ph type="body" idx="3"/>
           </p:nvPr>
@@ -3001,13 +3052,17 @@
               </a:defRPr>
             </a:lvl9pPr>
           </a:lstStyle>
-          <a:p/>
+          <a:p>
+            <a:endParaRPr/>
+          </a:p>
         </p:txBody>
       </p:sp>
       <p:sp>
         <p:nvSpPr>
           <p:cNvPr id="48" name="Google Shape;48;p12"/>
-          <p:cNvSpPr txBox="1"/>
+          <p:cNvSpPr txBox="1">
+            <a:spLocks noGrp="1"/>
+          </p:cNvSpPr>
           <p:nvPr>
             <p:ph type="body" idx="4"/>
           </p:nvPr>
@@ -3238,7 +3293,9 @@
               </a:defRPr>
             </a:lvl9pPr>
           </a:lstStyle>
-          <a:p/>
+          <a:p>
+            <a:endParaRPr/>
+          </a:p>
         </p:txBody>
       </p:sp>
     </p:spTree>
@@ -3250,11 +3307,11 @@
 </file>
 
 <file path=ppt/slideLayouts/slideLayout12.xml><?xml version="1.0" encoding="utf-8"?>
-<p:sldLayout xmlns:a="http://schemas.openxmlformats.org/drawingml/2006/main" xmlns:r="http://schemas.openxmlformats.org/officeDocument/2006/relationships" xmlns:p="http://schemas.openxmlformats.org/presentationml/2006/main" type="twoObj" matchingName="Two Content">
+<p:sldLayout xmlns:a="http://schemas.openxmlformats.org/drawingml/2006/main" xmlns:r="http://schemas.openxmlformats.org/officeDocument/2006/relationships" xmlns:p="http://schemas.openxmlformats.org/presentationml/2006/main" matchingName="Two Content" type="twoObj">
   <p:cSld name="TWO_OBJECTS">
     <p:spTree>
       <p:nvGrpSpPr>
-        <p:cNvPr id="49" name="Shape 49"/>
+        <p:cNvPr id="1" name="Shape 49"/>
         <p:cNvGrpSpPr/>
         <p:nvPr/>
       </p:nvGrpSpPr>
@@ -3269,7 +3326,9 @@
       <p:sp>
         <p:nvSpPr>
           <p:cNvPr id="50" name="Google Shape;50;p13"/>
-          <p:cNvSpPr txBox="1"/>
+          <p:cNvSpPr txBox="1">
+            <a:spLocks noGrp="1"/>
+          </p:cNvSpPr>
           <p:nvPr>
             <p:ph type="title"/>
           </p:nvPr>
@@ -3464,13 +3523,17 @@
               </a:defRPr>
             </a:lvl9pPr>
           </a:lstStyle>
-          <a:p/>
+          <a:p>
+            <a:endParaRPr/>
+          </a:p>
         </p:txBody>
       </p:sp>
       <p:sp>
         <p:nvSpPr>
           <p:cNvPr id="51" name="Google Shape;51;p13"/>
-          <p:cNvSpPr txBox="1"/>
+          <p:cNvSpPr txBox="1">
+            <a:spLocks noGrp="1"/>
+          </p:cNvSpPr>
           <p:nvPr>
             <p:ph type="body" idx="1"/>
           </p:nvPr>
@@ -3701,13 +3764,17 @@
               </a:defRPr>
             </a:lvl9pPr>
           </a:lstStyle>
-          <a:p/>
+          <a:p>
+            <a:endParaRPr/>
+          </a:p>
         </p:txBody>
       </p:sp>
       <p:sp>
         <p:nvSpPr>
           <p:cNvPr id="52" name="Google Shape;52;p13"/>
-          <p:cNvSpPr txBox="1"/>
+          <p:cNvSpPr txBox="1">
+            <a:spLocks noGrp="1"/>
+          </p:cNvSpPr>
           <p:nvPr>
             <p:ph type="body" idx="2"/>
           </p:nvPr>
@@ -3938,7 +4005,9 @@
               </a:defRPr>
             </a:lvl9pPr>
           </a:lstStyle>
-          <a:p/>
+          <a:p>
+            <a:endParaRPr/>
+          </a:p>
         </p:txBody>
       </p:sp>
     </p:spTree>
@@ -3950,11 +4019,11 @@
 </file>
 
 <file path=ppt/slideLayouts/slideLayout13.xml><?xml version="1.0" encoding="utf-8"?>
-<p:sldLayout xmlns:a="http://schemas.openxmlformats.org/drawingml/2006/main" xmlns:r="http://schemas.openxmlformats.org/officeDocument/2006/relationships" xmlns:p="http://schemas.openxmlformats.org/presentationml/2006/main" type="secHead" matchingName="Section Header">
+<p:sldLayout xmlns:a="http://schemas.openxmlformats.org/drawingml/2006/main" xmlns:r="http://schemas.openxmlformats.org/officeDocument/2006/relationships" xmlns:p="http://schemas.openxmlformats.org/presentationml/2006/main" matchingName="Section Header" type="secHead">
   <p:cSld name="SECTION_HEADER">
     <p:spTree>
       <p:nvGrpSpPr>
-        <p:cNvPr id="53" name="Shape 53"/>
+        <p:cNvPr id="1" name="Shape 53"/>
         <p:cNvGrpSpPr/>
         <p:nvPr/>
       </p:nvGrpSpPr>
@@ -3969,7 +4038,9 @@
       <p:sp>
         <p:nvSpPr>
           <p:cNvPr id="54" name="Google Shape;54;p14"/>
-          <p:cNvSpPr txBox="1"/>
+          <p:cNvSpPr txBox="1">
+            <a:spLocks noGrp="1"/>
+          </p:cNvSpPr>
           <p:nvPr>
             <p:ph type="title"/>
           </p:nvPr>
@@ -4164,13 +4235,17 @@
               </a:defRPr>
             </a:lvl9pPr>
           </a:lstStyle>
-          <a:p/>
+          <a:p>
+            <a:endParaRPr/>
+          </a:p>
         </p:txBody>
       </p:sp>
       <p:sp>
         <p:nvSpPr>
           <p:cNvPr id="55" name="Google Shape;55;p14"/>
-          <p:cNvSpPr txBox="1"/>
+          <p:cNvSpPr txBox="1">
+            <a:spLocks noGrp="1"/>
+          </p:cNvSpPr>
           <p:nvPr>
             <p:ph type="body" idx="1"/>
           </p:nvPr>
@@ -4401,7 +4476,9 @@
               </a:defRPr>
             </a:lvl9pPr>
           </a:lstStyle>
-          <a:p/>
+          <a:p>
+            <a:endParaRPr/>
+          </a:p>
         </p:txBody>
       </p:sp>
     </p:spTree>
@@ -4413,11 +4490,11 @@
 </file>
 
 <file path=ppt/slideLayouts/slideLayout14.xml><?xml version="1.0" encoding="utf-8"?>
-<p:sldLayout xmlns:a="http://schemas.openxmlformats.org/drawingml/2006/main" xmlns:r="http://schemas.openxmlformats.org/officeDocument/2006/relationships" xmlns:p="http://schemas.openxmlformats.org/presentationml/2006/main" type="obj" matchingName="Title and Content">
+<p:sldLayout xmlns:a="http://schemas.openxmlformats.org/drawingml/2006/main" xmlns:r="http://schemas.openxmlformats.org/officeDocument/2006/relationships" xmlns:p="http://schemas.openxmlformats.org/presentationml/2006/main" matchingName="Title and Content" type="obj">
   <p:cSld name="OBJECT">
     <p:spTree>
       <p:nvGrpSpPr>
-        <p:cNvPr id="56" name="Shape 56"/>
+        <p:cNvPr id="1" name="Shape 56"/>
         <p:cNvGrpSpPr/>
         <p:nvPr/>
       </p:nvGrpSpPr>
@@ -4432,7 +4509,9 @@
       <p:sp>
         <p:nvSpPr>
           <p:cNvPr id="57" name="Google Shape;57;p15"/>
-          <p:cNvSpPr txBox="1"/>
+          <p:cNvSpPr txBox="1">
+            <a:spLocks noGrp="1"/>
+          </p:cNvSpPr>
           <p:nvPr>
             <p:ph type="title"/>
           </p:nvPr>
@@ -4627,13 +4706,17 @@
               </a:defRPr>
             </a:lvl9pPr>
           </a:lstStyle>
-          <a:p/>
+          <a:p>
+            <a:endParaRPr/>
+          </a:p>
         </p:txBody>
       </p:sp>
       <p:sp>
         <p:nvSpPr>
           <p:cNvPr id="58" name="Google Shape;58;p15"/>
-          <p:cNvSpPr txBox="1"/>
+          <p:cNvSpPr txBox="1">
+            <a:spLocks noGrp="1"/>
+          </p:cNvSpPr>
           <p:nvPr>
             <p:ph type="body" idx="1"/>
           </p:nvPr>
@@ -4864,7 +4947,9 @@
               </a:defRPr>
             </a:lvl9pPr>
           </a:lstStyle>
-          <a:p/>
+          <a:p>
+            <a:endParaRPr/>
+          </a:p>
         </p:txBody>
       </p:sp>
     </p:spTree>
@@ -4876,11 +4961,11 @@
 </file>
 
 <file path=ppt/slideLayouts/slideLayout15.xml><?xml version="1.0" encoding="utf-8"?>
-<p:sldLayout xmlns:a="http://schemas.openxmlformats.org/drawingml/2006/main" xmlns:r="http://schemas.openxmlformats.org/officeDocument/2006/relationships" xmlns:p="http://schemas.openxmlformats.org/presentationml/2006/main" type="title" matchingName="Title Slide">
+<p:sldLayout xmlns:a="http://schemas.openxmlformats.org/drawingml/2006/main" xmlns:r="http://schemas.openxmlformats.org/officeDocument/2006/relationships" xmlns:p="http://schemas.openxmlformats.org/presentationml/2006/main" matchingName="Title Slide" type="title">
   <p:cSld name="TITLE">
     <p:spTree>
       <p:nvGrpSpPr>
-        <p:cNvPr id="59" name="Shape 59"/>
+        <p:cNvPr id="1" name="Shape 59"/>
         <p:cNvGrpSpPr/>
         <p:nvPr/>
       </p:nvGrpSpPr>
@@ -4895,7 +4980,9 @@
       <p:sp>
         <p:nvSpPr>
           <p:cNvPr id="60" name="Google Shape;60;p16"/>
-          <p:cNvSpPr txBox="1"/>
+          <p:cNvSpPr txBox="1">
+            <a:spLocks noGrp="1"/>
+          </p:cNvSpPr>
           <p:nvPr>
             <p:ph type="ctrTitle"/>
           </p:nvPr>
@@ -5090,13 +5177,17 @@
               </a:defRPr>
             </a:lvl9pPr>
           </a:lstStyle>
-          <a:p/>
+          <a:p>
+            <a:endParaRPr/>
+          </a:p>
         </p:txBody>
       </p:sp>
       <p:sp>
         <p:nvSpPr>
           <p:cNvPr id="61" name="Google Shape;61;p16"/>
-          <p:cNvSpPr txBox="1"/>
+          <p:cNvSpPr txBox="1">
+            <a:spLocks noGrp="1"/>
+          </p:cNvSpPr>
           <p:nvPr>
             <p:ph type="subTitle" idx="1"/>
           </p:nvPr>
@@ -5327,7 +5418,9 @@
               </a:defRPr>
             </a:lvl9pPr>
           </a:lstStyle>
-          <a:p/>
+          <a:p>
+            <a:endParaRPr/>
+          </a:p>
         </p:txBody>
       </p:sp>
     </p:spTree>
@@ -5339,11 +5432,11 @@
 </file>
 
 <file path=ppt/slideLayouts/slideLayout2.xml><?xml version="1.0" encoding="utf-8"?>
-<p:sldLayout xmlns:a="http://schemas.openxmlformats.org/drawingml/2006/main" xmlns:r="http://schemas.openxmlformats.org/officeDocument/2006/relationships" xmlns:p="http://schemas.openxmlformats.org/presentationml/2006/main" type="txAndObj" matchingName="Title, Text, and Content">
+<p:sldLayout xmlns:a="http://schemas.openxmlformats.org/drawingml/2006/main" xmlns:r="http://schemas.openxmlformats.org/officeDocument/2006/relationships" xmlns:p="http://schemas.openxmlformats.org/presentationml/2006/main" matchingName="Title, Text, and Content" type="txAndObj">
   <p:cSld name="TEXT_AND_OBJECT">
     <p:spTree>
       <p:nvGrpSpPr>
-        <p:cNvPr id="14" name="Shape 14"/>
+        <p:cNvPr id="1" name="Shape 14"/>
         <p:cNvGrpSpPr/>
         <p:nvPr/>
       </p:nvGrpSpPr>
@@ -5358,7 +5451,9 @@
       <p:sp>
         <p:nvSpPr>
           <p:cNvPr id="15" name="Google Shape;15;p3"/>
-          <p:cNvSpPr txBox="1"/>
+          <p:cNvSpPr txBox="1">
+            <a:spLocks noGrp="1"/>
+          </p:cNvSpPr>
           <p:nvPr>
             <p:ph type="title"/>
           </p:nvPr>
@@ -5553,13 +5648,17 @@
               </a:defRPr>
             </a:lvl9pPr>
           </a:lstStyle>
-          <a:p/>
+          <a:p>
+            <a:endParaRPr/>
+          </a:p>
         </p:txBody>
       </p:sp>
       <p:sp>
         <p:nvSpPr>
           <p:cNvPr id="16" name="Google Shape;16;p3"/>
-          <p:cNvSpPr txBox="1"/>
+          <p:cNvSpPr txBox="1">
+            <a:spLocks noGrp="1"/>
+          </p:cNvSpPr>
           <p:nvPr>
             <p:ph type="body" idx="1"/>
           </p:nvPr>
@@ -5790,13 +5889,17 @@
               </a:defRPr>
             </a:lvl9pPr>
           </a:lstStyle>
-          <a:p/>
+          <a:p>
+            <a:endParaRPr/>
+          </a:p>
         </p:txBody>
       </p:sp>
       <p:sp>
         <p:nvSpPr>
           <p:cNvPr id="17" name="Google Shape;17;p3"/>
-          <p:cNvSpPr txBox="1"/>
+          <p:cNvSpPr txBox="1">
+            <a:spLocks noGrp="1"/>
+          </p:cNvSpPr>
           <p:nvPr>
             <p:ph type="body" idx="2"/>
           </p:nvPr>
@@ -6027,7 +6130,9 @@
               </a:defRPr>
             </a:lvl9pPr>
           </a:lstStyle>
-          <a:p/>
+          <a:p>
+            <a:endParaRPr/>
+          </a:p>
         </p:txBody>
       </p:sp>
     </p:spTree>
@@ -6039,11 +6144,11 @@
 </file>
 
 <file path=ppt/slideLayouts/slideLayout3.xml><?xml version="1.0" encoding="utf-8"?>
-<p:sldLayout xmlns:a="http://schemas.openxmlformats.org/drawingml/2006/main" xmlns:r="http://schemas.openxmlformats.org/officeDocument/2006/relationships" xmlns:p="http://schemas.openxmlformats.org/presentationml/2006/main" type="fourObj" matchingName="Title and 4 Content">
+<p:sldLayout xmlns:a="http://schemas.openxmlformats.org/drawingml/2006/main" xmlns:r="http://schemas.openxmlformats.org/officeDocument/2006/relationships" xmlns:p="http://schemas.openxmlformats.org/presentationml/2006/main" matchingName="Title and 4 Content" type="fourObj">
   <p:cSld name="FOUR_OBJECTS">
     <p:spTree>
       <p:nvGrpSpPr>
-        <p:cNvPr id="18" name="Shape 18"/>
+        <p:cNvPr id="1" name="Shape 18"/>
         <p:cNvGrpSpPr/>
         <p:nvPr/>
       </p:nvGrpSpPr>
@@ -6058,7 +6163,9 @@
       <p:sp>
         <p:nvSpPr>
           <p:cNvPr id="19" name="Google Shape;19;p4"/>
-          <p:cNvSpPr txBox="1"/>
+          <p:cNvSpPr txBox="1">
+            <a:spLocks noGrp="1"/>
+          </p:cNvSpPr>
           <p:nvPr>
             <p:ph type="title"/>
           </p:nvPr>
@@ -6253,13 +6360,17 @@
               </a:defRPr>
             </a:lvl9pPr>
           </a:lstStyle>
-          <a:p/>
+          <a:p>
+            <a:endParaRPr/>
+          </a:p>
         </p:txBody>
       </p:sp>
       <p:sp>
         <p:nvSpPr>
           <p:cNvPr id="20" name="Google Shape;20;p4"/>
-          <p:cNvSpPr txBox="1"/>
+          <p:cNvSpPr txBox="1">
+            <a:spLocks noGrp="1"/>
+          </p:cNvSpPr>
           <p:nvPr>
             <p:ph type="body" idx="1"/>
           </p:nvPr>
@@ -6490,13 +6601,17 @@
               </a:defRPr>
             </a:lvl9pPr>
           </a:lstStyle>
-          <a:p/>
+          <a:p>
+            <a:endParaRPr/>
+          </a:p>
         </p:txBody>
       </p:sp>
       <p:sp>
         <p:nvSpPr>
           <p:cNvPr id="21" name="Google Shape;21;p4"/>
-          <p:cNvSpPr txBox="1"/>
+          <p:cNvSpPr txBox="1">
+            <a:spLocks noGrp="1"/>
+          </p:cNvSpPr>
           <p:nvPr>
             <p:ph type="body" idx="2"/>
           </p:nvPr>
@@ -6727,13 +6842,17 @@
               </a:defRPr>
             </a:lvl9pPr>
           </a:lstStyle>
-          <a:p/>
+          <a:p>
+            <a:endParaRPr/>
+          </a:p>
         </p:txBody>
       </p:sp>
       <p:sp>
         <p:nvSpPr>
           <p:cNvPr id="22" name="Google Shape;22;p4"/>
-          <p:cNvSpPr txBox="1"/>
+          <p:cNvSpPr txBox="1">
+            <a:spLocks noGrp="1"/>
+          </p:cNvSpPr>
           <p:nvPr>
             <p:ph type="body" idx="3"/>
           </p:nvPr>
@@ -6964,13 +7083,17 @@
               </a:defRPr>
             </a:lvl9pPr>
           </a:lstStyle>
-          <a:p/>
+          <a:p>
+            <a:endParaRPr/>
+          </a:p>
         </p:txBody>
       </p:sp>
       <p:sp>
         <p:nvSpPr>
           <p:cNvPr id="23" name="Google Shape;23;p4"/>
-          <p:cNvSpPr txBox="1"/>
+          <p:cNvSpPr txBox="1">
+            <a:spLocks noGrp="1"/>
+          </p:cNvSpPr>
           <p:nvPr>
             <p:ph type="body" idx="4"/>
           </p:nvPr>
@@ -7201,7 +7324,9 @@
               </a:defRPr>
             </a:lvl9pPr>
           </a:lstStyle>
-          <a:p/>
+          <a:p>
+            <a:endParaRPr/>
+          </a:p>
         </p:txBody>
       </p:sp>
     </p:spTree>
@@ -7213,11 +7338,11 @@
 </file>
 
 <file path=ppt/slideLayouts/slideLayout4.xml><?xml version="1.0" encoding="utf-8"?>
-<p:sldLayout xmlns:a="http://schemas.openxmlformats.org/drawingml/2006/main" xmlns:r="http://schemas.openxmlformats.org/officeDocument/2006/relationships" xmlns:p="http://schemas.openxmlformats.org/presentationml/2006/main" type="tbl" matchingName="Title and Table">
+<p:sldLayout xmlns:a="http://schemas.openxmlformats.org/drawingml/2006/main" xmlns:r="http://schemas.openxmlformats.org/officeDocument/2006/relationships" xmlns:p="http://schemas.openxmlformats.org/presentationml/2006/main" matchingName="Title and Table" type="tbl">
   <p:cSld name="TABLE">
     <p:spTree>
       <p:nvGrpSpPr>
-        <p:cNvPr id="24" name="Shape 24"/>
+        <p:cNvPr id="1" name="Shape 24"/>
         <p:cNvGrpSpPr/>
         <p:nvPr/>
       </p:nvGrpSpPr>
@@ -7232,7 +7357,9 @@
       <p:sp>
         <p:nvSpPr>
           <p:cNvPr id="25" name="Google Shape;25;p5"/>
-          <p:cNvSpPr txBox="1"/>
+          <p:cNvSpPr txBox="1">
+            <a:spLocks noGrp="1"/>
+          </p:cNvSpPr>
           <p:nvPr>
             <p:ph type="title"/>
           </p:nvPr>
@@ -7427,7 +7554,9 @@
               </a:defRPr>
             </a:lvl9pPr>
           </a:lstStyle>
-          <a:p/>
+          <a:p>
+            <a:endParaRPr/>
+          </a:p>
         </p:txBody>
       </p:sp>
     </p:spTree>
@@ -7439,11 +7568,11 @@
 </file>
 
 <file path=ppt/slideLayouts/slideLayout5.xml><?xml version="1.0" encoding="utf-8"?>
-<p:sldLayout xmlns:a="http://schemas.openxmlformats.org/drawingml/2006/main" xmlns:r="http://schemas.openxmlformats.org/officeDocument/2006/relationships" xmlns:p="http://schemas.openxmlformats.org/presentationml/2006/main" type="vertTitleAndTx" matchingName="Vertical Title and Text">
+<p:sldLayout xmlns:a="http://schemas.openxmlformats.org/drawingml/2006/main" xmlns:r="http://schemas.openxmlformats.org/officeDocument/2006/relationships" xmlns:p="http://schemas.openxmlformats.org/presentationml/2006/main" matchingName="Vertical Title and Text" type="vertTitleAndTx">
   <p:cSld name="VERTICAL_TITLE_AND_VERTICAL_TEXT">
     <p:spTree>
       <p:nvGrpSpPr>
-        <p:cNvPr id="26" name="Shape 26"/>
+        <p:cNvPr id="1" name="Shape 26"/>
         <p:cNvGrpSpPr/>
         <p:nvPr/>
       </p:nvGrpSpPr>
@@ -7458,7 +7587,9 @@
       <p:sp>
         <p:nvSpPr>
           <p:cNvPr id="27" name="Google Shape;27;p6"/>
-          <p:cNvSpPr txBox="1"/>
+          <p:cNvSpPr txBox="1">
+            <a:spLocks noGrp="1"/>
+          </p:cNvSpPr>
           <p:nvPr>
             <p:ph type="title"/>
           </p:nvPr>
@@ -7653,13 +7784,17 @@
               </a:defRPr>
             </a:lvl9pPr>
           </a:lstStyle>
-          <a:p/>
+          <a:p>
+            <a:endParaRPr/>
+          </a:p>
         </p:txBody>
       </p:sp>
       <p:sp>
         <p:nvSpPr>
           <p:cNvPr id="28" name="Google Shape;28;p6"/>
-          <p:cNvSpPr txBox="1"/>
+          <p:cNvSpPr txBox="1">
+            <a:spLocks noGrp="1"/>
+          </p:cNvSpPr>
           <p:nvPr>
             <p:ph type="body" idx="1"/>
           </p:nvPr>
@@ -7890,7 +8025,9 @@
               </a:defRPr>
             </a:lvl9pPr>
           </a:lstStyle>
-          <a:p/>
+          <a:p>
+            <a:endParaRPr/>
+          </a:p>
         </p:txBody>
       </p:sp>
     </p:spTree>
@@ -7902,11 +8039,11 @@
 </file>
 
 <file path=ppt/slideLayouts/slideLayout6.xml><?xml version="1.0" encoding="utf-8"?>
-<p:sldLayout xmlns:a="http://schemas.openxmlformats.org/drawingml/2006/main" xmlns:r="http://schemas.openxmlformats.org/officeDocument/2006/relationships" xmlns:p="http://schemas.openxmlformats.org/presentationml/2006/main" type="vertTx" matchingName="Title and Vertical Text">
+<p:sldLayout xmlns:a="http://schemas.openxmlformats.org/drawingml/2006/main" xmlns:r="http://schemas.openxmlformats.org/officeDocument/2006/relationships" xmlns:p="http://schemas.openxmlformats.org/presentationml/2006/main" matchingName="Title and Vertical Text" type="vertTx">
   <p:cSld name="VERTICAL_TEXT">
     <p:spTree>
       <p:nvGrpSpPr>
-        <p:cNvPr id="29" name="Shape 29"/>
+        <p:cNvPr id="1" name="Shape 29"/>
         <p:cNvGrpSpPr/>
         <p:nvPr/>
       </p:nvGrpSpPr>
@@ -7921,7 +8058,9 @@
       <p:sp>
         <p:nvSpPr>
           <p:cNvPr id="30" name="Google Shape;30;p7"/>
-          <p:cNvSpPr txBox="1"/>
+          <p:cNvSpPr txBox="1">
+            <a:spLocks noGrp="1"/>
+          </p:cNvSpPr>
           <p:nvPr>
             <p:ph type="title"/>
           </p:nvPr>
@@ -8116,13 +8255,17 @@
               </a:defRPr>
             </a:lvl9pPr>
           </a:lstStyle>
-          <a:p/>
+          <a:p>
+            <a:endParaRPr/>
+          </a:p>
         </p:txBody>
       </p:sp>
       <p:sp>
         <p:nvSpPr>
           <p:cNvPr id="31" name="Google Shape;31;p7"/>
-          <p:cNvSpPr txBox="1"/>
+          <p:cNvSpPr txBox="1">
+            <a:spLocks noGrp="1"/>
+          </p:cNvSpPr>
           <p:nvPr>
             <p:ph type="body" idx="1"/>
           </p:nvPr>
@@ -8353,7 +8496,9 @@
               </a:defRPr>
             </a:lvl9pPr>
           </a:lstStyle>
-          <a:p/>
+          <a:p>
+            <a:endParaRPr/>
+          </a:p>
         </p:txBody>
       </p:sp>
     </p:spTree>
@@ -8365,11 +8510,11 @@
 </file>
 
 <file path=ppt/slideLayouts/slideLayout7.xml><?xml version="1.0" encoding="utf-8"?>
-<p:sldLayout xmlns:a="http://schemas.openxmlformats.org/drawingml/2006/main" xmlns:r="http://schemas.openxmlformats.org/officeDocument/2006/relationships" xmlns:p="http://schemas.openxmlformats.org/presentationml/2006/main" type="picTx" matchingName="Picture with Caption">
+<p:sldLayout xmlns:a="http://schemas.openxmlformats.org/drawingml/2006/main" xmlns:r="http://schemas.openxmlformats.org/officeDocument/2006/relationships" xmlns:p="http://schemas.openxmlformats.org/presentationml/2006/main" matchingName="Picture with Caption" type="picTx">
   <p:cSld name="PICTURE_WITH_CAPTION_TEXT">
     <p:spTree>
       <p:nvGrpSpPr>
-        <p:cNvPr id="32" name="Shape 32"/>
+        <p:cNvPr id="1" name="Shape 32"/>
         <p:cNvGrpSpPr/>
         <p:nvPr/>
       </p:nvGrpSpPr>
@@ -8384,7 +8529,9 @@
       <p:sp>
         <p:nvSpPr>
           <p:cNvPr id="33" name="Google Shape;33;p8"/>
-          <p:cNvSpPr txBox="1"/>
+          <p:cNvSpPr txBox="1">
+            <a:spLocks noGrp="1"/>
+          </p:cNvSpPr>
           <p:nvPr>
             <p:ph type="title"/>
           </p:nvPr>
@@ -8579,13 +8726,17 @@
               </a:defRPr>
             </a:lvl9pPr>
           </a:lstStyle>
-          <a:p/>
+          <a:p>
+            <a:endParaRPr/>
+          </a:p>
         </p:txBody>
       </p:sp>
       <p:sp>
         <p:nvSpPr>
           <p:cNvPr id="34" name="Google Shape;34;p8"/>
-          <p:cNvSpPr/>
+          <p:cNvSpPr>
+            <a:spLocks noGrp="1"/>
+          </p:cNvSpPr>
           <p:nvPr>
             <p:ph type="pic" idx="2"/>
           </p:nvPr>
@@ -8816,13 +8967,17 @@
               </a:defRPr>
             </a:lvl9pPr>
           </a:lstStyle>
-          <a:p/>
+          <a:p>
+            <a:endParaRPr/>
+          </a:p>
         </p:txBody>
       </p:sp>
       <p:sp>
         <p:nvSpPr>
           <p:cNvPr id="35" name="Google Shape;35;p8"/>
-          <p:cNvSpPr txBox="1"/>
+          <p:cNvSpPr txBox="1">
+            <a:spLocks noGrp="1"/>
+          </p:cNvSpPr>
           <p:nvPr>
             <p:ph type="body" idx="1"/>
           </p:nvPr>
@@ -9053,7 +9208,9 @@
               </a:defRPr>
             </a:lvl9pPr>
           </a:lstStyle>
-          <a:p/>
+          <a:p>
+            <a:endParaRPr/>
+          </a:p>
         </p:txBody>
       </p:sp>
     </p:spTree>
@@ -9065,11 +9222,11 @@
 </file>
 
 <file path=ppt/slideLayouts/slideLayout8.xml><?xml version="1.0" encoding="utf-8"?>
-<p:sldLayout xmlns:a="http://schemas.openxmlformats.org/drawingml/2006/main" xmlns:r="http://schemas.openxmlformats.org/officeDocument/2006/relationships" xmlns:p="http://schemas.openxmlformats.org/presentationml/2006/main" type="objTx" matchingName="Content with Caption">
+<p:sldLayout xmlns:a="http://schemas.openxmlformats.org/drawingml/2006/main" xmlns:r="http://schemas.openxmlformats.org/officeDocument/2006/relationships" xmlns:p="http://schemas.openxmlformats.org/presentationml/2006/main" matchingName="Content with Caption" type="objTx">
   <p:cSld name="OBJECT_WITH_CAPTION_TEXT">
     <p:spTree>
       <p:nvGrpSpPr>
-        <p:cNvPr id="36" name="Shape 36"/>
+        <p:cNvPr id="1" name="Shape 36"/>
         <p:cNvGrpSpPr/>
         <p:nvPr/>
       </p:nvGrpSpPr>
@@ -9084,7 +9241,9 @@
       <p:sp>
         <p:nvSpPr>
           <p:cNvPr id="37" name="Google Shape;37;p9"/>
-          <p:cNvSpPr txBox="1"/>
+          <p:cNvSpPr txBox="1">
+            <a:spLocks noGrp="1"/>
+          </p:cNvSpPr>
           <p:nvPr>
             <p:ph type="title"/>
           </p:nvPr>
@@ -9279,13 +9438,17 @@
               </a:defRPr>
             </a:lvl9pPr>
           </a:lstStyle>
-          <a:p/>
+          <a:p>
+            <a:endParaRPr/>
+          </a:p>
         </p:txBody>
       </p:sp>
       <p:sp>
         <p:nvSpPr>
           <p:cNvPr id="38" name="Google Shape;38;p9"/>
-          <p:cNvSpPr txBox="1"/>
+          <p:cNvSpPr txBox="1">
+            <a:spLocks noGrp="1"/>
+          </p:cNvSpPr>
           <p:nvPr>
             <p:ph type="body" idx="1"/>
           </p:nvPr>
@@ -9516,13 +9679,17 @@
               </a:defRPr>
             </a:lvl9pPr>
           </a:lstStyle>
-          <a:p/>
+          <a:p>
+            <a:endParaRPr/>
+          </a:p>
         </p:txBody>
       </p:sp>
       <p:sp>
         <p:nvSpPr>
           <p:cNvPr id="39" name="Google Shape;39;p9"/>
-          <p:cNvSpPr txBox="1"/>
+          <p:cNvSpPr txBox="1">
+            <a:spLocks noGrp="1"/>
+          </p:cNvSpPr>
           <p:nvPr>
             <p:ph type="body" idx="2"/>
           </p:nvPr>
@@ -9753,7 +9920,9 @@
               </a:defRPr>
             </a:lvl9pPr>
           </a:lstStyle>
-          <a:p/>
+          <a:p>
+            <a:endParaRPr/>
+          </a:p>
         </p:txBody>
       </p:sp>
     </p:spTree>
@@ -9765,11 +9934,11 @@
 </file>
 
 <file path=ppt/slideLayouts/slideLayout9.xml><?xml version="1.0" encoding="utf-8"?>
-<p:sldLayout xmlns:a="http://schemas.openxmlformats.org/drawingml/2006/main" xmlns:r="http://schemas.openxmlformats.org/officeDocument/2006/relationships" xmlns:p="http://schemas.openxmlformats.org/presentationml/2006/main" type="blank" matchingName="Blank">
+<p:sldLayout xmlns:a="http://schemas.openxmlformats.org/drawingml/2006/main" xmlns:r="http://schemas.openxmlformats.org/officeDocument/2006/relationships" xmlns:p="http://schemas.openxmlformats.org/presentationml/2006/main" matchingName="Blank" type="blank">
   <p:cSld name="BLANK">
     <p:spTree>
       <p:nvGrpSpPr>
-        <p:cNvPr id="40" name="Shape 40"/>
+        <p:cNvPr id="1" name="Shape 40"/>
         <p:cNvGrpSpPr/>
         <p:nvPr/>
       </p:nvGrpSpPr>
@@ -9802,7 +9971,7 @@
     </p:bg>
     <p:spTree>
       <p:nvGrpSpPr>
-        <p:cNvPr id="9" name="Shape 9"/>
+        <p:cNvPr id="1" name="Shape 9"/>
         <p:cNvGrpSpPr/>
         <p:nvPr/>
       </p:nvGrpSpPr>
@@ -9872,7 +10041,7 @@
           <p:nvPr/>
         </p:nvPicPr>
         <p:blipFill rotWithShape="1">
-          <a:blip r:embed="rId16"/>
+          <a:blip r:embed="rId17"/>
           <a:srcRect/>
           <a:stretch>
             <a:fillRect/>
@@ -10610,7 +10779,7 @@
   <p:cSld>
     <p:spTree>
       <p:nvGrpSpPr>
-        <p:cNvPr id="66" name="Shape 66"/>
+        <p:cNvPr id="1" name="Shape 66"/>
         <p:cNvGrpSpPr/>
         <p:nvPr/>
       </p:nvGrpSpPr>
@@ -10642,6 +10811,7 @@
           <a:bodyPr>
             <a:normAutofit fontScale="90000"/>
           </a:bodyPr>
+          <a:lstStyle/>
           <a:p>
             <a:r>
               <a:rPr lang="en-US" altLang="zh-CN" b="1" dirty="0">
@@ -10697,13 +10867,13 @@
         </p:spPr>
         <p:txBody>
           <a:bodyPr/>
+          <a:lstStyle/>
           <a:p>
             <a:pPr algn="ctr"/>
             <a:r>
               <a:rPr lang="en-US" altLang="zh-CN" sz="1800" dirty="0"/>
               <a:t>A web service for exchanging second-hand books</a:t>
             </a:r>
-            <a:endParaRPr lang="en-US" altLang="zh-CN" sz="1800" dirty="0"/>
           </a:p>
         </p:txBody>
       </p:sp>
@@ -10727,6 +10897,7 @@
           <a:bodyPr wrap="square">
             <a:spAutoFit/>
           </a:bodyPr>
+          <a:lstStyle/>
           <a:p>
             <a:r>
               <a:rPr lang="en-US" altLang="zh-CN" sz="1800" dirty="0"/>
@@ -10753,7 +10924,14 @@
         <p:cNvGrpSpPr/>
         <p:nvPr/>
       </p:nvGrpSpPr>
-      <p:grpSpPr/>
+      <p:grpSpPr>
+        <a:xfrm>
+          <a:off x="0" y="0"/>
+          <a:ext cx="0" cy="0"/>
+          <a:chOff x="0" y="0"/>
+          <a:chExt cx="0" cy="0"/>
+        </a:xfrm>
+      </p:grpSpPr>
       <p:sp>
         <p:nvSpPr>
           <p:cNvPr id="4" name="Title 1"/>
@@ -10774,6 +10952,7 @@
           <a:bodyPr>
             <a:noAutofit/>
           </a:bodyPr>
+          <a:lstStyle/>
           <a:p>
             <a:r>
               <a:rPr lang="en-US" altLang="zh-CN" sz="4000" dirty="0"/>
@@ -10800,7 +10979,14 @@
         <p:cNvGrpSpPr/>
         <p:nvPr/>
       </p:nvGrpSpPr>
-      <p:grpSpPr/>
+      <p:grpSpPr>
+        <a:xfrm>
+          <a:off x="0" y="0"/>
+          <a:ext cx="0" cy="0"/>
+          <a:chOff x="0" y="0"/>
+          <a:chExt cx="0" cy="0"/>
+        </a:xfrm>
+      </p:grpSpPr>
       <p:sp>
         <p:nvSpPr>
           <p:cNvPr id="4" name="Title 1"/>
@@ -10821,10 +11007,11 @@
           <a:bodyPr>
             <a:normAutofit/>
           </a:bodyPr>
+          <a:lstStyle/>
           <a:p>
             <a:r>
               <a:rPr lang="en-US" altLang="zh-CN" sz="4000" dirty="0"/>
-              <a:t>Front-End</a:t>
+              <a:t>Login</a:t>
             </a:r>
             <a:endParaRPr lang="zh-CN" altLang="en-US" sz="4000" dirty="0"/>
           </a:p>
@@ -10850,12 +11037,12 @@
           <a:bodyPr wrap="square" rtlCol="0">
             <a:spAutoFit/>
           </a:bodyPr>
+          <a:lstStyle/>
           <a:p>
             <a:r>
               <a:rPr lang="en-US" altLang="zh-CN" dirty="0"/>
               <a:t>Login/Registration Panel</a:t>
             </a:r>
-            <a:endParaRPr lang="en-US" altLang="zh-CN" dirty="0"/>
           </a:p>
           <a:p>
             <a:r>
@@ -10866,6 +11053,107 @@
           </a:p>
         </p:txBody>
       </p:sp>
+      <p:pic>
+        <p:nvPicPr>
+          <p:cNvPr id="7" name="图片 6">
+            <a:extLst>
+              <a:ext uri="{FF2B5EF4-FFF2-40B4-BE49-F238E27FC236}">
+                <a16:creationId xmlns:a16="http://schemas.microsoft.com/office/drawing/2014/main" id="{87441717-A242-4DAD-6205-405864642023}"/>
+              </a:ext>
+            </a:extLst>
+          </p:cNvPr>
+          <p:cNvPicPr>
+            <a:picLocks noChangeAspect="1"/>
+          </p:cNvPicPr>
+          <p:nvPr/>
+        </p:nvPicPr>
+        <p:blipFill>
+          <a:blip r:embed="rId2"/>
+          <a:stretch>
+            <a:fillRect/>
+          </a:stretch>
+        </p:blipFill>
+        <p:spPr>
+          <a:xfrm>
+            <a:off x="3575152" y="1555164"/>
+            <a:ext cx="5472545" cy="5127314"/>
+          </a:xfrm>
+          <a:prstGeom prst="rect">
+            <a:avLst/>
+          </a:prstGeom>
+        </p:spPr>
+      </p:pic>
+      <p:pic>
+        <p:nvPicPr>
+          <p:cNvPr id="8" name="图片 7">
+            <a:extLst>
+              <a:ext uri="{FF2B5EF4-FFF2-40B4-BE49-F238E27FC236}">
+                <a16:creationId xmlns:a16="http://schemas.microsoft.com/office/drawing/2014/main" id="{C33F2BB6-6644-087B-3B61-FA80CFA990AE}"/>
+              </a:ext>
+            </a:extLst>
+          </p:cNvPr>
+          <p:cNvPicPr>
+            <a:picLocks noChangeAspect="1"/>
+          </p:cNvPicPr>
+          <p:nvPr/>
+        </p:nvPicPr>
+        <p:blipFill>
+          <a:blip r:embed="rId3"/>
+          <a:stretch>
+            <a:fillRect/>
+          </a:stretch>
+        </p:blipFill>
+        <p:spPr>
+          <a:xfrm>
+            <a:off x="423721" y="1555164"/>
+            <a:ext cx="2529253" cy="4513688"/>
+          </a:xfrm>
+          <a:prstGeom prst="rect">
+            <a:avLst/>
+          </a:prstGeom>
+        </p:spPr>
+      </p:pic>
+      <p:cxnSp>
+        <p:nvCxnSpPr>
+          <p:cNvPr id="10" name="直接箭头连接符 9">
+            <a:extLst>
+              <a:ext uri="{FF2B5EF4-FFF2-40B4-BE49-F238E27FC236}">
+                <a16:creationId xmlns:a16="http://schemas.microsoft.com/office/drawing/2014/main" id="{5EB98E03-4E72-7712-B102-92CCD172E649}"/>
+              </a:ext>
+            </a:extLst>
+          </p:cNvPr>
+          <p:cNvCxnSpPr>
+            <a:cxnSpLocks/>
+          </p:cNvCxnSpPr>
+          <p:nvPr/>
+        </p:nvCxnSpPr>
+        <p:spPr>
+          <a:xfrm>
+            <a:off x="3017520" y="3539266"/>
+            <a:ext cx="489473" cy="0"/>
+          </a:xfrm>
+          <a:prstGeom prst="straightConnector1">
+            <a:avLst/>
+          </a:prstGeom>
+          <a:ln>
+            <a:tailEnd type="triangle"/>
+          </a:ln>
+        </p:spPr>
+        <p:style>
+          <a:lnRef idx="1">
+            <a:schemeClr val="accent2"/>
+          </a:lnRef>
+          <a:fillRef idx="0">
+            <a:schemeClr val="accent2"/>
+          </a:fillRef>
+          <a:effectRef idx="0">
+            <a:schemeClr val="accent2"/>
+          </a:effectRef>
+          <a:fontRef idx="minor">
+            <a:schemeClr val="tx1"/>
+          </a:fontRef>
+        </p:style>
+      </p:cxnSp>
     </p:spTree>
   </p:cSld>
   <p:clrMapOvr>
@@ -10883,7 +11171,14 @@
         <p:cNvGrpSpPr/>
         <p:nvPr/>
       </p:nvGrpSpPr>
-      <p:grpSpPr/>
+      <p:grpSpPr>
+        <a:xfrm>
+          <a:off x="0" y="0"/>
+          <a:ext cx="0" cy="0"/>
+          <a:chOff x="0" y="0"/>
+          <a:chExt cx="0" cy="0"/>
+        </a:xfrm>
+      </p:grpSpPr>
       <p:sp>
         <p:nvSpPr>
           <p:cNvPr id="4" name="Title 1"/>
@@ -10904,10 +11199,11 @@
           <a:bodyPr>
             <a:normAutofit/>
           </a:bodyPr>
+          <a:lstStyle/>
           <a:p>
             <a:r>
               <a:rPr lang="en-US" altLang="zh-CN" sz="4000" dirty="0"/>
-              <a:t>Donate &amp; Request a second-hand book</a:t>
+              <a:t>Donate a second-hand book</a:t>
             </a:r>
             <a:endParaRPr lang="zh-CN" altLang="en-US" sz="4000" dirty="0"/>
           </a:p>
@@ -10954,6 +11250,7 @@
         </p:style>
         <p:txBody>
           <a:bodyPr rtlCol="0" anchor="ctr"/>
+          <a:lstStyle/>
           <a:p>
             <a:pPr algn="ctr"/>
             <a:endParaRPr lang="zh-CN" altLang="en-US"/>
@@ -10980,6 +11277,7 @@
           <a:bodyPr wrap="square" rtlCol="0">
             <a:spAutoFit/>
           </a:bodyPr>
+          <a:lstStyle/>
           <a:p>
             <a:pPr marL="285750" indent="-285750">
               <a:buFont typeface="Arial" panose="020B0604020202090204" pitchFamily="34" charset="0"/>
@@ -10993,11 +11291,6 @@
               </a:rPr>
               <a:t>Using API Gateway to pass the photos directly to a S3 bucket</a:t>
             </a:r>
-            <a:endParaRPr lang="en-US" altLang="zh-CN" sz="1200" dirty="0">
-              <a:solidFill>
-                <a:schemeClr val="bg1"/>
-              </a:solidFill>
-            </a:endParaRPr>
           </a:p>
           <a:p>
             <a:pPr marL="285750" indent="-285750">
@@ -11012,11 +11305,6 @@
               </a:rPr>
               <a:t>Using a Lambda Function to add the donation information to DynamoDB and OpenSearch.</a:t>
             </a:r>
-            <a:endParaRPr lang="en-US" altLang="zh-CN" sz="1200" dirty="0">
-              <a:solidFill>
-                <a:schemeClr val="bg1"/>
-              </a:solidFill>
-            </a:endParaRPr>
           </a:p>
           <a:p>
             <a:pPr marL="285750" indent="-285750">
@@ -11064,7 +11352,7 @@
           <p:nvPr/>
         </p:nvPicPr>
         <p:blipFill>
-          <a:blip r:embed="rId1">
+          <a:blip r:embed="rId2">
             <a:extLst>
               <a:ext uri="{28A0092B-C50C-407E-A947-70E740481C1C}">
                 <a14:useLocalDpi xmlns:a14="http://schemas.microsoft.com/office/drawing/2010/main" val="0"/>
@@ -11105,6 +11393,7 @@
           <a:bodyPr wrap="square" rtlCol="0">
             <a:spAutoFit/>
           </a:bodyPr>
+          <a:lstStyle/>
           <a:p>
             <a:r>
               <a:rPr lang="en-US" altLang="zh-CN" sz="2400" dirty="0">
@@ -11124,6 +11413,91 @@
           </a:p>
         </p:txBody>
       </p:sp>
+      <p:pic>
+        <p:nvPicPr>
+          <p:cNvPr id="30" name="图片 29">
+            <a:extLst>
+              <a:ext uri="{FF2B5EF4-FFF2-40B4-BE49-F238E27FC236}">
+                <a16:creationId xmlns:a16="http://schemas.microsoft.com/office/drawing/2014/main" id="{4FABEA6C-C938-3961-9113-791788608C0B}"/>
+              </a:ext>
+            </a:extLst>
+          </p:cNvPr>
+          <p:cNvPicPr>
+            <a:picLocks noChangeAspect="1"/>
+          </p:cNvPicPr>
+          <p:nvPr/>
+        </p:nvPicPr>
+        <p:blipFill>
+          <a:blip r:embed="rId3"/>
+          <a:stretch>
+            <a:fillRect/>
+          </a:stretch>
+        </p:blipFill>
+        <p:spPr>
+          <a:xfrm>
+            <a:off x="4444001" y="1495953"/>
+            <a:ext cx="4571436" cy="4955326"/>
+          </a:xfrm>
+          <a:prstGeom prst="rect">
+            <a:avLst/>
+          </a:prstGeom>
+        </p:spPr>
+      </p:pic>
+    </p:spTree>
+  </p:cSld>
+  <p:clrMapOvr>
+    <a:masterClrMapping/>
+  </p:clrMapOvr>
+</p:sld>
+</file>
+
+<file path=ppt/slides/slide5.xml><?xml version="1.0" encoding="utf-8"?>
+<p:sld xmlns:a="http://schemas.openxmlformats.org/drawingml/2006/main" xmlns:r="http://schemas.openxmlformats.org/officeDocument/2006/relationships" xmlns:p="http://schemas.openxmlformats.org/presentationml/2006/main">
+  <p:cSld>
+    <p:spTree>
+      <p:nvGrpSpPr>
+        <p:cNvPr id="1" name=""/>
+        <p:cNvGrpSpPr/>
+        <p:nvPr/>
+      </p:nvGrpSpPr>
+      <p:grpSpPr>
+        <a:xfrm>
+          <a:off x="0" y="0"/>
+          <a:ext cx="0" cy="0"/>
+          <a:chOff x="0" y="0"/>
+          <a:chExt cx="0" cy="0"/>
+        </a:xfrm>
+      </p:grpSpPr>
+      <p:sp>
+        <p:nvSpPr>
+          <p:cNvPr id="4" name="Title 1"/>
+          <p:cNvSpPr>
+            <a:spLocks noGrp="1"/>
+          </p:cNvSpPr>
+          <p:nvPr>
+            <p:ph type="ctrTitle"/>
+          </p:nvPr>
+        </p:nvSpPr>
+        <p:spPr>
+          <a:xfrm>
+            <a:off x="-36161" y="0"/>
+            <a:ext cx="9144000" cy="947357"/>
+          </a:xfrm>
+        </p:spPr>
+        <p:txBody>
+          <a:bodyPr>
+            <a:normAutofit/>
+          </a:bodyPr>
+          <a:lstStyle/>
+          <a:p>
+            <a:r>
+              <a:rPr lang="en-US" altLang="zh-CN" sz="4000" dirty="0"/>
+              <a:t>Request a second-hand book</a:t>
+            </a:r>
+            <a:endParaRPr lang="zh-CN" altLang="en-US" sz="4000" dirty="0"/>
+          </a:p>
+        </p:txBody>
+      </p:sp>
       <p:sp>
         <p:nvSpPr>
           <p:cNvPr id="2" name="Rectangle: Rounded Corners 7"/>
@@ -11132,7 +11506,7 @@
         </p:nvSpPr>
         <p:spPr>
           <a:xfrm>
-            <a:off x="4428490" y="1212215"/>
+            <a:off x="4525310" y="1212215"/>
             <a:ext cx="4255770" cy="5386070"/>
           </a:xfrm>
           <a:prstGeom prst="roundRect">
@@ -11165,6 +11539,7 @@
         </p:style>
         <p:txBody>
           <a:bodyPr rtlCol="0" anchor="ctr"/>
+          <a:lstStyle/>
           <a:p>
             <a:pPr algn="ctr"/>
             <a:endParaRPr lang="zh-CN" altLang="en-US"/>
@@ -11179,7 +11554,7 @@
         </p:nvSpPr>
         <p:spPr>
           <a:xfrm>
-            <a:off x="5142865" y="1257935"/>
+            <a:off x="5239685" y="1257935"/>
             <a:ext cx="2826385" cy="460375"/>
           </a:xfrm>
           <a:prstGeom prst="rect">
@@ -11191,6 +11566,7 @@
           <a:bodyPr wrap="square" rtlCol="0">
             <a:spAutoFit/>
           </a:bodyPr>
+          <a:lstStyle/>
           <a:p>
             <a:r>
               <a:rPr lang="en-US" altLang="zh-CN" sz="2400" dirty="0">
@@ -11214,12 +11590,12 @@
         <p:nvPicPr>
           <p:cNvPr id="5" name="内容占位符 4"/>
           <p:cNvPicPr>
-            <a:picLocks noChangeAspect="1"/>
+            <a:picLocks noGrp="1" noChangeAspect="1"/>
           </p:cNvPicPr>
           <p:nvPr>
             <p:ph idx="1"/>
             <p:custDataLst>
-              <p:tags r:id="rId2"/>
+              <p:tags r:id="rId1"/>
             </p:custDataLst>
           </p:nvPr>
         </p:nvPicPr>
@@ -11232,7 +11608,7 @@
         </p:blipFill>
         <p:spPr>
           <a:xfrm>
-            <a:off x="5004435" y="1916430"/>
+            <a:off x="5101255" y="1916430"/>
             <a:ext cx="2998470" cy="2489200"/>
           </a:xfrm>
           <a:prstGeom prst="rect">
@@ -11248,7 +11624,7 @@
         </p:nvSpPr>
         <p:spPr>
           <a:xfrm>
-            <a:off x="4582160" y="4509135"/>
+            <a:off x="4678980" y="4509135"/>
             <a:ext cx="3948430" cy="1753235"/>
           </a:xfrm>
           <a:prstGeom prst="rect">
@@ -11260,6 +11636,7 @@
           <a:bodyPr wrap="square" rtlCol="0">
             <a:spAutoFit/>
           </a:bodyPr>
+          <a:lstStyle/>
           <a:p>
             <a:pPr marL="285750" indent="-285750">
               <a:buFont typeface="Arial" panose="020B0604020202090204" pitchFamily="34" charset="0"/>
@@ -11269,7 +11646,6 @@
               <a:rPr lang="en-US" altLang="zh-CN" sz="1200"/>
               <a:t>Determine whether the user has enough credits to make request</a:t>
             </a:r>
-            <a:endParaRPr lang="en-US" altLang="zh-CN" sz="1200"/>
           </a:p>
           <a:p>
             <a:pPr marL="285750" indent="-285750">
@@ -11287,7 +11663,6 @@
               <a:rPr lang="en-US" altLang="zh-CN" sz="1200"/>
               <a:t>Once successful requested, update user history (add book_id)</a:t>
             </a:r>
-            <a:endParaRPr lang="en-US" altLang="zh-CN" sz="1200"/>
           </a:p>
           <a:p>
             <a:pPr marL="285750" indent="-285750">
@@ -11305,7 +11680,6 @@
               <a:rPr lang="en-US" altLang="zh-CN" sz="1200"/>
               <a:t>Update book information to set status=’unavailable’, so it will no longer be searched</a:t>
             </a:r>
-            <a:endParaRPr lang="en-US" altLang="zh-CN" sz="1200"/>
           </a:p>
           <a:p>
             <a:pPr marL="285750" indent="-285750">
@@ -11316,7 +11690,119 @@
           </a:p>
         </p:txBody>
       </p:sp>
+      <p:pic>
+        <p:nvPicPr>
+          <p:cNvPr id="13" name="图片 12">
+            <a:extLst>
+              <a:ext uri="{FF2B5EF4-FFF2-40B4-BE49-F238E27FC236}">
+                <a16:creationId xmlns:a16="http://schemas.microsoft.com/office/drawing/2014/main" id="{53390A31-C398-C0CA-D3E7-DBDEB0529CE3}"/>
+              </a:ext>
+            </a:extLst>
+          </p:cNvPr>
+          <p:cNvPicPr>
+            <a:picLocks noChangeAspect="1"/>
+          </p:cNvPicPr>
+          <p:nvPr/>
+        </p:nvPicPr>
+        <p:blipFill>
+          <a:blip r:embed="rId4"/>
+          <a:stretch>
+            <a:fillRect/>
+          </a:stretch>
+        </p:blipFill>
+        <p:spPr>
+          <a:xfrm>
+            <a:off x="0" y="2366681"/>
+            <a:ext cx="4499603" cy="2237591"/>
+          </a:xfrm>
+          <a:prstGeom prst="rect">
+            <a:avLst/>
+          </a:prstGeom>
+        </p:spPr>
+      </p:pic>
+      <p:cxnSp>
+        <p:nvCxnSpPr>
+          <p:cNvPr id="15" name="直接箭头连接符 14">
+            <a:extLst>
+              <a:ext uri="{FF2B5EF4-FFF2-40B4-BE49-F238E27FC236}">
+                <a16:creationId xmlns:a16="http://schemas.microsoft.com/office/drawing/2014/main" id="{2628BB6B-EA1C-C96D-0DB9-BC823B4835CC}"/>
+              </a:ext>
+            </a:extLst>
+          </p:cNvPr>
+          <p:cNvCxnSpPr>
+            <a:cxnSpLocks/>
+          </p:cNvCxnSpPr>
+          <p:nvPr/>
+        </p:nvCxnSpPr>
+        <p:spPr>
+          <a:xfrm flipV="1">
+            <a:off x="3711388" y="4509135"/>
+            <a:ext cx="236668" cy="478716"/>
+          </a:xfrm>
+          <a:prstGeom prst="straightConnector1">
+            <a:avLst/>
+          </a:prstGeom>
+          <a:ln>
+            <a:tailEnd type="triangle"/>
+          </a:ln>
+        </p:spPr>
+        <p:style>
+          <a:lnRef idx="2">
+            <a:schemeClr val="accent2"/>
+          </a:lnRef>
+          <a:fillRef idx="0">
+            <a:schemeClr val="accent2"/>
+          </a:fillRef>
+          <a:effectRef idx="1">
+            <a:schemeClr val="accent2"/>
+          </a:effectRef>
+          <a:fontRef idx="minor">
+            <a:schemeClr val="tx1"/>
+          </a:fontRef>
+        </p:style>
+      </p:cxnSp>
+      <p:sp>
+        <p:nvSpPr>
+          <p:cNvPr id="18" name="文本框 17">
+            <a:extLst>
+              <a:ext uri="{FF2B5EF4-FFF2-40B4-BE49-F238E27FC236}">
+                <a16:creationId xmlns:a16="http://schemas.microsoft.com/office/drawing/2014/main" id="{13FBED31-0808-E034-32CC-3E3CDACF9ABD}"/>
+              </a:ext>
+            </a:extLst>
+          </p:cNvPr>
+          <p:cNvSpPr txBox="1"/>
+          <p:nvPr/>
+        </p:nvSpPr>
+        <p:spPr>
+          <a:xfrm>
+            <a:off x="2350546" y="5124142"/>
+            <a:ext cx="1710466" cy="523220"/>
+          </a:xfrm>
+          <a:prstGeom prst="rect">
+            <a:avLst/>
+          </a:prstGeom>
+          <a:noFill/>
+        </p:spPr>
+        <p:txBody>
+          <a:bodyPr wrap="square" rtlCol="0">
+            <a:spAutoFit/>
+          </a:bodyPr>
+          <a:lstStyle/>
+          <a:p>
+            <a:r>
+              <a:rPr lang="en-US" altLang="zh-CN" dirty="0"/>
+              <a:t>Click to request the book you want!</a:t>
+            </a:r>
+            <a:endParaRPr lang="zh-CN" altLang="en-US" dirty="0"/>
+          </a:p>
+        </p:txBody>
+      </p:sp>
     </p:spTree>
+    <p:extLst>
+      <p:ext uri="{BB962C8B-B14F-4D97-AF65-F5344CB8AC3E}">
+        <p14:creationId xmlns:p14="http://schemas.microsoft.com/office/powerpoint/2010/main" val="2976690921"/>
+      </p:ext>
+    </p:extLst>
   </p:cSld>
   <p:clrMapOvr>
     <a:masterClrMapping/>
@@ -11324,7 +11810,7 @@
 </p:sld>
 </file>
 
-<file path=ppt/slides/slide5.xml><?xml version="1.0" encoding="utf-8"?>
+<file path=ppt/slides/slide6.xml><?xml version="1.0" encoding="utf-8"?>
 <p:sld xmlns:a="http://schemas.openxmlformats.org/drawingml/2006/main" xmlns:r="http://schemas.openxmlformats.org/officeDocument/2006/relationships" xmlns:p="http://schemas.openxmlformats.org/presentationml/2006/main">
   <p:cSld>
     <p:spTree>
@@ -11333,7 +11819,14 @@
         <p:cNvGrpSpPr/>
         <p:nvPr/>
       </p:nvGrpSpPr>
-      <p:grpSpPr/>
+      <p:grpSpPr>
+        <a:xfrm>
+          <a:off x="0" y="0"/>
+          <a:ext cx="0" cy="0"/>
+          <a:chOff x="0" y="0"/>
+          <a:chExt cx="0" cy="0"/>
+        </a:xfrm>
+      </p:grpSpPr>
       <p:sp>
         <p:nvSpPr>
           <p:cNvPr id="4" name="Title 1"/>
@@ -11354,6 +11847,7 @@
           <a:bodyPr>
             <a:normAutofit/>
           </a:bodyPr>
+          <a:lstStyle/>
           <a:p>
             <a:r>
               <a:rPr lang="en-US" altLang="zh-CN" sz="4000" dirty="0"/>
@@ -11404,6 +11898,7 @@
         </p:style>
         <p:txBody>
           <a:bodyPr rtlCol="0" anchor="ctr"/>
+          <a:lstStyle/>
           <a:p>
             <a:pPr algn="ctr"/>
             <a:endParaRPr lang="zh-CN" altLang="en-US"/>
@@ -11430,6 +11925,7 @@
           <a:bodyPr wrap="square" rtlCol="0">
             <a:spAutoFit/>
           </a:bodyPr>
+          <a:lstStyle/>
           <a:p>
             <a:r>
               <a:rPr lang="en-US" altLang="zh-CN" sz="2400" dirty="0">
@@ -11469,6 +11965,7 @@
           <a:bodyPr wrap="square" rtlCol="0" anchor="t">
             <a:spAutoFit/>
           </a:bodyPr>
+          <a:lstStyle/>
           <a:p>
             <a:pPr marL="285750" indent="-285750">
               <a:buFont typeface="Arial" panose="020B0604020202090204" pitchFamily="34" charset="0"/>
@@ -11483,12 +11980,6 @@
               </a:rPr>
               <a:t>Using API Gateway to pass the query infomation from frontend input to lambda function</a:t>
             </a:r>
-            <a:endParaRPr lang="en-US" altLang="zh-CN" sz="1200" dirty="0">
-              <a:solidFill>
-                <a:schemeClr val="bg1"/>
-              </a:solidFill>
-              <a:sym typeface="+mn-ea"/>
-            </a:endParaRPr>
           </a:p>
           <a:p>
             <a:pPr marL="285750" indent="-285750">
@@ -11516,12 +12007,6 @@
               </a:rPr>
               <a:t>Using a lambda function to query corrsponding available donation books ftom DynamoDB through OpenSearch.</a:t>
             </a:r>
-            <a:endParaRPr lang="en-US" altLang="zh-CN" sz="1200" dirty="0">
-              <a:solidFill>
-                <a:schemeClr val="bg1"/>
-              </a:solidFill>
-              <a:sym typeface="+mn-ea"/>
-            </a:endParaRPr>
           </a:p>
           <a:p>
             <a:pPr marL="285750" indent="-285750">
@@ -11549,12 +12034,6 @@
               </a:rPr>
               <a:t>The lambda function also automatically get the book cover by using Open Library API and upload pic from S3</a:t>
             </a:r>
-            <a:endParaRPr lang="en-US" altLang="zh-CN" sz="1200" dirty="0">
-              <a:solidFill>
-                <a:schemeClr val="bg1"/>
-              </a:solidFill>
-              <a:sym typeface="+mn-ea"/>
-            </a:endParaRPr>
           </a:p>
           <a:p>
             <a:pPr marL="285750" indent="-285750">
@@ -11580,62 +12059,9 @@
               </a:rPr>
               <a:t>Frontend get the response from the image and display it under the search bar</a:t>
             </a:r>
-            <a:endParaRPr lang="en-US" sz="1200">
-              <a:solidFill>
-                <a:schemeClr val="bg1"/>
-              </a:solidFill>
-            </a:endParaRPr>
           </a:p>
         </p:txBody>
       </p:sp>
-      <p:pic>
-        <p:nvPicPr>
-          <p:cNvPr id="5" name="Picture 4"/>
-          <p:cNvPicPr>
-            <a:picLocks noChangeAspect="1"/>
-          </p:cNvPicPr>
-          <p:nvPr/>
-        </p:nvPicPr>
-        <p:blipFill>
-          <a:blip r:embed="rId1"/>
-          <a:stretch>
-            <a:fillRect/>
-          </a:stretch>
-        </p:blipFill>
-        <p:spPr>
-          <a:xfrm>
-            <a:off x="4569460" y="1340485"/>
-            <a:ext cx="4239260" cy="2229485"/>
-          </a:xfrm>
-          <a:prstGeom prst="rect">
-            <a:avLst/>
-          </a:prstGeom>
-        </p:spPr>
-      </p:pic>
-      <p:pic>
-        <p:nvPicPr>
-          <p:cNvPr id="6" name="Picture 5"/>
-          <p:cNvPicPr>
-            <a:picLocks noChangeAspect="1"/>
-          </p:cNvPicPr>
-          <p:nvPr/>
-        </p:nvPicPr>
-        <p:blipFill>
-          <a:blip r:embed="rId2"/>
-          <a:stretch>
-            <a:fillRect/>
-          </a:stretch>
-        </p:blipFill>
-        <p:spPr>
-          <a:xfrm>
-            <a:off x="4572000" y="3716655"/>
-            <a:ext cx="4236720" cy="2526665"/>
-          </a:xfrm>
-          <a:prstGeom prst="rect">
-            <a:avLst/>
-          </a:prstGeom>
-        </p:spPr>
-      </p:pic>
       <p:pic>
         <p:nvPicPr>
           <p:cNvPr id="11" name="Picture 10" descr="SearchService.drawio"/>
@@ -11645,7 +12071,7 @@
           <p:nvPr/>
         </p:nvPicPr>
         <p:blipFill>
-          <a:blip r:embed="rId3"/>
+          <a:blip r:embed="rId2"/>
           <a:stretch>
             <a:fillRect/>
           </a:stretch>
@@ -11660,6 +12086,65 @@
           </a:prstGeom>
         </p:spPr>
       </p:pic>
+      <p:pic>
+        <p:nvPicPr>
+          <p:cNvPr id="12" name="图片 11">
+            <a:extLst>
+              <a:ext uri="{FF2B5EF4-FFF2-40B4-BE49-F238E27FC236}">
+                <a16:creationId xmlns:a16="http://schemas.microsoft.com/office/drawing/2014/main" id="{AF1C9211-3772-481C-4C43-F55B59139FA6}"/>
+              </a:ext>
+            </a:extLst>
+          </p:cNvPr>
+          <p:cNvPicPr>
+            <a:picLocks noChangeAspect="1"/>
+          </p:cNvPicPr>
+          <p:nvPr/>
+        </p:nvPicPr>
+        <p:blipFill rotWithShape="1">
+          <a:blip r:embed="rId3"/>
+          <a:srcRect t="2754"/>
+          <a:stretch/>
+        </p:blipFill>
+        <p:spPr>
+          <a:xfrm>
+            <a:off x="4430395" y="1239520"/>
+            <a:ext cx="4555366" cy="2894619"/>
+          </a:xfrm>
+          <a:prstGeom prst="rect">
+            <a:avLst/>
+          </a:prstGeom>
+        </p:spPr>
+      </p:pic>
+      <p:pic>
+        <p:nvPicPr>
+          <p:cNvPr id="14" name="图片 13">
+            <a:extLst>
+              <a:ext uri="{FF2B5EF4-FFF2-40B4-BE49-F238E27FC236}">
+                <a16:creationId xmlns:a16="http://schemas.microsoft.com/office/drawing/2014/main" id="{1D710171-8C8D-2E1A-E063-B05598510E6C}"/>
+              </a:ext>
+            </a:extLst>
+          </p:cNvPr>
+          <p:cNvPicPr>
+            <a:picLocks noChangeAspect="1"/>
+          </p:cNvPicPr>
+          <p:nvPr/>
+        </p:nvPicPr>
+        <p:blipFill>
+          <a:blip r:embed="rId4"/>
+          <a:stretch>
+            <a:fillRect/>
+          </a:stretch>
+        </p:blipFill>
+        <p:spPr>
+          <a:xfrm>
+            <a:off x="4472940" y="4173966"/>
+            <a:ext cx="4531231" cy="2092429"/>
+          </a:xfrm>
+          <a:prstGeom prst="rect">
+            <a:avLst/>
+          </a:prstGeom>
+        </p:spPr>
+      </p:pic>
     </p:spTree>
   </p:cSld>
   <p:clrMapOvr>
@@ -11668,7 +12153,7 @@
 </p:sld>
 </file>
 
-<file path=ppt/slides/slide6.xml><?xml version="1.0" encoding="utf-8"?>
+<file path=ppt/slides/slide7.xml><?xml version="1.0" encoding="utf-8"?>
 <p:sld xmlns:a="http://schemas.openxmlformats.org/drawingml/2006/main" xmlns:r="http://schemas.openxmlformats.org/officeDocument/2006/relationships" xmlns:p="http://schemas.openxmlformats.org/presentationml/2006/main">
   <p:cSld>
     <p:spTree>
@@ -11677,7 +12162,14 @@
         <p:cNvGrpSpPr/>
         <p:nvPr/>
       </p:nvGrpSpPr>
-      <p:grpSpPr/>
+      <p:grpSpPr>
+        <a:xfrm>
+          <a:off x="0" y="0"/>
+          <a:ext cx="0" cy="0"/>
+          <a:chOff x="0" y="0"/>
+          <a:chExt cx="0" cy="0"/>
+        </a:xfrm>
+      </p:grpSpPr>
       <p:sp>
         <p:nvSpPr>
           <p:cNvPr id="4" name="Title 1"/>
@@ -11696,8 +12188,9 @@
         </p:spPr>
         <p:txBody>
           <a:bodyPr>
-            <a:normAutofit fontScale="90000"/>
+            <a:normAutofit/>
           </a:bodyPr>
+          <a:lstStyle/>
           <a:p>
             <a:r>
               <a:rPr lang="en-US" altLang="zh-CN" sz="4000" dirty="0"/>
@@ -11709,9 +12202,263 @@
             </a:r>
             <a:r>
               <a:rPr lang="en-US" altLang="zh-CN" sz="4000" dirty="0"/>
-              <a:t>information &amp; add a book to a user’s favorite list</a:t>
+              <a:t>info &amp; add to favorite list</a:t>
             </a:r>
             <a:endParaRPr lang="zh-CN" altLang="en-US" sz="4000" dirty="0"/>
+          </a:p>
+        </p:txBody>
+      </p:sp>
+      <p:sp>
+        <p:nvSpPr>
+          <p:cNvPr id="7" name="Rectangle: Rounded Corners 3">
+            <a:extLst>
+              <a:ext uri="{FF2B5EF4-FFF2-40B4-BE49-F238E27FC236}">
+                <a16:creationId xmlns:a16="http://schemas.microsoft.com/office/drawing/2014/main" id="{E4A89171-A0DD-83F7-BF5E-17A305A5462C}"/>
+              </a:ext>
+            </a:extLst>
+          </p:cNvPr>
+          <p:cNvSpPr/>
+          <p:nvPr/>
+        </p:nvSpPr>
+        <p:spPr>
+          <a:xfrm>
+            <a:off x="176642" y="947060"/>
+            <a:ext cx="4105910" cy="5340350"/>
+          </a:xfrm>
+          <a:prstGeom prst="roundRect">
+            <a:avLst/>
+          </a:prstGeom>
+          <a:solidFill>
+            <a:schemeClr val="accent1">
+              <a:lumMod val="75000"/>
+            </a:schemeClr>
+          </a:solidFill>
+          <a:ln>
+            <a:noFill/>
+          </a:ln>
+        </p:spPr>
+        <p:style>
+          <a:lnRef idx="2">
+            <a:schemeClr val="accent1">
+              <a:shade val="50000"/>
+            </a:schemeClr>
+          </a:lnRef>
+          <a:fillRef idx="1">
+            <a:schemeClr val="accent1"/>
+          </a:fillRef>
+          <a:effectRef idx="0">
+            <a:schemeClr val="accent1"/>
+          </a:effectRef>
+          <a:fontRef idx="minor">
+            <a:schemeClr val="lt1"/>
+          </a:fontRef>
+        </p:style>
+        <p:txBody>
+          <a:bodyPr rtlCol="0" anchor="ctr"/>
+          <a:lstStyle/>
+          <a:p>
+            <a:pPr algn="ctr"/>
+            <a:endParaRPr lang="zh-CN" altLang="en-US" dirty="0"/>
+          </a:p>
+        </p:txBody>
+      </p:sp>
+      <p:pic>
+        <p:nvPicPr>
+          <p:cNvPr id="6" name="图片 5">
+            <a:extLst>
+              <a:ext uri="{FF2B5EF4-FFF2-40B4-BE49-F238E27FC236}">
+                <a16:creationId xmlns:a16="http://schemas.microsoft.com/office/drawing/2014/main" id="{737C12BB-DF57-D9E1-595D-C9BEE53DCCC1}"/>
+              </a:ext>
+            </a:extLst>
+          </p:cNvPr>
+          <p:cNvPicPr>
+            <a:picLocks noChangeAspect="1"/>
+          </p:cNvPicPr>
+          <p:nvPr/>
+        </p:nvPicPr>
+        <p:blipFill>
+          <a:blip r:embed="rId2"/>
+          <a:stretch>
+            <a:fillRect/>
+          </a:stretch>
+        </p:blipFill>
+        <p:spPr>
+          <a:xfrm>
+            <a:off x="325920" y="1390403"/>
+            <a:ext cx="3856156" cy="2353259"/>
+          </a:xfrm>
+          <a:prstGeom prst="rect">
+            <a:avLst/>
+          </a:prstGeom>
+        </p:spPr>
+      </p:pic>
+      <p:pic>
+        <p:nvPicPr>
+          <p:cNvPr id="8" name="图片 7">
+            <a:extLst>
+              <a:ext uri="{FF2B5EF4-FFF2-40B4-BE49-F238E27FC236}">
+                <a16:creationId xmlns:a16="http://schemas.microsoft.com/office/drawing/2014/main" id="{25929370-08A1-3E25-33DC-E4133F854CEB}"/>
+              </a:ext>
+            </a:extLst>
+          </p:cNvPr>
+          <p:cNvPicPr>
+            <a:picLocks noChangeAspect="1"/>
+          </p:cNvPicPr>
+          <p:nvPr/>
+        </p:nvPicPr>
+        <p:blipFill>
+          <a:blip r:embed="rId3"/>
+          <a:stretch>
+            <a:fillRect/>
+          </a:stretch>
+        </p:blipFill>
+        <p:spPr>
+          <a:xfrm>
+            <a:off x="4862456" y="1151276"/>
+            <a:ext cx="3845859" cy="2710619"/>
+          </a:xfrm>
+          <a:prstGeom prst="rect">
+            <a:avLst/>
+          </a:prstGeom>
+        </p:spPr>
+      </p:pic>
+      <p:pic>
+        <p:nvPicPr>
+          <p:cNvPr id="10" name="图片 9">
+            <a:extLst>
+              <a:ext uri="{FF2B5EF4-FFF2-40B4-BE49-F238E27FC236}">
+                <a16:creationId xmlns:a16="http://schemas.microsoft.com/office/drawing/2014/main" id="{F9F3F020-78AF-2CE4-A7FA-7C5E27974375}"/>
+              </a:ext>
+            </a:extLst>
+          </p:cNvPr>
+          <p:cNvPicPr>
+            <a:picLocks noChangeAspect="1"/>
+          </p:cNvPicPr>
+          <p:nvPr/>
+        </p:nvPicPr>
+        <p:blipFill>
+          <a:blip r:embed="rId4"/>
+          <a:stretch>
+            <a:fillRect/>
+          </a:stretch>
+        </p:blipFill>
+        <p:spPr>
+          <a:xfrm>
+            <a:off x="4459076" y="3903882"/>
+            <a:ext cx="4577616" cy="2276386"/>
+          </a:xfrm>
+          <a:prstGeom prst="rect">
+            <a:avLst/>
+          </a:prstGeom>
+        </p:spPr>
+      </p:pic>
+      <p:sp>
+        <p:nvSpPr>
+          <p:cNvPr id="12" name="文本框 11">
+            <a:extLst>
+              <a:ext uri="{FF2B5EF4-FFF2-40B4-BE49-F238E27FC236}">
+                <a16:creationId xmlns:a16="http://schemas.microsoft.com/office/drawing/2014/main" id="{DAEDF5BF-3A45-2658-A1B4-1AA19EA52A6D}"/>
+              </a:ext>
+            </a:extLst>
+          </p:cNvPr>
+          <p:cNvSpPr txBox="1"/>
+          <p:nvPr/>
+        </p:nvSpPr>
+        <p:spPr>
+          <a:xfrm>
+            <a:off x="-242016" y="3814403"/>
+            <a:ext cx="4572000" cy="2231380"/>
+          </a:xfrm>
+          <a:prstGeom prst="rect">
+            <a:avLst/>
+          </a:prstGeom>
+          <a:noFill/>
+        </p:spPr>
+        <p:txBody>
+          <a:bodyPr wrap="square">
+            <a:spAutoFit/>
+          </a:bodyPr>
+          <a:lstStyle/>
+          <a:p>
+            <a:pPr marL="742950" indent="-285750" rtl="0">
+              <a:spcBef>
+                <a:spcPts val="1200"/>
+              </a:spcBef>
+              <a:spcAft>
+                <a:spcPts val="1200"/>
+              </a:spcAft>
+              <a:buFont typeface="Arial" panose="020B0604020202020204" pitchFamily="34" charset="0"/>
+              <a:buChar char="•"/>
+            </a:pPr>
+            <a:r>
+              <a:rPr lang="en-US" altLang="zh-CN" sz="1100" b="0" i="0" u="none" strike="noStrike" dirty="0">
+                <a:solidFill>
+                  <a:srgbClr val="000000"/>
+                </a:solidFill>
+                <a:effectLst/>
+                <a:latin typeface="Times New Roman" panose="02020603050405020304" pitchFamily="18" charset="0"/>
+              </a:rPr>
+              <a:t>Every time the user selects a book they like, the system firstly will store this book’s id in Dynamo DB(user information) corresponding to the user. </a:t>
+            </a:r>
+            <a:endParaRPr lang="en-US" altLang="zh-CN" sz="1100" b="0" dirty="0">
+              <a:effectLst/>
+            </a:endParaRPr>
+          </a:p>
+          <a:p>
+            <a:pPr marL="742950" indent="-285750" rtl="0">
+              <a:spcBef>
+                <a:spcPts val="1200"/>
+              </a:spcBef>
+              <a:spcAft>
+                <a:spcPts val="1200"/>
+              </a:spcAft>
+              <a:buFont typeface="Arial" panose="020B0604020202020204" pitchFamily="34" charset="0"/>
+              <a:buChar char="•"/>
+            </a:pPr>
+            <a:r>
+              <a:rPr lang="en-US" altLang="zh-CN" sz="1100" b="0" i="0" u="none" strike="noStrike" dirty="0">
+                <a:solidFill>
+                  <a:srgbClr val="000000"/>
+                </a:solidFill>
+                <a:effectLst/>
+                <a:latin typeface="Times New Roman" panose="02020603050405020304" pitchFamily="18" charset="0"/>
+              </a:rPr>
+              <a:t>When the user jumps to the favorite list page and want more information about these books, the system will search it in the DynamoDB(book info) by </a:t>
+            </a:r>
+            <a:r>
+              <a:rPr lang="en-US" altLang="zh-CN" sz="1100" dirty="0">
+                <a:latin typeface="Times New Roman" panose="02020603050405020304" pitchFamily="18" charset="0"/>
+              </a:rPr>
+              <a:t>id</a:t>
+            </a:r>
+            <a:endParaRPr lang="en-US" altLang="zh-CN" sz="1100" b="0" dirty="0">
+              <a:effectLst/>
+            </a:endParaRPr>
+          </a:p>
+          <a:p>
+            <a:pPr marL="742950" indent="-285750" rtl="0">
+              <a:spcBef>
+                <a:spcPts val="1200"/>
+              </a:spcBef>
+              <a:spcAft>
+                <a:spcPts val="1200"/>
+              </a:spcAft>
+              <a:buFont typeface="Arial" panose="020B0604020202020204" pitchFamily="34" charset="0"/>
+              <a:buChar char="•"/>
+            </a:pPr>
+            <a:r>
+              <a:rPr lang="en-US" altLang="zh-CN" sz="1100" b="0" i="0" u="none" strike="noStrike" dirty="0">
+                <a:solidFill>
+                  <a:srgbClr val="000000"/>
+                </a:solidFill>
+                <a:effectLst/>
+                <a:latin typeface="Times New Roman" panose="02020603050405020304" pitchFamily="18" charset="0"/>
+              </a:rPr>
+              <a:t>When the user chooses to add a book to their favorite list, the count of favorite’ for that book will increase by 1 and the book is removed when the user double click</a:t>
+            </a:r>
+            <a:endParaRPr lang="en-US" altLang="zh-CN" sz="1100" b="0" dirty="0">
+              <a:effectLst/>
+            </a:endParaRPr>
           </a:p>
         </p:txBody>
       </p:sp>
@@ -11723,7 +12470,7 @@
 </p:sld>
 </file>
 
-<file path=ppt/slides/slide7.xml><?xml version="1.0" encoding="utf-8"?>
+<file path=ppt/slides/slide8.xml><?xml version="1.0" encoding="utf-8"?>
 <p:sld xmlns:a="http://schemas.openxmlformats.org/drawingml/2006/main" xmlns:r="http://schemas.openxmlformats.org/officeDocument/2006/relationships" xmlns:p="http://schemas.openxmlformats.org/presentationml/2006/main">
   <p:cSld>
     <p:spTree>
@@ -11732,7 +12479,14 @@
         <p:cNvGrpSpPr/>
         <p:nvPr/>
       </p:nvGrpSpPr>
-      <p:grpSpPr/>
+      <p:grpSpPr>
+        <a:xfrm>
+          <a:off x="0" y="0"/>
+          <a:ext cx="0" cy="0"/>
+          <a:chOff x="0" y="0"/>
+          <a:chExt cx="0" cy="0"/>
+        </a:xfrm>
+      </p:grpSpPr>
       <p:sp>
         <p:nvSpPr>
           <p:cNvPr id="4" name="Title 1"/>
@@ -11753,6 +12507,7 @@
           <a:bodyPr>
             <a:normAutofit/>
           </a:bodyPr>
+          <a:lstStyle/>
           <a:p>
             <a:r>
               <a:rPr lang="en-US" altLang="zh-CN" sz="4000" dirty="0"/>
@@ -11782,19 +12537,18 @@
           <a:bodyPr wrap="square" rtlCol="0">
             <a:spAutoFit/>
           </a:bodyPr>
+          <a:lstStyle/>
           <a:p>
             <a:r>
               <a:rPr lang="en-US" altLang="zh-CN" dirty="0"/>
               <a:t>Although we can link user’s account and their information directly in Cognito (which is convenient and good for keeping user’s information secure!), we decided to use DynamoDB to store the users’ non-sensitive information, rather than storing them in Cognito.</a:t>
             </a:r>
-            <a:endParaRPr lang="en-US" altLang="zh-CN" dirty="0"/>
           </a:p>
           <a:p>
             <a:r>
               <a:rPr lang="en-US" altLang="zh-CN" sz="1400" dirty="0"/>
               <a:t>-   The attributes stored in Cognito has to be key-value(string) pair, not good for complicated data structures.</a:t>
             </a:r>
-            <a:endParaRPr lang="en-US" altLang="zh-CN" sz="1400" dirty="0"/>
           </a:p>
           <a:p>
             <a:pPr marL="285750" indent="-285750">
@@ -11805,7 +12559,6 @@
               <a:rPr lang="en-US" altLang="zh-CN" sz="1400" dirty="0"/>
               <a:t>We need to store many users’ requested/donate books, this list could be large and Cognito is not scalable as the DynamoDB.</a:t>
             </a:r>
-            <a:endParaRPr lang="en-US" altLang="zh-CN" sz="1400" dirty="0"/>
           </a:p>
           <a:p>
             <a:pPr marL="285750" indent="-285750">
@@ -11816,7 +12569,6 @@
               <a:rPr lang="en-US" altLang="zh-CN" sz="1400" dirty="0"/>
               <a:t>The DynamoDB can handle query much more efficient than Cognito</a:t>
             </a:r>
-            <a:endParaRPr lang="en-US" altLang="zh-CN" sz="1400" dirty="0"/>
           </a:p>
           <a:p>
             <a:pPr marL="285750" indent="-285750">
@@ -11827,7 +12579,6 @@
               <a:rPr lang="en-US" altLang="zh-CN" sz="1400" dirty="0"/>
               <a:t>We realized this is the pattern often done in the industry after searching the online information</a:t>
             </a:r>
-            <a:endParaRPr lang="en-US" altLang="zh-CN" sz="1400" dirty="0"/>
           </a:p>
         </p:txBody>
       </p:sp>
@@ -11840,7 +12591,7 @@
 </file>
 
 <file path=ppt/tags/tag1.xml><?xml version="1.0" encoding="utf-8"?>
-<p:tagLst xmlns:p="http://schemas.openxmlformats.org/presentationml/2006/main">
+<p:tagLst xmlns:a="http://schemas.openxmlformats.org/drawingml/2006/main" xmlns:r="http://schemas.openxmlformats.org/officeDocument/2006/relationships" xmlns:p="http://schemas.openxmlformats.org/presentationml/2006/main">
   <p:tag name="KSO_WM_UNIT_PLACING_PICTURE_USER_VIEWPORT" val="{&quot;height&quot;:6853,&quot;width&quot;:7396}"/>
 </p:tagLst>
 </file>
@@ -12121,6 +12872,8 @@
       </a:bgFillStyleLst>
     </a:fmtScheme>
   </a:themeElements>
+  <a:objectDefaults/>
+  <a:extraClrSchemeLst/>
   <a:extLst>
     <a:ext uri="{05A4C25C-085E-4340-85A3-A5531E510DB2}">
       <thm15:themeFamily xmlns:thm15="http://schemas.microsoft.com/office/thememl/2012/main" name="Office Theme" id="{62F939B6-93AF-4DB8-9C6B-D6C7DFDC589F}" vid="{4A3C46E8-61CC-4603-A589-7422A47A8E4A}"/>
@@ -12405,6 +13158,8 @@
       </a:bgFillStyleLst>
     </a:fmtScheme>
   </a:themeElements>
+  <a:objectDefaults/>
+  <a:extraClrSchemeLst/>
   <a:extLst>
     <a:ext uri="{05A4C25C-085E-4340-85A3-A5531E510DB2}">
       <thm15:themeFamily xmlns:thm15="http://schemas.microsoft.com/office/thememl/2012/main" name="Office Theme" id="{62F939B6-93AF-4DB8-9C6B-D6C7DFDC589F}" vid="{4A3C46E8-61CC-4603-A589-7422A47A8E4A}"/>

</xml_diff>

<commit_message>
modify the style of presentation slides
</commit_message>
<xml_diff>
--- a/presentation-book-exchange.pptx
+++ b/presentation-book-exchange.pptx
@@ -9,28 +9,26 @@
   </p:notesMasterIdLst>
   <p:sldIdLst>
     <p:sldId id="256" r:id="rId3"/>
-    <p:sldId id="261" r:id="rId5"/>
-    <p:sldId id="262" r:id="rId6"/>
-    <p:sldId id="263" r:id="rId7"/>
-    <p:sldId id="268" r:id="rId8"/>
-    <p:sldId id="264" r:id="rId9"/>
-    <p:sldId id="265" r:id="rId10"/>
-    <p:sldId id="267" r:id="rId11"/>
+    <p:sldId id="272" r:id="rId5"/>
+    <p:sldId id="274" r:id="rId6"/>
+    <p:sldId id="261" r:id="rId7"/>
+    <p:sldId id="262" r:id="rId8"/>
+    <p:sldId id="263" r:id="rId9"/>
+    <p:sldId id="268" r:id="rId10"/>
+    <p:sldId id="264" r:id="rId11"/>
+    <p:sldId id="265" r:id="rId12"/>
+    <p:sldId id="267" r:id="rId13"/>
   </p:sldIdLst>
   <p:sldSz cx="9144000" cy="6858000" type="screen4x3"/>
   <p:notesSz cx="7010400" cy="9296400"/>
   <p:embeddedFontLst>
     <p:embeddedFont>
-      <p:font typeface="SimSun" panose="02010600030101010101" pitchFamily="2" charset="-122"/>
-      <p:regular r:id="rId15"/>
-    </p:embeddedFont>
-    <p:embeddedFont>
       <p:font typeface="Arial Black" panose="020B0A04020102020204" pitchFamily="34" charset="0"/>
-      <p:bold r:id="rId16"/>
+      <p:bold r:id="rId17"/>
     </p:embeddedFont>
   </p:embeddedFontLst>
   <p:custDataLst>
-    <p:tags r:id="rId17"/>
+    <p:tags r:id="rId18"/>
   </p:custDataLst>
   <p:defaultTextStyle>
     <a:defPPr marR="0" lvl="0" algn="l" rtl="0">
@@ -10740,18 +10738,6 @@
           <a:lstStyle/>
           <a:p>
             <a:r>
-              <a:rPr lang="en-US" altLang="zh-CN" b="1" dirty="0">
-                <a:effectLst>
-                  <a:outerShdw blurRad="38100" dist="38100" dir="2700000" algn="tl">
-                    <a:srgbClr val="000000">
-                      <a:alpha val="43137"/>
-                    </a:srgbClr>
-                  </a:outerShdw>
-                </a:effectLst>
-              </a:rPr>
-              <a:t>Book </a:t>
-            </a:r>
-            <a:r>
               <a:rPr lang="en-US" altLang="zh-CN" b="1" i="1" dirty="0">
                 <a:effectLst>
                   <a:outerShdw blurRad="38100" dist="38100" dir="2700000" algn="tl">
@@ -10761,7 +10747,7 @@
                   </a:outerShdw>
                 </a:effectLst>
               </a:rPr>
-              <a:t>Exchange</a:t>
+              <a:t>Book Exchange</a:t>
             </a:r>
             <a:endParaRPr lang="zh-CN" altLang="en-US" b="1" i="1" dirty="0">
               <a:effectLst>
@@ -10787,7 +10773,7 @@
         </p:nvSpPr>
         <p:spPr>
           <a:xfrm>
-            <a:off x="-301" y="834480"/>
+            <a:off x="-301" y="882105"/>
             <a:ext cx="9144000" cy="564779"/>
           </a:xfrm>
         </p:spPr>
@@ -10795,91 +10781,22 @@
           <a:bodyPr/>
           <a:lstStyle/>
           <a:p>
-            <a:pPr algn="ctr"/>
+            <a:pPr marL="25400" indent="0" algn="ctr">
+              <a:buNone/>
+            </a:pPr>
             <a:r>
-              <a:rPr lang="en-US" altLang="zh-CN" sz="1800" dirty="0"/>
+              <a:rPr lang="en-US" altLang="zh-CN" sz="1800" i="1" dirty="0">
+                <a:solidFill>
+                  <a:schemeClr val="tx2"/>
+                </a:solidFill>
+              </a:rPr>
               <a:t>A web service for exchanging second-hand books</a:t>
             </a:r>
-            <a:endParaRPr lang="en-US" altLang="zh-CN" sz="1800" dirty="0"/>
-          </a:p>
-        </p:txBody>
-      </p:sp>
-      <p:sp>
-        <p:nvSpPr>
-          <p:cNvPr id="5" name="TextBox 4"/>
-          <p:cNvSpPr txBox="1"/>
-          <p:nvPr/>
-        </p:nvSpPr>
-        <p:spPr>
-          <a:xfrm>
-            <a:off x="1190625" y="3209290"/>
-            <a:ext cx="6511290" cy="1968500"/>
-          </a:xfrm>
-          <a:prstGeom prst="rect">
-            <a:avLst/>
-          </a:prstGeom>
-          <a:noFill/>
-        </p:spPr>
-        <p:txBody>
-          <a:bodyPr wrap="square">
-            <a:spAutoFit/>
-          </a:bodyPr>
-          <a:lstStyle/>
-          <a:p>
-            <a:pPr algn="ctr"/>
-            <a:r>
-              <a:rPr lang="en-US" altLang="zh-CN" sz="1800" dirty="0"/>
-              <a:t>Motivation &amp; Main Functions:</a:t>
-            </a:r>
-            <a:endParaRPr lang="en-US" altLang="zh-CN" sz="1800" dirty="0"/>
-          </a:p>
-          <a:p>
-            <a:pPr marL="285750" indent="-285750" algn="ctr">
-              <a:buFont typeface="Arial" panose="020B0604020202020204" pitchFamily="34" charset="0"/>
-              <a:buChar char="•"/>
-            </a:pPr>
-            <a:r>
-              <a:rPr lang="en-US" altLang="zh-CN" sz="1800" dirty="0"/>
-              <a:t>A platform encourages people to exchange books</a:t>
-            </a:r>
-            <a:endParaRPr lang="en-US" altLang="zh-CN" sz="1800" dirty="0"/>
-          </a:p>
-          <a:p>
-            <a:pPr marL="285750" indent="-285750" algn="ctr">
-              <a:buFont typeface="Arial" panose="020B0604020202020204" pitchFamily="34" charset="0"/>
-              <a:buChar char="•"/>
-            </a:pPr>
-            <a:r>
-              <a:rPr lang="en-US" altLang="zh-CN" sz="1800" dirty="0"/>
-              <a:t>Save money to buy new books</a:t>
-            </a:r>
-            <a:endParaRPr lang="en-US" altLang="zh-CN" sz="1800" dirty="0"/>
-          </a:p>
-          <a:p>
-            <a:pPr marL="285750" indent="-285750" algn="ctr">
-              <a:buFont typeface="Arial" panose="020B0604020202020204" pitchFamily="34" charset="0"/>
-              <a:buChar char="•"/>
-            </a:pPr>
-            <a:r>
-              <a:rPr lang="en-US" altLang="zh-CN" sz="1800" dirty="0"/>
-              <a:t>The more books you donate, the more books you can request from others</a:t>
-            </a:r>
-            <a:endParaRPr lang="en-US" altLang="zh-CN" sz="1800" dirty="0"/>
-          </a:p>
-          <a:p>
-            <a:pPr marL="285750" indent="-285750" algn="ctr">
-              <a:buFont typeface="Arial" panose="020B0604020202020204" pitchFamily="34" charset="0"/>
-              <a:buChar char="•"/>
-            </a:pPr>
-            <a:r>
-              <a:rPr lang="en-US" altLang="zh-CN" sz="1800" dirty="0"/>
-              <a:t>Welcome users with similar interets to contact each other</a:t>
-            </a:r>
-            <a:endParaRPr lang="en-US" altLang="zh-CN" sz="1800" dirty="0"/>
-          </a:p>
-          <a:p>
-            <a:pPr algn="ctr"/>
-            <a:endParaRPr lang="zh-CN" altLang="en-US" dirty="0"/>
+            <a:endParaRPr lang="en-US" altLang="zh-CN" sz="1800" i="1" dirty="0">
+              <a:solidFill>
+                <a:schemeClr val="tx2"/>
+              </a:solidFill>
+            </a:endParaRPr>
           </a:p>
         </p:txBody>
       </p:sp>
@@ -10891,8 +10808,8 @@
         </p:nvSpPr>
         <p:spPr>
           <a:xfrm>
-            <a:off x="1832610" y="1494155"/>
-            <a:ext cx="5454650" cy="1168400"/>
+            <a:off x="0" y="5749925"/>
+            <a:ext cx="9144635" cy="306705"/>
           </a:xfrm>
           <a:prstGeom prst="rect">
             <a:avLst/>
@@ -10909,39 +10826,181 @@
               <a:rPr lang="en-US" altLang="zh-CN">
                 <a:sym typeface="+mn-ea"/>
               </a:rPr>
-              <a:t>Dantong Zhu</a:t>
+              <a:t>Group member: Dantong Zhu(dz2451), </a:t>
             </a:r>
-            <a:endParaRPr lang="en-US" altLang="zh-CN">
-              <a:sym typeface="+mn-ea"/>
-            </a:endParaRPr>
-          </a:p>
-          <a:p>
-            <a:pPr algn="ctr"/>
             <a:r>
               <a:rPr lang="en-US" altLang="zh-CN"/>
-              <a:t>Tianhang Cui </a:t>
+              <a:t>Tianhang Cui(tc3158), Anni Chen(ac4779), Zhenrui Chen(zc2569)</a:t>
             </a:r>
             <a:endParaRPr lang="en-US" altLang="zh-CN"/>
           </a:p>
+        </p:txBody>
+      </p:sp>
+      <p:pic>
+        <p:nvPicPr>
+          <p:cNvPr id="8" name="Picture 7"/>
+          <p:cNvPicPr>
+            <a:picLocks noChangeAspect="1"/>
+          </p:cNvPicPr>
+          <p:nvPr/>
+        </p:nvPicPr>
+        <p:blipFill>
+          <a:blip r:embed="rId1"/>
+          <a:stretch>
+            <a:fillRect/>
+          </a:stretch>
+        </p:blipFill>
+        <p:spPr>
+          <a:xfrm>
+            <a:off x="1800225" y="1285875"/>
+            <a:ext cx="5755005" cy="4381500"/>
+          </a:xfrm>
+          <a:prstGeom prst="rect">
+            <a:avLst/>
+          </a:prstGeom>
+        </p:spPr>
+      </p:pic>
+    </p:spTree>
+  </p:cSld>
+  <p:clrMapOvr>
+    <a:masterClrMapping/>
+  </p:clrMapOvr>
+</p:sld>
+</file>
+
+<file path=ppt/slides/slide10.xml><?xml version="1.0" encoding="utf-8"?>
+<p:sld xmlns:a="http://schemas.openxmlformats.org/drawingml/2006/main" xmlns:r="http://schemas.openxmlformats.org/officeDocument/2006/relationships" xmlns:p="http://schemas.openxmlformats.org/presentationml/2006/main">
+  <p:cSld>
+    <p:spTree>
+      <p:nvGrpSpPr>
+        <p:cNvPr id="1" name=""/>
+        <p:cNvGrpSpPr/>
+        <p:nvPr/>
+      </p:nvGrpSpPr>
+      <p:grpSpPr>
+        <a:xfrm>
+          <a:off x="0" y="0"/>
+          <a:ext cx="0" cy="0"/>
+          <a:chOff x="0" y="0"/>
+          <a:chExt cx="0" cy="0"/>
+        </a:xfrm>
+      </p:grpSpPr>
+      <p:sp>
+        <p:nvSpPr>
+          <p:cNvPr id="4" name="Title 1"/>
+          <p:cNvSpPr>
+            <a:spLocks noGrp="1"/>
+          </p:cNvSpPr>
+          <p:nvPr>
+            <p:ph type="ctrTitle"/>
+          </p:nvPr>
+        </p:nvSpPr>
+        <p:spPr>
+          <a:xfrm>
+            <a:off x="35678" y="44153"/>
+            <a:ext cx="9144000" cy="947357"/>
+          </a:xfrm>
+        </p:spPr>
+        <p:txBody>
+          <a:bodyPr>
+            <a:normAutofit/>
+          </a:bodyPr>
+          <a:lstStyle/>
           <a:p>
-            <a:pPr algn="ctr"/>
             <a:r>
-              <a:rPr lang="en-US" altLang="zh-CN"/>
-              <a:t>Anni Chen ac4779</a:t>
+              <a:rPr lang="en-US" altLang="zh-CN" sz="4000" dirty="0"/>
+              <a:t>Some Design Choice</a:t>
             </a:r>
-            <a:endParaRPr lang="en-US" altLang="zh-CN"/>
+            <a:endParaRPr lang="zh-CN" altLang="en-US" sz="4000" dirty="0"/>
+          </a:p>
+        </p:txBody>
+      </p:sp>
+      <p:sp>
+        <p:nvSpPr>
+          <p:cNvPr id="5" name="TextBox 2"/>
+          <p:cNvSpPr txBox="1"/>
+          <p:nvPr/>
+        </p:nvSpPr>
+        <p:spPr>
+          <a:xfrm>
+            <a:off x="301625" y="1412875"/>
+            <a:ext cx="8540115" cy="2799715"/>
+          </a:xfrm>
+          <a:prstGeom prst="rect">
+            <a:avLst/>
+          </a:prstGeom>
+          <a:noFill/>
+        </p:spPr>
+        <p:txBody>
+          <a:bodyPr wrap="square" rtlCol="0">
+            <a:spAutoFit/>
+          </a:bodyPr>
+          <a:lstStyle/>
+          <a:p>
+            <a:r>
+              <a:rPr lang="en-US" altLang="zh-CN" sz="1600" dirty="0"/>
+              <a:t>Although we can link user’s account and their information directly in Cognito (which is convenient and good for keeping user’s information secure!), we decided to use</a:t>
+            </a:r>
+            <a:r>
+              <a:rPr lang="en-US" altLang="zh-CN" sz="1600" b="1" i="1" dirty="0"/>
+              <a:t> DynamoDB</a:t>
+            </a:r>
+            <a:r>
+              <a:rPr lang="en-US" altLang="zh-CN" sz="1600" dirty="0"/>
+              <a:t> to store the users’ non-sensitive information, rather than storing them in</a:t>
+            </a:r>
+            <a:r>
+              <a:rPr lang="en-US" altLang="zh-CN" sz="1600" b="1" i="1" dirty="0"/>
+              <a:t> Cognito</a:t>
+            </a:r>
+            <a:r>
+              <a:rPr lang="en-US" altLang="zh-CN" sz="1600" dirty="0"/>
+              <a:t>.</a:t>
+            </a:r>
+            <a:endParaRPr lang="en-US" altLang="zh-CN" sz="1600" dirty="0"/>
           </a:p>
           <a:p>
-            <a:pPr algn="ctr"/>
-            <a:r>
-              <a:rPr lang="en-US" altLang="zh-CN"/>
-              <a:t>Zhengrui Chen</a:t>
-            </a:r>
-            <a:endParaRPr lang="en-US" altLang="zh-CN"/>
+            <a:endParaRPr lang="en-US" altLang="zh-CN" sz="1600" dirty="0"/>
           </a:p>
           <a:p>
-            <a:pPr algn="ctr"/>
-            <a:endParaRPr lang="en-US" altLang="zh-CN"/>
+            <a:r>
+              <a:rPr lang="en-US" altLang="zh-CN" sz="1600" dirty="0"/>
+              <a:t>-   The attributes stored in Cognito has to be key-value(string) pair, not good for complicated data structures.</a:t>
+            </a:r>
+            <a:endParaRPr lang="en-US" altLang="zh-CN" sz="1600" dirty="0"/>
+          </a:p>
+          <a:p>
+            <a:pPr marL="285750" indent="-285750">
+              <a:buFontTx/>
+              <a:buChar char="-"/>
+            </a:pPr>
+            <a:r>
+              <a:rPr lang="en-US" altLang="zh-CN" sz="1600" dirty="0"/>
+              <a:t>We need to store many users’ requested/donate books, this list could be large and Cognito is not scalable as the DynamoDB.</a:t>
+            </a:r>
+            <a:endParaRPr lang="en-US" altLang="zh-CN" sz="1600" dirty="0"/>
+          </a:p>
+          <a:p>
+            <a:pPr marL="285750" indent="-285750">
+              <a:buFontTx/>
+              <a:buChar char="-"/>
+            </a:pPr>
+            <a:r>
+              <a:rPr lang="en-US" altLang="zh-CN" sz="1600" dirty="0"/>
+              <a:t>The DynamoDB can handle query much more efficient than Cognito</a:t>
+            </a:r>
+            <a:endParaRPr lang="en-US" altLang="zh-CN" sz="1600" dirty="0"/>
+          </a:p>
+          <a:p>
+            <a:pPr marL="285750" indent="-285750">
+              <a:buFontTx/>
+              <a:buChar char="-"/>
+            </a:pPr>
+            <a:r>
+              <a:rPr lang="en-US" altLang="zh-CN" sz="1600" dirty="0"/>
+              <a:t>We realized this is the pattern often done in the industry after searching the online information</a:t>
+            </a:r>
+            <a:endParaRPr lang="en-US" altLang="zh-CN" sz="1600" dirty="0"/>
           </a:p>
         </p:txBody>
       </p:sp>
@@ -10954,6 +11013,200 @@
 </file>
 
 <file path=ppt/slides/slide2.xml><?xml version="1.0" encoding="utf-8"?>
+<p:sld xmlns:a="http://schemas.openxmlformats.org/drawingml/2006/main" xmlns:r="http://schemas.openxmlformats.org/officeDocument/2006/relationships" xmlns:p="http://schemas.openxmlformats.org/presentationml/2006/main">
+  <p:cSld>
+    <p:spTree>
+      <p:nvGrpSpPr>
+        <p:cNvPr id="1" name=""/>
+        <p:cNvGrpSpPr/>
+        <p:nvPr/>
+      </p:nvGrpSpPr>
+      <p:grpSpPr/>
+      <p:sp>
+        <p:nvSpPr>
+          <p:cNvPr id="2" name="Title 1"/>
+          <p:cNvSpPr>
+            <a:spLocks noGrp="1"/>
+          </p:cNvSpPr>
+          <p:nvPr>
+            <p:ph type="title"/>
+          </p:nvPr>
+        </p:nvSpPr>
+        <p:spPr>
+          <a:xfrm>
+            <a:off x="0" y="0"/>
+            <a:ext cx="9144000" cy="857885"/>
+          </a:xfrm>
+        </p:spPr>
+        <p:txBody>
+          <a:bodyPr/>
+          <a:p>
+            <a:r>
+              <a:rPr lang="en-US"/>
+              <a:t>Contents</a:t>
+            </a:r>
+            <a:endParaRPr lang="en-US"/>
+          </a:p>
+        </p:txBody>
+      </p:sp>
+      <p:sp>
+        <p:nvSpPr>
+          <p:cNvPr id="5" name="Text Placeholder 4"/>
+          <p:cNvSpPr>
+            <a:spLocks noGrp="1"/>
+          </p:cNvSpPr>
+          <p:nvPr>
+            <p:ph type="body" idx="1"/>
+          </p:nvPr>
+        </p:nvSpPr>
+        <p:spPr>
+          <a:xfrm>
+            <a:off x="1256665" y="1756410"/>
+            <a:ext cx="6658610" cy="3128645"/>
+          </a:xfrm>
+        </p:spPr>
+        <p:txBody>
+          <a:bodyPr/>
+          <a:p>
+            <a:r>
+              <a:rPr lang="en-US"/>
+              <a:t>Motivation</a:t>
+            </a:r>
+            <a:endParaRPr lang="en-US"/>
+          </a:p>
+          <a:p>
+            <a:r>
+              <a:rPr lang="en-US"/>
+              <a:t>Structure </a:t>
+            </a:r>
+            <a:r>
+              <a:rPr lang="en-US"/>
+              <a:t>Overview</a:t>
+            </a:r>
+            <a:endParaRPr lang="en-US"/>
+          </a:p>
+          <a:p>
+            <a:r>
+              <a:rPr lang="en-US"/>
+              <a:t>Implementation </a:t>
+            </a:r>
+            <a:r>
+              <a:rPr lang="en-US"/>
+              <a:t>Details</a:t>
+            </a:r>
+            <a:endParaRPr lang="en-US"/>
+          </a:p>
+          <a:p>
+            <a:r>
+              <a:rPr lang="en-US"/>
+              <a:t>Some Design Choices</a:t>
+            </a:r>
+            <a:endParaRPr lang="en-US"/>
+          </a:p>
+        </p:txBody>
+      </p:sp>
+    </p:spTree>
+  </p:cSld>
+  <p:clrMapOvr>
+    <a:masterClrMapping/>
+  </p:clrMapOvr>
+</p:sld>
+</file>
+
+<file path=ppt/slides/slide3.xml><?xml version="1.0" encoding="utf-8"?>
+<p:sld xmlns:a="http://schemas.openxmlformats.org/drawingml/2006/main" xmlns:r="http://schemas.openxmlformats.org/officeDocument/2006/relationships" xmlns:p="http://schemas.openxmlformats.org/presentationml/2006/main">
+  <p:cSld>
+    <p:spTree>
+      <p:nvGrpSpPr>
+        <p:cNvPr id="1" name=""/>
+        <p:cNvGrpSpPr/>
+        <p:nvPr/>
+      </p:nvGrpSpPr>
+      <p:grpSpPr/>
+      <p:sp>
+        <p:nvSpPr>
+          <p:cNvPr id="2" name="Title 1"/>
+          <p:cNvSpPr>
+            <a:spLocks noGrp="1"/>
+          </p:cNvSpPr>
+          <p:nvPr>
+            <p:ph type="title"/>
+          </p:nvPr>
+        </p:nvSpPr>
+        <p:spPr>
+          <a:xfrm>
+            <a:off x="0" y="0"/>
+            <a:ext cx="9144635" cy="2999740"/>
+          </a:xfrm>
+        </p:spPr>
+        <p:txBody>
+          <a:bodyPr/>
+          <a:p>
+            <a:r>
+              <a:rPr lang="en-US"/>
+              <a:t>Motivation</a:t>
+            </a:r>
+            <a:endParaRPr lang="en-US"/>
+          </a:p>
+        </p:txBody>
+      </p:sp>
+      <p:sp>
+        <p:nvSpPr>
+          <p:cNvPr id="3" name="Text Placeholder 2"/>
+          <p:cNvSpPr>
+            <a:spLocks noGrp="1"/>
+          </p:cNvSpPr>
+          <p:nvPr>
+            <p:ph type="body" idx="1"/>
+          </p:nvPr>
+        </p:nvSpPr>
+        <p:spPr>
+          <a:xfrm>
+            <a:off x="749300" y="1736090"/>
+            <a:ext cx="7646670" cy="3900805"/>
+          </a:xfrm>
+        </p:spPr>
+        <p:txBody>
+          <a:bodyPr/>
+          <a:p>
+            <a:r>
+              <a:rPr lang="en-US" sz="2000"/>
+              <a:t>A platform encourages people to exchange books</a:t>
+            </a:r>
+            <a:endParaRPr lang="en-US" sz="2000"/>
+          </a:p>
+          <a:p>
+            <a:r>
+              <a:rPr lang="en-US" sz="2000"/>
+              <a:t>Save money to buy new books</a:t>
+            </a:r>
+            <a:endParaRPr lang="en-US" sz="2000"/>
+          </a:p>
+          <a:p>
+            <a:r>
+              <a:rPr lang="en-US" sz="2000"/>
+              <a:t>The more books you donate, the more books you can request from others</a:t>
+            </a:r>
+            <a:endParaRPr lang="en-US" sz="2000"/>
+          </a:p>
+          <a:p>
+            <a:r>
+              <a:rPr lang="en-US" sz="2000"/>
+              <a:t>Welcome users with similar interests to contact each other</a:t>
+            </a:r>
+            <a:endParaRPr lang="en-US" sz="2000"/>
+          </a:p>
+        </p:txBody>
+      </p:sp>
+    </p:spTree>
+  </p:cSld>
+  <p:clrMapOvr>
+    <a:masterClrMapping/>
+  </p:clrMapOvr>
+</p:sld>
+</file>
+
+<file path=ppt/slides/slide4.xml><?xml version="1.0" encoding="utf-8"?>
 <p:sld xmlns:a="http://schemas.openxmlformats.org/drawingml/2006/main" xmlns:r="http://schemas.openxmlformats.org/officeDocument/2006/relationships" xmlns:p="http://schemas.openxmlformats.org/presentationml/2006/main">
   <p:cSld>
     <p:spTree>
@@ -11032,7 +11285,7 @@
 </p:sld>
 </file>
 
-<file path=ppt/slides/slide3.xml><?xml version="1.0" encoding="utf-8"?>
+<file path=ppt/slides/slide5.xml><?xml version="1.0" encoding="utf-8"?>
 <p:sld xmlns:a="http://schemas.openxmlformats.org/drawingml/2006/main" xmlns:r="http://schemas.openxmlformats.org/officeDocument/2006/relationships" xmlns:p="http://schemas.openxmlformats.org/presentationml/2006/main">
   <p:cSld>
     <p:spTree>
@@ -11061,8 +11314,8 @@
         </p:nvSpPr>
         <p:spPr>
           <a:xfrm>
-            <a:off x="-36830" y="-27304"/>
-            <a:ext cx="9144000" cy="1023908"/>
+            <a:off x="0" y="-6985"/>
+            <a:ext cx="9144000" cy="866775"/>
           </a:xfrm>
         </p:spPr>
         <p:txBody>
@@ -11073,7 +11326,7 @@
           <a:p>
             <a:r>
               <a:rPr lang="en-US" altLang="zh-CN" sz="4000" dirty="0"/>
-              <a:t>Login</a:t>
+              <a:t>Implementation Details</a:t>
             </a:r>
             <a:endParaRPr lang="zh-CN" altLang="en-US" sz="4000" dirty="0"/>
           </a:p>
@@ -11087,8 +11340,8 @@
         </p:nvSpPr>
         <p:spPr>
           <a:xfrm>
-            <a:off x="232" y="908833"/>
-            <a:ext cx="9669643" cy="646331"/>
+            <a:off x="0" y="908685"/>
+            <a:ext cx="3630930" cy="737235"/>
           </a:xfrm>
           <a:prstGeom prst="rect">
             <a:avLst/>
@@ -11156,7 +11409,7 @@
         </p:blipFill>
         <p:spPr>
           <a:xfrm>
-            <a:off x="423721" y="1555164"/>
+            <a:off x="420546" y="1645969"/>
             <a:ext cx="2529253" cy="4513688"/>
           </a:xfrm>
           <a:prstGeom prst="rect">
@@ -11197,6 +11450,44 @@
           </a:fontRef>
         </p:style>
       </p:cxnSp>
+      <p:sp>
+        <p:nvSpPr>
+          <p:cNvPr id="3" name="Text Box 2"/>
+          <p:cNvSpPr txBox="1"/>
+          <p:nvPr/>
+        </p:nvSpPr>
+        <p:spPr>
+          <a:xfrm>
+            <a:off x="5351780" y="946150"/>
+            <a:ext cx="3632200" cy="460375"/>
+          </a:xfrm>
+          <a:prstGeom prst="rect">
+            <a:avLst/>
+          </a:prstGeom>
+          <a:noFill/>
+        </p:spPr>
+        <p:txBody>
+          <a:bodyPr wrap="square" rtlCol="0">
+            <a:spAutoFit/>
+          </a:bodyPr>
+          <a:p>
+            <a:pPr algn="ctr"/>
+            <a:r>
+              <a:rPr lang="en-US" sz="2400" b="1" i="1">
+                <a:solidFill>
+                  <a:schemeClr val="tx2"/>
+                </a:solidFill>
+              </a:rPr>
+              <a:t>Login</a:t>
+            </a:r>
+            <a:endParaRPr lang="en-US" sz="2400" b="1" i="1">
+              <a:solidFill>
+                <a:schemeClr val="tx2"/>
+              </a:solidFill>
+            </a:endParaRPr>
+          </a:p>
+        </p:txBody>
+      </p:sp>
     </p:spTree>
   </p:cSld>
   <p:clrMapOvr>
@@ -11205,7 +11496,7 @@
 </p:sld>
 </file>
 
-<file path=ppt/slides/slide4.xml><?xml version="1.0" encoding="utf-8"?>
+<file path=ppt/slides/slide6.xml><?xml version="1.0" encoding="utf-8"?>
 <p:sld xmlns:a="http://schemas.openxmlformats.org/drawingml/2006/main" xmlns:r="http://schemas.openxmlformats.org/officeDocument/2006/relationships" xmlns:p="http://schemas.openxmlformats.org/presentationml/2006/main">
   <p:cSld>
     <p:spTree>
@@ -11234,8 +11525,8 @@
         </p:nvSpPr>
         <p:spPr>
           <a:xfrm>
-            <a:off x="-36161" y="0"/>
-            <a:ext cx="9144000" cy="947357"/>
+            <a:off x="-635" y="0"/>
+            <a:ext cx="9145270" cy="865505"/>
           </a:xfrm>
         </p:spPr>
         <p:txBody>
@@ -11246,7 +11537,7 @@
           <a:p>
             <a:r>
               <a:rPr lang="en-US" altLang="zh-CN" sz="4000" dirty="0"/>
-              <a:t>Donate a second-hand book</a:t>
+              <a:t>Implementation Details</a:t>
             </a:r>
             <a:endParaRPr lang="zh-CN" altLang="en-US" sz="4000" dirty="0"/>
           </a:p>
@@ -11260,7 +11551,7 @@
         </p:nvSpPr>
         <p:spPr>
           <a:xfrm>
-            <a:off x="117475" y="1257935"/>
+            <a:off x="120015" y="954405"/>
             <a:ext cx="4105910" cy="5340350"/>
           </a:xfrm>
           <a:prstGeom prst="roundRect">
@@ -11308,8 +11599,8 @@
         </p:nvSpPr>
         <p:spPr>
           <a:xfrm>
-            <a:off x="193675" y="4869180"/>
-            <a:ext cx="3958590" cy="1568450"/>
+            <a:off x="193675" y="4242435"/>
+            <a:ext cx="3958590" cy="1938020"/>
           </a:xfrm>
           <a:prstGeom prst="rect">
             <a:avLst/>
@@ -11345,6 +11636,17 @@
               <a:buFont typeface="Arial" panose="020B0604020202020204" pitchFamily="34" charset="0"/>
               <a:buChar char="•"/>
             </a:pPr>
+            <a:endParaRPr lang="en-US" altLang="zh-CN" sz="1200" dirty="0">
+              <a:solidFill>
+                <a:schemeClr val="bg1"/>
+              </a:solidFill>
+            </a:endParaRPr>
+          </a:p>
+          <a:p>
+            <a:pPr marL="285750" indent="-285750">
+              <a:buFont typeface="Arial" panose="020B0604020202020204" pitchFamily="34" charset="0"/>
+              <a:buChar char="•"/>
+            </a:pPr>
             <a:r>
               <a:rPr lang="en-US" altLang="zh-CN" sz="1200" dirty="0">
                 <a:solidFill>
@@ -11353,6 +11655,17 @@
               </a:rPr>
               <a:t>Using a Lambda Function to add the donation information to DynamoDB and OpenSearch.</a:t>
             </a:r>
+            <a:endParaRPr lang="en-US" altLang="zh-CN" sz="1200" dirty="0">
+              <a:solidFill>
+                <a:schemeClr val="bg1"/>
+              </a:solidFill>
+            </a:endParaRPr>
+          </a:p>
+          <a:p>
+            <a:pPr marL="285750" indent="-285750">
+              <a:buFont typeface="Arial" panose="020B0604020202020204" pitchFamily="34" charset="0"/>
+              <a:buChar char="•"/>
+            </a:pPr>
             <a:endParaRPr lang="en-US" altLang="zh-CN" sz="1200" dirty="0">
               <a:solidFill>
                 <a:schemeClr val="bg1"/>
@@ -11418,7 +11731,7 @@
         </p:blipFill>
         <p:spPr>
           <a:xfrm>
-            <a:off x="612462" y="1719376"/>
+            <a:off x="688662" y="1053896"/>
             <a:ext cx="2968417" cy="3096309"/>
           </a:xfrm>
           <a:prstGeom prst="rect">
@@ -11426,46 +11739,6 @@
           </a:prstGeom>
         </p:spPr>
       </p:pic>
-      <p:sp>
-        <p:nvSpPr>
-          <p:cNvPr id="9" name="TextBox 6"/>
-          <p:cNvSpPr txBox="1"/>
-          <p:nvPr/>
-        </p:nvSpPr>
-        <p:spPr>
-          <a:xfrm>
-            <a:off x="1475584" y="1258173"/>
-            <a:ext cx="1394415" cy="461665"/>
-          </a:xfrm>
-          <a:prstGeom prst="rect">
-            <a:avLst/>
-          </a:prstGeom>
-          <a:noFill/>
-        </p:spPr>
-        <p:txBody>
-          <a:bodyPr wrap="square" rtlCol="0">
-            <a:spAutoFit/>
-          </a:bodyPr>
-          <a:lstStyle/>
-          <a:p>
-            <a:r>
-              <a:rPr lang="en-US" altLang="zh-CN" sz="2400" dirty="0">
-                <a:solidFill>
-                  <a:schemeClr val="bg1"/>
-                </a:solidFill>
-                <a:latin typeface="Arial Black" panose="020B0A04020102020204" pitchFamily="34" charset="0"/>
-              </a:rPr>
-              <a:t>Donate</a:t>
-            </a:r>
-            <a:endParaRPr lang="zh-CN" altLang="en-US" sz="2400" dirty="0">
-              <a:solidFill>
-                <a:schemeClr val="bg1"/>
-              </a:solidFill>
-              <a:latin typeface="Arial Black" panose="020B0A04020102020204" pitchFamily="34" charset="0"/>
-            </a:endParaRPr>
-          </a:p>
-        </p:txBody>
-      </p:sp>
       <p:pic>
         <p:nvPicPr>
           <p:cNvPr id="30" name="图片 29"/>
@@ -11482,7 +11755,7 @@
         </p:blipFill>
         <p:spPr>
           <a:xfrm>
-            <a:off x="4444001" y="1495953"/>
+            <a:off x="4410346" y="1719473"/>
             <a:ext cx="4571436" cy="4955326"/>
           </a:xfrm>
           <a:prstGeom prst="rect">
@@ -11490,6 +11763,44 @@
           </a:prstGeom>
         </p:spPr>
       </p:pic>
+      <p:sp>
+        <p:nvSpPr>
+          <p:cNvPr id="3" name="Text Box 2"/>
+          <p:cNvSpPr txBox="1"/>
+          <p:nvPr/>
+        </p:nvSpPr>
+        <p:spPr>
+          <a:xfrm>
+            <a:off x="4410710" y="946150"/>
+            <a:ext cx="4573270" cy="460375"/>
+          </a:xfrm>
+          <a:prstGeom prst="rect">
+            <a:avLst/>
+          </a:prstGeom>
+          <a:noFill/>
+        </p:spPr>
+        <p:txBody>
+          <a:bodyPr wrap="square" rtlCol="0">
+            <a:spAutoFit/>
+          </a:bodyPr>
+          <a:p>
+            <a:pPr algn="ctr"/>
+            <a:r>
+              <a:rPr lang="en-US" sz="2400" b="1" i="1">
+                <a:solidFill>
+                  <a:schemeClr val="tx2"/>
+                </a:solidFill>
+              </a:rPr>
+              <a:t>Donate a second-hand book</a:t>
+            </a:r>
+            <a:endParaRPr lang="en-US" sz="2400" b="1" i="1">
+              <a:solidFill>
+                <a:schemeClr val="tx2"/>
+              </a:solidFill>
+            </a:endParaRPr>
+          </a:p>
+        </p:txBody>
+      </p:sp>
     </p:spTree>
   </p:cSld>
   <p:clrMapOvr>
@@ -11498,7 +11809,7 @@
 </p:sld>
 </file>
 
-<file path=ppt/slides/slide5.xml><?xml version="1.0" encoding="utf-8"?>
+<file path=ppt/slides/slide7.xml><?xml version="1.0" encoding="utf-8"?>
 <p:sld xmlns:a="http://schemas.openxmlformats.org/drawingml/2006/main" xmlns:r="http://schemas.openxmlformats.org/officeDocument/2006/relationships" xmlns:p="http://schemas.openxmlformats.org/presentationml/2006/main">
   <p:cSld>
     <p:spTree>
@@ -11527,8 +11838,8 @@
         </p:nvSpPr>
         <p:spPr>
           <a:xfrm>
-            <a:off x="-36161" y="0"/>
-            <a:ext cx="9144000" cy="947357"/>
+            <a:off x="0" y="0"/>
+            <a:ext cx="9144000" cy="850900"/>
           </a:xfrm>
         </p:spPr>
         <p:txBody>
@@ -11539,7 +11850,7 @@
           <a:p>
             <a:r>
               <a:rPr lang="en-US" altLang="zh-CN" sz="4000" dirty="0"/>
-              <a:t>Request a second-hand book</a:t>
+              <a:t>Implementation Details</a:t>
             </a:r>
             <a:endParaRPr lang="zh-CN" altLang="en-US" sz="4000" dirty="0"/>
           </a:p>
@@ -11553,8 +11864,8 @@
         </p:nvSpPr>
         <p:spPr>
           <a:xfrm>
-            <a:off x="4525310" y="1212215"/>
-            <a:ext cx="4255770" cy="5386070"/>
+            <a:off x="112395" y="946150"/>
+            <a:ext cx="4255770" cy="5330825"/>
           </a:xfrm>
           <a:prstGeom prst="roundRect">
             <a:avLst/>
@@ -11593,46 +11904,6 @@
           </a:p>
         </p:txBody>
       </p:sp>
-      <p:sp>
-        <p:nvSpPr>
-          <p:cNvPr id="3" name="TextBox 8"/>
-          <p:cNvSpPr txBox="1"/>
-          <p:nvPr/>
-        </p:nvSpPr>
-        <p:spPr>
-          <a:xfrm>
-            <a:off x="5239685" y="1257935"/>
-            <a:ext cx="2826385" cy="460375"/>
-          </a:xfrm>
-          <a:prstGeom prst="rect">
-            <a:avLst/>
-          </a:prstGeom>
-          <a:noFill/>
-        </p:spPr>
-        <p:txBody>
-          <a:bodyPr wrap="square" rtlCol="0">
-            <a:spAutoFit/>
-          </a:bodyPr>
-          <a:lstStyle/>
-          <a:p>
-            <a:r>
-              <a:rPr lang="en-US" altLang="zh-CN" sz="2400" dirty="0">
-                <a:solidFill>
-                  <a:schemeClr val="bg1"/>
-                </a:solidFill>
-                <a:latin typeface="Arial Black" panose="020B0A04020102020204" pitchFamily="34" charset="0"/>
-              </a:rPr>
-              <a:t>Request-Anni</a:t>
-            </a:r>
-            <a:endParaRPr lang="zh-CN" altLang="en-US" sz="2400" dirty="0">
-              <a:solidFill>
-                <a:schemeClr val="bg1"/>
-              </a:solidFill>
-              <a:latin typeface="Arial Black" panose="020B0A04020102020204" pitchFamily="34" charset="0"/>
-            </a:endParaRPr>
-          </a:p>
-        </p:txBody>
-      </p:sp>
       <p:pic>
         <p:nvPicPr>
           <p:cNvPr id="5" name="内容占位符 4"/>
@@ -11655,8 +11926,8 @@
         </p:blipFill>
         <p:spPr>
           <a:xfrm>
-            <a:off x="5101255" y="1916430"/>
-            <a:ext cx="2998470" cy="2489200"/>
+            <a:off x="626745" y="1195070"/>
+            <a:ext cx="3227705" cy="2679065"/>
           </a:xfrm>
           <a:prstGeom prst="rect">
             <a:avLst/>
@@ -11671,7 +11942,7 @@
         </p:nvSpPr>
         <p:spPr>
           <a:xfrm>
-            <a:off x="4678980" y="4509135"/>
+            <a:off x="267000" y="4107815"/>
             <a:ext cx="3948430" cy="1753235"/>
           </a:xfrm>
           <a:prstGeom prst="rect">
@@ -11690,17 +11961,35 @@
               <a:buChar char="•"/>
             </a:pPr>
             <a:r>
-              <a:rPr lang="en-US" altLang="zh-CN" sz="1200"/>
+              <a:rPr lang="en-US" altLang="zh-CN" sz="1200">
+                <a:solidFill>
+                  <a:schemeClr val="accent1"/>
+                </a:solidFill>
+                <a:latin typeface="+mj-lt"/>
+                <a:cs typeface="+mj-lt"/>
+              </a:rPr>
               <a:t>Determine whether the user has enough credits to make request</a:t>
             </a:r>
-            <a:endParaRPr lang="en-US" altLang="zh-CN" sz="1200"/>
+            <a:endParaRPr lang="en-US" altLang="zh-CN" sz="1200">
+              <a:solidFill>
+                <a:schemeClr val="accent1"/>
+              </a:solidFill>
+              <a:latin typeface="+mj-lt"/>
+              <a:cs typeface="+mj-lt"/>
+            </a:endParaRPr>
           </a:p>
           <a:p>
             <a:pPr marL="285750" indent="-285750">
               <a:buFont typeface="Arial" panose="020B0604020202020204" pitchFamily="34" charset="0"/>
               <a:buChar char="•"/>
             </a:pPr>
-            <a:endParaRPr lang="en-US" altLang="zh-CN" sz="1200"/>
+            <a:endParaRPr lang="en-US" altLang="zh-CN" sz="1200">
+              <a:solidFill>
+                <a:schemeClr val="accent1"/>
+              </a:solidFill>
+              <a:latin typeface="+mj-lt"/>
+              <a:cs typeface="+mj-lt"/>
+            </a:endParaRPr>
           </a:p>
           <a:p>
             <a:pPr marL="285750" indent="-285750">
@@ -11708,17 +11997,35 @@
               <a:buChar char="•"/>
             </a:pPr>
             <a:r>
-              <a:rPr lang="en-US" altLang="zh-CN" sz="1200"/>
+              <a:rPr lang="en-US" altLang="zh-CN" sz="1200">
+                <a:solidFill>
+                  <a:schemeClr val="accent1"/>
+                </a:solidFill>
+                <a:latin typeface="+mj-lt"/>
+                <a:cs typeface="+mj-lt"/>
+              </a:rPr>
               <a:t>Once successful requested, update user history (add book_id)</a:t>
             </a:r>
-            <a:endParaRPr lang="en-US" altLang="zh-CN" sz="1200"/>
+            <a:endParaRPr lang="en-US" altLang="zh-CN" sz="1200">
+              <a:solidFill>
+                <a:schemeClr val="accent1"/>
+              </a:solidFill>
+              <a:latin typeface="+mj-lt"/>
+              <a:cs typeface="+mj-lt"/>
+            </a:endParaRPr>
           </a:p>
           <a:p>
             <a:pPr marL="285750" indent="-285750">
               <a:buFont typeface="Arial" panose="020B0604020202020204" pitchFamily="34" charset="0"/>
               <a:buChar char="•"/>
             </a:pPr>
-            <a:endParaRPr lang="en-US" altLang="zh-CN" sz="1200"/>
+            <a:endParaRPr lang="en-US" altLang="zh-CN" sz="1200">
+              <a:solidFill>
+                <a:schemeClr val="accent1"/>
+              </a:solidFill>
+              <a:latin typeface="+mj-lt"/>
+              <a:cs typeface="+mj-lt"/>
+            </a:endParaRPr>
           </a:p>
           <a:p>
             <a:pPr marL="285750" indent="-285750">
@@ -11726,23 +12033,79 @@
               <a:buChar char="•"/>
             </a:pPr>
             <a:r>
-              <a:rPr lang="en-US" altLang="zh-CN" sz="1200"/>
+              <a:rPr lang="en-US" altLang="zh-CN" sz="1200">
+                <a:solidFill>
+                  <a:schemeClr val="accent1"/>
+                </a:solidFill>
+                <a:latin typeface="+mj-lt"/>
+                <a:cs typeface="+mj-lt"/>
+              </a:rPr>
               <a:t>Update book information to set status=’unavailable’, so it will no longer be searched</a:t>
             </a:r>
-            <a:endParaRPr lang="en-US" altLang="zh-CN" sz="1200"/>
+            <a:endParaRPr lang="en-US" altLang="zh-CN" sz="1200">
+              <a:solidFill>
+                <a:schemeClr val="accent1"/>
+              </a:solidFill>
+              <a:latin typeface="+mj-lt"/>
+              <a:cs typeface="+mj-lt"/>
+            </a:endParaRPr>
           </a:p>
           <a:p>
             <a:pPr marL="285750" indent="-285750">
               <a:buFont typeface="Arial" panose="020B0604020202020204" pitchFamily="34" charset="0"/>
               <a:buChar char="•"/>
             </a:pPr>
-            <a:endParaRPr lang="en-US" altLang="zh-CN" sz="1200"/>
+            <a:endParaRPr lang="en-US" altLang="zh-CN" sz="1200">
+              <a:solidFill>
+                <a:schemeClr val="accent1"/>
+              </a:solidFill>
+              <a:latin typeface="+mj-lt"/>
+              <a:cs typeface="+mj-lt"/>
+            </a:endParaRPr>
+          </a:p>
+        </p:txBody>
+      </p:sp>
+      <p:sp>
+        <p:nvSpPr>
+          <p:cNvPr id="6" name="Text Box 5"/>
+          <p:cNvSpPr txBox="1"/>
+          <p:nvPr/>
+        </p:nvSpPr>
+        <p:spPr>
+          <a:xfrm>
+            <a:off x="4543425" y="946150"/>
+            <a:ext cx="4440555" cy="460375"/>
+          </a:xfrm>
+          <a:prstGeom prst="rect">
+            <a:avLst/>
+          </a:prstGeom>
+          <a:noFill/>
+        </p:spPr>
+        <p:txBody>
+          <a:bodyPr wrap="square" rtlCol="0">
+            <a:spAutoFit/>
+          </a:bodyPr>
+          <a:p>
+            <a:pPr algn="ctr"/>
+            <a:r>
+              <a:rPr lang="en-US" sz="2400" b="1" i="1">
+                <a:solidFill>
+                  <a:schemeClr val="tx2"/>
+                </a:solidFill>
+              </a:rPr>
+              <a:t>Request a second-hand book</a:t>
+            </a:r>
+            <a:endParaRPr lang="en-US" sz="2400" b="1" i="1">
+              <a:solidFill>
+                <a:schemeClr val="tx2"/>
+              </a:solidFill>
+            </a:endParaRPr>
           </a:p>
         </p:txBody>
       </p:sp>
       <p:pic>
         <p:nvPicPr>
-          <p:cNvPr id="13" name="图片 12"/>
+          <p:cNvPr id="7" name="图片 12"/>
           <p:cNvPicPr>
             <a:picLocks noChangeAspect="1"/>
           </p:cNvPicPr>
@@ -11756,7 +12119,7 @@
         </p:blipFill>
         <p:spPr>
           <a:xfrm>
-            <a:off x="0" y="2366681"/>
+            <a:off x="4484370" y="2383826"/>
             <a:ext cx="4499603" cy="2237591"/>
           </a:xfrm>
           <a:prstGeom prst="rect">
@@ -11766,13 +12129,13 @@
       </p:pic>
       <p:cxnSp>
         <p:nvCxnSpPr>
-          <p:cNvPr id="15" name="直接箭头连接符 14"/>
+          <p:cNvPr id="8" name="直接箭头连接符 14"/>
           <p:cNvCxnSpPr/>
           <p:nvPr/>
         </p:nvCxnSpPr>
         <p:spPr>
           <a:xfrm flipV="1">
-            <a:off x="3711388" y="4509135"/>
+            <a:off x="8195758" y="4526280"/>
             <a:ext cx="236668" cy="478716"/>
           </a:xfrm>
           <a:prstGeom prst="straightConnector1">
@@ -11799,13 +12162,13 @@
       </p:cxnSp>
       <p:sp>
         <p:nvSpPr>
-          <p:cNvPr id="18" name="文本框 17"/>
+          <p:cNvPr id="9" name="文本框 17"/>
           <p:cNvSpPr txBox="1"/>
           <p:nvPr/>
         </p:nvSpPr>
         <p:spPr>
           <a:xfrm>
-            <a:off x="2350546" y="5124142"/>
+            <a:off x="6834916" y="5141287"/>
             <a:ext cx="1710466" cy="523220"/>
           </a:xfrm>
           <a:prstGeom prst="rect">
@@ -11817,7 +12180,6 @@
           <a:bodyPr wrap="square" rtlCol="0">
             <a:spAutoFit/>
           </a:bodyPr>
-          <a:lstStyle/>
           <a:p>
             <a:r>
               <a:rPr lang="en-US" altLang="zh-CN" dirty="0"/>
@@ -11835,7 +12197,7 @@
 </p:sld>
 </file>
 
-<file path=ppt/slides/slide6.xml><?xml version="1.0" encoding="utf-8"?>
+<file path=ppt/slides/slide8.xml><?xml version="1.0" encoding="utf-8"?>
 <p:sld xmlns:a="http://schemas.openxmlformats.org/drawingml/2006/main" xmlns:r="http://schemas.openxmlformats.org/officeDocument/2006/relationships" xmlns:p="http://schemas.openxmlformats.org/presentationml/2006/main">
   <p:cSld>
     <p:spTree>
@@ -11864,8 +12226,8 @@
         </p:nvSpPr>
         <p:spPr>
           <a:xfrm>
-            <a:off x="-36195" y="-27305"/>
-            <a:ext cx="9144000" cy="947357"/>
+            <a:off x="0" y="0"/>
+            <a:ext cx="9144000" cy="855345"/>
           </a:xfrm>
         </p:spPr>
         <p:txBody>
@@ -11876,7 +12238,7 @@
           <a:p>
             <a:r>
               <a:rPr lang="en-US" altLang="zh-CN" sz="4000" dirty="0"/>
-              <a:t>Search for a donated book</a:t>
+              <a:t>Implementation Details</a:t>
             </a:r>
             <a:endParaRPr lang="zh-CN" altLang="en-US" sz="4000" dirty="0"/>
           </a:p>
@@ -11890,7 +12252,7 @@
         </p:nvSpPr>
         <p:spPr>
           <a:xfrm>
-            <a:off x="-53975" y="1239520"/>
+            <a:off x="114300" y="920115"/>
             <a:ext cx="4221480" cy="5375910"/>
           </a:xfrm>
           <a:prstGeom prst="roundRect">
@@ -11938,7 +12300,7 @@
         </p:nvSpPr>
         <p:spPr>
           <a:xfrm>
-            <a:off x="612140" y="1181100"/>
+            <a:off x="648970" y="920115"/>
             <a:ext cx="3152140" cy="460375"/>
           </a:xfrm>
           <a:prstGeom prst="rect">
@@ -11952,6 +12314,7 @@
           </a:bodyPr>
           <a:lstStyle/>
           <a:p>
+            <a:pPr algn="ctr"/>
             <a:r>
               <a:rPr lang="en-US" altLang="zh-CN" sz="2400" dirty="0">
                 <a:solidFill>
@@ -11978,8 +12341,8 @@
         </p:nvSpPr>
         <p:spPr>
           <a:xfrm>
-            <a:off x="2254250" y="1537970"/>
-            <a:ext cx="1809750" cy="5077460"/>
+            <a:off x="2446020" y="1380490"/>
+            <a:ext cx="1889760" cy="4707890"/>
           </a:xfrm>
           <a:prstGeom prst="rect">
             <a:avLst/>
@@ -12001,6 +12364,8 @@
                 <a:solidFill>
                   <a:schemeClr val="bg1"/>
                 </a:solidFill>
+                <a:latin typeface="Arial" panose="020B0604020202020204" pitchFamily="34" charset="0"/>
+                <a:cs typeface="Arial" panose="020B0604020202020204" pitchFamily="34" charset="0"/>
                 <a:sym typeface="+mn-ea"/>
               </a:rPr>
               <a:t>Using API Gateway to pass the query infomation from frontend input to lambda function</a:t>
@@ -12009,6 +12374,8 @@
               <a:solidFill>
                 <a:schemeClr val="bg1"/>
               </a:solidFill>
+              <a:latin typeface="Arial" panose="020B0604020202020204" pitchFamily="34" charset="0"/>
+              <a:cs typeface="Arial" panose="020B0604020202020204" pitchFamily="34" charset="0"/>
               <a:sym typeface="+mn-ea"/>
             </a:endParaRPr>
           </a:p>
@@ -12021,6 +12388,8 @@
               <a:solidFill>
                 <a:schemeClr val="bg1"/>
               </a:solidFill>
+              <a:latin typeface="Arial" panose="020B0604020202020204" pitchFamily="34" charset="0"/>
+              <a:cs typeface="Arial" panose="020B0604020202020204" pitchFamily="34" charset="0"/>
               <a:sym typeface="+mn-ea"/>
             </a:endParaRPr>
           </a:p>
@@ -12034,6 +12403,8 @@
                 <a:solidFill>
                   <a:schemeClr val="bg1"/>
                 </a:solidFill>
+                <a:latin typeface="Arial" panose="020B0604020202020204" pitchFamily="34" charset="0"/>
+                <a:cs typeface="Arial" panose="020B0604020202020204" pitchFamily="34" charset="0"/>
                 <a:sym typeface="+mn-ea"/>
               </a:rPr>
               <a:t>Using a lambda function to query corrsponding available donation books ftom DynamoDB through OpenSearch.</a:t>
@@ -12042,6 +12413,8 @@
               <a:solidFill>
                 <a:schemeClr val="bg1"/>
               </a:solidFill>
+              <a:latin typeface="Arial" panose="020B0604020202020204" pitchFamily="34" charset="0"/>
+              <a:cs typeface="Arial" panose="020B0604020202020204" pitchFamily="34" charset="0"/>
               <a:sym typeface="+mn-ea"/>
             </a:endParaRPr>
           </a:p>
@@ -12054,6 +12427,8 @@
               <a:solidFill>
                 <a:schemeClr val="bg1"/>
               </a:solidFill>
+              <a:latin typeface="Arial" panose="020B0604020202020204" pitchFamily="34" charset="0"/>
+              <a:cs typeface="Arial" panose="020B0604020202020204" pitchFamily="34" charset="0"/>
               <a:sym typeface="+mn-ea"/>
             </a:endParaRPr>
           </a:p>
@@ -12067,6 +12442,8 @@
                 <a:solidFill>
                   <a:schemeClr val="bg1"/>
                 </a:solidFill>
+                <a:latin typeface="Arial" panose="020B0604020202020204" pitchFamily="34" charset="0"/>
+                <a:cs typeface="Arial" panose="020B0604020202020204" pitchFamily="34" charset="0"/>
                 <a:sym typeface="+mn-ea"/>
               </a:rPr>
               <a:t>The lambda function also automatically get the book cover by using Open Library API and upload pic from S3</a:t>
@@ -12075,6 +12452,8 @@
               <a:solidFill>
                 <a:schemeClr val="bg1"/>
               </a:solidFill>
+              <a:latin typeface="Arial" panose="020B0604020202020204" pitchFamily="34" charset="0"/>
+              <a:cs typeface="Arial" panose="020B0604020202020204" pitchFamily="34" charset="0"/>
               <a:sym typeface="+mn-ea"/>
             </a:endParaRPr>
           </a:p>
@@ -12087,6 +12466,8 @@
               <a:solidFill>
                 <a:schemeClr val="bg1"/>
               </a:solidFill>
+              <a:latin typeface="Arial" panose="020B0604020202020204" pitchFamily="34" charset="0"/>
+              <a:cs typeface="Arial" panose="020B0604020202020204" pitchFamily="34" charset="0"/>
             </a:endParaRPr>
           </a:p>
           <a:p>
@@ -12099,6 +12480,8 @@
                 <a:solidFill>
                   <a:schemeClr val="bg1"/>
                 </a:solidFill>
+                <a:latin typeface="Arial" panose="020B0604020202020204" pitchFamily="34" charset="0"/>
+                <a:cs typeface="Arial" panose="020B0604020202020204" pitchFamily="34" charset="0"/>
               </a:rPr>
               <a:t>Frontend get the response from the image and display it under the search bar</a:t>
             </a:r>
@@ -12106,6 +12489,8 @@
               <a:solidFill>
                 <a:schemeClr val="bg1"/>
               </a:solidFill>
+              <a:latin typeface="Arial" panose="020B0604020202020204" pitchFamily="34" charset="0"/>
+              <a:cs typeface="Arial" panose="020B0604020202020204" pitchFamily="34" charset="0"/>
             </a:endParaRPr>
           </a:p>
         </p:txBody>
@@ -12126,7 +12511,7 @@
         </p:blipFill>
         <p:spPr>
           <a:xfrm>
-            <a:off x="35560" y="1816735"/>
+            <a:off x="227330" y="1497330"/>
             <a:ext cx="2218690" cy="4221480"/>
           </a:xfrm>
           <a:prstGeom prst="rect">
@@ -12151,7 +12536,7 @@
         </p:blipFill>
         <p:spPr>
           <a:xfrm>
-            <a:off x="4430395" y="1239520"/>
+            <a:off x="4485005" y="1497330"/>
             <a:ext cx="4555366" cy="2894619"/>
           </a:xfrm>
           <a:prstGeom prst="rect">
@@ -12175,7 +12560,7 @@
         </p:blipFill>
         <p:spPr>
           <a:xfrm>
-            <a:off x="4472940" y="4173966"/>
+            <a:off x="4497070" y="4391771"/>
             <a:ext cx="4531231" cy="2092429"/>
           </a:xfrm>
           <a:prstGeom prst="rect">
@@ -12183,6 +12568,44 @@
           </a:prstGeom>
         </p:spPr>
       </p:pic>
+      <p:sp>
+        <p:nvSpPr>
+          <p:cNvPr id="6" name="Text Box 5"/>
+          <p:cNvSpPr txBox="1"/>
+          <p:nvPr/>
+        </p:nvSpPr>
+        <p:spPr>
+          <a:xfrm>
+            <a:off x="4543425" y="946150"/>
+            <a:ext cx="4440555" cy="460375"/>
+          </a:xfrm>
+          <a:prstGeom prst="rect">
+            <a:avLst/>
+          </a:prstGeom>
+          <a:noFill/>
+        </p:spPr>
+        <p:txBody>
+          <a:bodyPr wrap="square" rtlCol="0">
+            <a:spAutoFit/>
+          </a:bodyPr>
+          <a:p>
+            <a:pPr algn="ctr"/>
+            <a:r>
+              <a:rPr lang="en-US" sz="2400" b="1" i="1">
+                <a:solidFill>
+                  <a:schemeClr val="tx2"/>
+                </a:solidFill>
+              </a:rPr>
+              <a:t>Search for a donated book</a:t>
+            </a:r>
+            <a:endParaRPr lang="en-US" sz="2400" b="1" i="1">
+              <a:solidFill>
+                <a:schemeClr val="tx2"/>
+              </a:solidFill>
+            </a:endParaRPr>
+          </a:p>
+        </p:txBody>
+      </p:sp>
     </p:spTree>
   </p:cSld>
   <p:clrMapOvr>
@@ -12191,7 +12614,7 @@
 </p:sld>
 </file>
 
-<file path=ppt/slides/slide7.xml><?xml version="1.0" encoding="utf-8"?>
+<file path=ppt/slides/slide9.xml><?xml version="1.0" encoding="utf-8"?>
 <p:sld xmlns:a="http://schemas.openxmlformats.org/drawingml/2006/main" xmlns:r="http://schemas.openxmlformats.org/officeDocument/2006/relationships" xmlns:p="http://schemas.openxmlformats.org/presentationml/2006/main">
   <p:cSld>
     <p:spTree>
@@ -12220,8 +12643,8 @@
         </p:nvSpPr>
         <p:spPr>
           <a:xfrm>
-            <a:off x="118" y="-297"/>
-            <a:ext cx="9144000" cy="947357"/>
+            <a:off x="0" y="0"/>
+            <a:ext cx="9144000" cy="855980"/>
           </a:xfrm>
         </p:spPr>
         <p:txBody>
@@ -12231,18 +12654,10 @@
           <a:lstStyle/>
           <a:p>
             <a:r>
-              <a:rPr lang="en-US" altLang="zh-CN" sz="4000" dirty="0"/>
-              <a:t>Show user’s</a:t>
+              <a:rPr lang="en-US" sz="4000" dirty="0"/>
+              <a:t>Implementation Details</a:t>
             </a:r>
-            <a:r>
-              <a:rPr lang="zh-CN" altLang="en-US" sz="4000" dirty="0"/>
-              <a:t> </a:t>
-            </a:r>
-            <a:r>
-              <a:rPr lang="en-US" altLang="zh-CN" sz="4000" dirty="0"/>
-              <a:t>info &amp; add to favorite list</a:t>
-            </a:r>
-            <a:endParaRPr lang="zh-CN" altLang="en-US" sz="4000" dirty="0"/>
+            <a:endParaRPr lang="en-US" sz="4000" dirty="0"/>
           </a:p>
         </p:txBody>
       </p:sp>
@@ -12254,7 +12669,7 @@
         </p:nvSpPr>
         <p:spPr>
           <a:xfrm>
-            <a:off x="176642" y="947060"/>
+            <a:off x="112507" y="946425"/>
             <a:ext cx="4105910" cy="5340350"/>
           </a:xfrm>
           <a:prstGeom prst="roundRect">
@@ -12310,8 +12725,8 @@
         </p:blipFill>
         <p:spPr>
           <a:xfrm>
-            <a:off x="325920" y="1390403"/>
-            <a:ext cx="3856156" cy="2353259"/>
+            <a:off x="325755" y="1240155"/>
+            <a:ext cx="3679190" cy="2245360"/>
           </a:xfrm>
           <a:prstGeom prst="rect">
             <a:avLst/>
@@ -12334,8 +12749,8 @@
         </p:blipFill>
         <p:spPr>
           <a:xfrm>
-            <a:off x="4862456" y="1151276"/>
-            <a:ext cx="3845859" cy="2710619"/>
+            <a:off x="4858385" y="1901825"/>
+            <a:ext cx="3670935" cy="2587625"/>
           </a:xfrm>
           <a:prstGeom prst="rect">
             <a:avLst/>
@@ -12358,7 +12773,7 @@
         </p:blipFill>
         <p:spPr>
           <a:xfrm>
-            <a:off x="4459076" y="3903882"/>
+            <a:off x="4474951" y="4489352"/>
             <a:ext cx="4577616" cy="2276386"/>
           </a:xfrm>
           <a:prstGeom prst="rect">
@@ -12374,8 +12789,8 @@
         </p:nvSpPr>
         <p:spPr>
           <a:xfrm>
-            <a:off x="-242016" y="3814403"/>
-            <a:ext cx="4572000" cy="2231380"/>
+            <a:off x="-311785" y="3615055"/>
+            <a:ext cx="4594225" cy="2368550"/>
           </a:xfrm>
           <a:prstGeom prst="rect">
             <a:avLst/>
@@ -12399,17 +12814,23 @@
               <a:buChar char="•"/>
             </a:pPr>
             <a:r>
-              <a:rPr lang="en-US" altLang="zh-CN" sz="1100" b="0" i="0" u="none" strike="noStrike" dirty="0">
-                <a:solidFill>
-                  <a:srgbClr val="000000"/>
+              <a:rPr lang="en-US" altLang="zh-CN" sz="1200" b="0" i="0" u="none" strike="noStrike" dirty="0">
+                <a:solidFill>
+                  <a:schemeClr val="accent1"/>
                 </a:solidFill>
                 <a:effectLst/>
-                <a:latin typeface="Times New Roman" panose="02020603050405020304" pitchFamily="18" charset="0"/>
+                <a:latin typeface="Arial" panose="020B0604020202020204" pitchFamily="34" charset="0"/>
+                <a:cs typeface="Arial" panose="020B0604020202020204" pitchFamily="34" charset="0"/>
               </a:rPr>
               <a:t>Every time the user selects a book they like, the system firstly will store this book’s id in Dynamo DB(user information) corresponding to the user. </a:t>
             </a:r>
-            <a:endParaRPr lang="en-US" altLang="zh-CN" sz="1100" b="0" dirty="0">
+            <a:endParaRPr lang="en-US" altLang="zh-CN" sz="1200" b="0" dirty="0">
+              <a:solidFill>
+                <a:schemeClr val="accent1"/>
+              </a:solidFill>
               <a:effectLst/>
+              <a:latin typeface="Arial" panose="020B0604020202020204" pitchFamily="34" charset="0"/>
+              <a:cs typeface="Arial" panose="020B0604020202020204" pitchFamily="34" charset="0"/>
             </a:endParaRPr>
           </a:p>
           <a:p>
@@ -12424,23 +12845,33 @@
               <a:buChar char="•"/>
             </a:pPr>
             <a:r>
-              <a:rPr lang="en-US" altLang="zh-CN" sz="1100" b="0" i="0" u="none" strike="noStrike" dirty="0">
-                <a:solidFill>
-                  <a:srgbClr val="000000"/>
+              <a:rPr lang="en-US" altLang="zh-CN" sz="1200" b="0" i="0" u="none" strike="noStrike" dirty="0">
+                <a:solidFill>
+                  <a:schemeClr val="accent1"/>
                 </a:solidFill>
                 <a:effectLst/>
-                <a:latin typeface="Times New Roman" panose="02020603050405020304" pitchFamily="18" charset="0"/>
+                <a:latin typeface="Arial" panose="020B0604020202020204" pitchFamily="34" charset="0"/>
+                <a:cs typeface="Arial" panose="020B0604020202020204" pitchFamily="34" charset="0"/>
               </a:rPr>
               <a:t>When the user jumps to the favorite list page and want more information about these books, the system will search it in the DynamoDB(book info) by </a:t>
             </a:r>
             <a:r>
-              <a:rPr lang="en-US" altLang="zh-CN" sz="1100" dirty="0">
-                <a:latin typeface="Times New Roman" panose="02020603050405020304" pitchFamily="18" charset="0"/>
+              <a:rPr lang="en-US" altLang="zh-CN" sz="1200" dirty="0">
+                <a:solidFill>
+                  <a:schemeClr val="accent1"/>
+                </a:solidFill>
+                <a:latin typeface="Arial" panose="020B0604020202020204" pitchFamily="34" charset="0"/>
+                <a:cs typeface="Arial" panose="020B0604020202020204" pitchFamily="34" charset="0"/>
               </a:rPr>
               <a:t>id</a:t>
             </a:r>
-            <a:endParaRPr lang="en-US" altLang="zh-CN" sz="1100" b="0" dirty="0">
+            <a:endParaRPr lang="en-US" altLang="zh-CN" sz="1200" b="0" dirty="0">
+              <a:solidFill>
+                <a:schemeClr val="accent1"/>
+              </a:solidFill>
               <a:effectLst/>
+              <a:latin typeface="Arial" panose="020B0604020202020204" pitchFamily="34" charset="0"/>
+              <a:cs typeface="Arial" panose="020B0604020202020204" pitchFamily="34" charset="0"/>
             </a:endParaRPr>
           </a:p>
           <a:p>
@@ -12455,86 +12886,37 @@
               <a:buChar char="•"/>
             </a:pPr>
             <a:r>
-              <a:rPr lang="en-US" altLang="zh-CN" sz="1100" b="0" i="0" u="none" strike="noStrike" dirty="0">
-                <a:solidFill>
-                  <a:srgbClr val="000000"/>
+              <a:rPr lang="en-US" altLang="zh-CN" sz="1200" b="0" i="0" u="none" strike="noStrike" dirty="0">
+                <a:solidFill>
+                  <a:schemeClr val="accent1"/>
                 </a:solidFill>
                 <a:effectLst/>
-                <a:latin typeface="Times New Roman" panose="02020603050405020304" pitchFamily="18" charset="0"/>
+                <a:latin typeface="Arial" panose="020B0604020202020204" pitchFamily="34" charset="0"/>
+                <a:cs typeface="Arial" panose="020B0604020202020204" pitchFamily="34" charset="0"/>
               </a:rPr>
               <a:t>When the user chooses to add a book to their favorite list, the count of favorite’ for that book will increase by 1 and the book is removed when the user double click</a:t>
             </a:r>
-            <a:endParaRPr lang="en-US" altLang="zh-CN" sz="1100" b="0" dirty="0">
+            <a:endParaRPr lang="en-US" altLang="zh-CN" sz="1200" b="0" i="0" u="none" strike="noStrike" dirty="0">
+              <a:solidFill>
+                <a:schemeClr val="accent1"/>
+              </a:solidFill>
               <a:effectLst/>
+              <a:latin typeface="Arial" panose="020B0604020202020204" pitchFamily="34" charset="0"/>
+              <a:cs typeface="Arial" panose="020B0604020202020204" pitchFamily="34" charset="0"/>
             </a:endParaRPr>
-          </a:p>
-        </p:txBody>
-      </p:sp>
-    </p:spTree>
-  </p:cSld>
-  <p:clrMapOvr>
-    <a:masterClrMapping/>
-  </p:clrMapOvr>
-</p:sld>
-</file>
-
-<file path=ppt/slides/slide8.xml><?xml version="1.0" encoding="utf-8"?>
-<p:sld xmlns:a="http://schemas.openxmlformats.org/drawingml/2006/main" xmlns:r="http://schemas.openxmlformats.org/officeDocument/2006/relationships" xmlns:p="http://schemas.openxmlformats.org/presentationml/2006/main">
-  <p:cSld>
-    <p:spTree>
-      <p:nvGrpSpPr>
-        <p:cNvPr id="1" name=""/>
-        <p:cNvGrpSpPr/>
-        <p:nvPr/>
-      </p:nvGrpSpPr>
-      <p:grpSpPr>
-        <a:xfrm>
-          <a:off x="0" y="0"/>
-          <a:ext cx="0" cy="0"/>
-          <a:chOff x="0" y="0"/>
-          <a:chExt cx="0" cy="0"/>
-        </a:xfrm>
-      </p:grpSpPr>
-      <p:sp>
-        <p:nvSpPr>
-          <p:cNvPr id="4" name="Title 1"/>
-          <p:cNvSpPr>
-            <a:spLocks noGrp="1"/>
-          </p:cNvSpPr>
-          <p:nvPr>
-            <p:ph type="ctrTitle"/>
-          </p:nvPr>
-        </p:nvSpPr>
-        <p:spPr>
-          <a:xfrm>
-            <a:off x="35678" y="44153"/>
-            <a:ext cx="9144000" cy="947357"/>
-          </a:xfrm>
-        </p:spPr>
-        <p:txBody>
-          <a:bodyPr>
-            <a:normAutofit/>
-          </a:bodyPr>
-          <a:lstStyle/>
-          <a:p>
-            <a:r>
-              <a:rPr lang="en-US" altLang="zh-CN" sz="4000" dirty="0"/>
-              <a:t>Some Design Choice</a:t>
-            </a:r>
-            <a:endParaRPr lang="zh-CN" altLang="en-US" sz="4000" dirty="0"/>
           </a:p>
         </p:txBody>
       </p:sp>
       <p:sp>
         <p:nvSpPr>
-          <p:cNvPr id="5" name="TextBox 2"/>
+          <p:cNvPr id="2" name="Text Box 1"/>
           <p:cNvSpPr txBox="1"/>
           <p:nvPr/>
         </p:nvSpPr>
         <p:spPr>
           <a:xfrm>
-            <a:off x="301625" y="1412875"/>
-            <a:ext cx="8540115" cy="2030095"/>
+            <a:off x="4543425" y="946150"/>
+            <a:ext cx="4440555" cy="829945"/>
           </a:xfrm>
           <a:prstGeom prst="rect">
             <a:avLst/>
@@ -12545,53 +12927,21 @@
           <a:bodyPr wrap="square" rtlCol="0">
             <a:spAutoFit/>
           </a:bodyPr>
-          <a:lstStyle/>
           <a:p>
+            <a:pPr algn="ctr"/>
             <a:r>
-              <a:rPr lang="en-US" altLang="zh-CN" dirty="0"/>
-              <a:t>Although we can link user’s account and their information directly in Cognito (which is convenient and good for keeping user’s information secure!), we decided to use DynamoDB to store the users’ non-sensitive information, rather than storing them in Cognito.</a:t>
+              <a:rPr lang="en-US" sz="2400" b="1" i="1">
+                <a:solidFill>
+                  <a:schemeClr val="tx2"/>
+                </a:solidFill>
+              </a:rPr>
+              <a:t>Show user’s info &amp; add to favorite list</a:t>
             </a:r>
-            <a:endParaRPr lang="en-US" altLang="zh-CN" dirty="0"/>
-          </a:p>
-          <a:p>
-            <a:r>
-              <a:rPr lang="en-US" altLang="zh-CN" sz="1400" dirty="0"/>
-              <a:t>-   The attributes stored in Cognito has to be key-value(string) pair, not good for complicated data structures.</a:t>
-            </a:r>
-            <a:endParaRPr lang="en-US" altLang="zh-CN" sz="1400" dirty="0"/>
-          </a:p>
-          <a:p>
-            <a:pPr marL="285750" indent="-285750">
-              <a:buFontTx/>
-              <a:buChar char="-"/>
-            </a:pPr>
-            <a:r>
-              <a:rPr lang="en-US" altLang="zh-CN" sz="1400" dirty="0"/>
-              <a:t>We need to store many users’ requested/donate books, this list could be large and Cognito is not scalable as the DynamoDB.</a:t>
-            </a:r>
-            <a:endParaRPr lang="en-US" altLang="zh-CN" sz="1400" dirty="0"/>
-          </a:p>
-          <a:p>
-            <a:pPr marL="285750" indent="-285750">
-              <a:buFontTx/>
-              <a:buChar char="-"/>
-            </a:pPr>
-            <a:r>
-              <a:rPr lang="en-US" altLang="zh-CN" sz="1400" dirty="0"/>
-              <a:t>The DynamoDB can handle query much more efficient than Cognito</a:t>
-            </a:r>
-            <a:endParaRPr lang="en-US" altLang="zh-CN" sz="1400" dirty="0"/>
-          </a:p>
-          <a:p>
-            <a:pPr marL="285750" indent="-285750">
-              <a:buFontTx/>
-              <a:buChar char="-"/>
-            </a:pPr>
-            <a:r>
-              <a:rPr lang="en-US" altLang="zh-CN" sz="1400" dirty="0"/>
-              <a:t>We realized this is the pattern often done in the industry after searching the online information</a:t>
-            </a:r>
-            <a:endParaRPr lang="en-US" altLang="zh-CN" sz="1400" dirty="0"/>
+            <a:endParaRPr lang="en-US" sz="2400" b="1" i="1">
+              <a:solidFill>
+                <a:schemeClr val="tx2"/>
+              </a:solidFill>
+            </a:endParaRPr>
           </a:p>
         </p:txBody>
       </p:sp>

</xml_diff>